<commit_message>
fixed example render, finished viz pass
</commit_message>
<xml_diff>
--- a/images/theory/illustrations.pptx
+++ b/images/theory/illustrations.pptx
@@ -180,60 +180,6 @@
           <inkml:channelProperty channel="F" name="resolution" value="0" units="1/dev"/>
         </inkml:channelProperties>
       </inkml:inkSource>
-      <inkml:timestamp xml:id="ts0" timeString="2022-09-11T15:13:03.714"/>
-    </inkml:context>
-    <inkml:brush xml:id="br0">
-      <inkml:brushProperty name="width" value="0.1" units="cm"/>
-      <inkml:brushProperty name="height" value="0.1" units="cm"/>
-    </inkml:brush>
-  </inkml:definitions>
-  <inkml:trace contextRef="#ctx0" brushRef="#br0">1 0 24575,'18'0'0,"-1"0"0,2 0 0,-3 4 0,3-3 0,0 5 0,13 5 0,-4-5 0,22 11 0,-20-12 0,3 6 0,-12-7 0,4 3 0,-8-3 0,13 3 0,-18 0 0,14-1 0,-17-2 0,19 2 0,-18-5 0,9 5 0,-15-3 0,4 1 0,-3 2 0,4-6 0,-2 3 0,-1 0 0,1-2 0,-1 5 0,5-2 0,0 3 0,3 0 0,1-3 0,0 3 0,-1-3 0,1 0 0,0 2 0,-1-2 0,1 4 0,-4-4 0,3 2 0,-7-5 0,4 5 0,-5-5 0,1 2 0,-1 0 0,0-3 0,1 3 0,-1-3 0,1 3 0,0 1 0,-1 0 0,1 1 0,-1-4 0,1 2 0,0 0 0,-1-2 0,0 1 0,1-2 0,-1 0 0,4 4 0,-2-1 0,2 4 0,-3-3 0,-1-1 0,-2 0 0,-1-3 0,-3 3 0</inkml:trace>
-</inkml:ink>
-</file>
-
-<file path=ppt/ink/ink101.xml><?xml version="1.0" encoding="utf-8"?>
-<inkml:ink xmlns:inkml="http://www.w3.org/2003/InkML">
-  <inkml:definitions>
-    <inkml:context xml:id="ctx0">
-      <inkml:inkSource xml:id="inkSrc0">
-        <inkml:traceFormat>
-          <inkml:channel name="X" type="integer" min="-2.14748E9" max="2.14748E9" units="cm"/>
-          <inkml:channel name="Y" type="integer" min="-2.14748E9" max="2.14748E9" units="cm"/>
-          <inkml:channel name="F" type="integer" max="32767" units="dev"/>
-        </inkml:traceFormat>
-        <inkml:channelProperties>
-          <inkml:channelProperty channel="X" name="resolution" value="1000" units="1/cm"/>
-          <inkml:channelProperty channel="Y" name="resolution" value="1000" units="1/cm"/>
-          <inkml:channelProperty channel="F" name="resolution" value="0" units="1/dev"/>
-        </inkml:channelProperties>
-      </inkml:inkSource>
-      <inkml:timestamp xml:id="ts0" timeString="2022-09-11T15:13:05.681"/>
-    </inkml:context>
-    <inkml:brush xml:id="br0">
-      <inkml:brushProperty name="width" value="0.1" units="cm"/>
-      <inkml:brushProperty name="height" value="0.1" units="cm"/>
-    </inkml:brush>
-  </inkml:definitions>
-  <inkml:trace contextRef="#ctx0" brushRef="#br0">1 0 24575,'9'0'0,"13"0"0,-2 0 0,5 0 0,-4 0 0,-2 0 0,18 11 0,-13-5 0,23 12 0,-25-6 0,11 4 0,-2-1 0,-11-4 0,5 0 0,-10-7 0,1 3 0,2-3 0,-3 0 0,0 2 0,4-5 0,-4 6 0,4-3 0,-4 0 0,-1 2 0,1-5 0,-4 5 0,3-5 0,-3 2 0,0-3 0,3 0 0,-3 0 0,4 0 0,-1 0 0,1 0 0,4 3 0,-3-2 0,7 3 0,-8-4 0,15 0 0,-13 0 0,9 0 0,-15 0 0,-1 0 0,-3 0 0,-1 0 0,1 0 0,-1 0 0,1 0 0,-1 0 0,1 0 0,-1 0 0,1 0 0,3 0 0,-3 0 0,4 0 0,-5 0 0,1 3 0,0-2 0,-1 2 0,0-3 0,1 0 0,-1 0 0,1 0 0,-1 0 0,1 2 0,3-1 0,-2 2 0,2-3 0,-4 3 0,1-2 0,0 2 0,-1-3 0,1 0 0,-1 3 0,1-3 0,0 3 0,-1-3 0,1 3 0,0-2 0,-1 2 0,-2-3 0,-2 0 0</inkml:trace>
-</inkml:ink>
-</file>
-
-<file path=ppt/ink/ink102.xml><?xml version="1.0" encoding="utf-8"?>
-<inkml:ink xmlns:inkml="http://www.w3.org/2003/InkML">
-  <inkml:definitions>
-    <inkml:context xml:id="ctx0">
-      <inkml:inkSource xml:id="inkSrc0">
-        <inkml:traceFormat>
-          <inkml:channel name="X" type="integer" min="-2.14748E9" max="2.14748E9" units="cm"/>
-          <inkml:channel name="Y" type="integer" min="-2.14748E9" max="2.14748E9" units="cm"/>
-          <inkml:channel name="F" type="integer" max="32767" units="dev"/>
-        </inkml:traceFormat>
-        <inkml:channelProperties>
-          <inkml:channelProperty channel="X" name="resolution" value="1000" units="1/cm"/>
-          <inkml:channelProperty channel="Y" name="resolution" value="1000" units="1/cm"/>
-          <inkml:channelProperty channel="F" name="resolution" value="0" units="1/dev"/>
-        </inkml:channelProperties>
-      </inkml:inkSource>
       <inkml:timestamp xml:id="ts0" timeString="2022-09-11T15:13:07.351"/>
     </inkml:context>
     <inkml:brush xml:id="br0">
@@ -245,7 +191,7 @@
 </inkml:ink>
 </file>
 
-<file path=ppt/ink/ink103.xml><?xml version="1.0" encoding="utf-8"?>
+<file path=ppt/ink/ink101.xml><?xml version="1.0" encoding="utf-8"?>
 <inkml:ink xmlns:inkml="http://www.w3.org/2003/InkML">
   <inkml:definitions>
     <inkml:context xml:id="ctx0">
@@ -272,7 +218,7 @@
 </inkml:ink>
 </file>
 
-<file path=ppt/ink/ink104.xml><?xml version="1.0" encoding="utf-8"?>
+<file path=ppt/ink/ink102.xml><?xml version="1.0" encoding="utf-8"?>
 <inkml:ink xmlns:inkml="http://www.w3.org/2003/InkML">
   <inkml:definitions>
     <inkml:context xml:id="ctx0">
@@ -299,7 +245,7 @@
 </inkml:ink>
 </file>
 
-<file path=ppt/ink/ink105.xml><?xml version="1.0" encoding="utf-8"?>
+<file path=ppt/ink/ink103.xml><?xml version="1.0" encoding="utf-8"?>
 <inkml:ink xmlns:inkml="http://www.w3.org/2003/InkML">
   <inkml:definitions>
     <inkml:context xml:id="ctx0">
@@ -326,7 +272,7 @@
 </inkml:ink>
 </file>
 
-<file path=ppt/ink/ink106.xml><?xml version="1.0" encoding="utf-8"?>
+<file path=ppt/ink/ink104.xml><?xml version="1.0" encoding="utf-8"?>
 <inkml:ink xmlns:inkml="http://www.w3.org/2003/InkML">
   <inkml:definitions>
     <inkml:context xml:id="ctx0">
@@ -353,7 +299,7 @@
 </inkml:ink>
 </file>
 
-<file path=ppt/ink/ink107.xml><?xml version="1.0" encoding="utf-8"?>
+<file path=ppt/ink/ink105.xml><?xml version="1.0" encoding="utf-8"?>
 <inkml:ink xmlns:inkml="http://www.w3.org/2003/InkML">
   <inkml:definitions>
     <inkml:context xml:id="ctx0">
@@ -380,7 +326,7 @@
 </inkml:ink>
 </file>
 
-<file path=ppt/ink/ink108.xml><?xml version="1.0" encoding="utf-8"?>
+<file path=ppt/ink/ink106.xml><?xml version="1.0" encoding="utf-8"?>
 <inkml:ink xmlns:inkml="http://www.w3.org/2003/InkML">
   <inkml:definitions>
     <inkml:context xml:id="ctx0">
@@ -407,7 +353,7 @@
 </inkml:ink>
 </file>
 
-<file path=ppt/ink/ink109.xml><?xml version="1.0" encoding="utf-8"?>
+<file path=ppt/ink/ink107.xml><?xml version="1.0" encoding="utf-8"?>
 <inkml:ink xmlns:inkml="http://www.w3.org/2003/InkML">
   <inkml:definitions>
     <inkml:context xml:id="ctx0">
@@ -431,6 +377,63 @@
     </inkml:brush>
   </inkml:definitions>
   <inkml:trace contextRef="#ctx0" brushRef="#br0">1 1302 24575,'0'-14'0,"0"-24"0,12 2 0,-5-16 0,14 16 0,0-14 0,-2 16 0,10-24 0,-6 20 0,6-10 0,2 0 0,-6 4 0,5-3 0,2-5 0,-7 16 0,9-27 0,-21 39 0,17-43 0,-15 36 0,10-26 0,-9 22 0,9-21 0,-10 24 0,11-15 0,-22 35 0,2 0 0,-3 5 0,-2-2 0,2 2 0,0-6 0,-3 6 0,3-3 0,-3 4 0,0-1 0,0 1 0,0 0 0,0-1 0,3 1 0,-2-1 0,5-8 0,-5 6 0,2-6 0,-1 9 0,-1-1 0,2 1 0,0-4 0,0 6 0,1-8 0,2 10 0,-5-6 0,1 4 0,1-2 0,-2 0 0,5-1 0,-3 1 0,4-1 0,-4 4 0,0 0 0</inkml:trace>
+</inkml:ink>
+</file>
+
+<file path=ppt/ink/ink108.xml><?xml version="1.0" encoding="utf-8"?>
+<inkml:ink xmlns:inkml="http://www.w3.org/2003/InkML">
+  <inkml:definitions>
+    <inkml:context xml:id="ctx0">
+      <inkml:inkSource xml:id="inkSrc0">
+        <inkml:traceFormat>
+          <inkml:channel name="X" type="integer" min="-2.14748E9" max="2.14748E9" units="cm"/>
+          <inkml:channel name="Y" type="integer" min="-2.14748E9" max="2.14748E9" units="cm"/>
+          <inkml:channel name="F" type="integer" max="32767" units="dev"/>
+        </inkml:traceFormat>
+        <inkml:channelProperties>
+          <inkml:channelProperty channel="X" name="resolution" value="1000" units="1/cm"/>
+          <inkml:channelProperty channel="Y" name="resolution" value="1000" units="1/cm"/>
+          <inkml:channelProperty channel="F" name="resolution" value="0" units="1/dev"/>
+        </inkml:channelProperties>
+      </inkml:inkSource>
+      <inkml:timestamp xml:id="ts0" timeString="2022-09-11T15:13:24.066"/>
+    </inkml:context>
+    <inkml:brush xml:id="br0">
+      <inkml:brushProperty name="width" value="0.1" units="cm"/>
+      <inkml:brushProperty name="height" value="0.1" units="cm"/>
+    </inkml:brush>
+  </inkml:definitions>
+  <inkml:trace contextRef="#ctx0" brushRef="#br0">324 0 24575,'0'13'0,"0"1"0,0 1 0,0-1 0,0 5 0,-8 22 0,6-11 0,-6 15 0,0 10 0,3-12 0,-4 15 0,2-19 0,2 2 0,-12 18 0,7-3 0,-11 2 0,-2 24 0,3-36 0,3 9 0,0-2 0,2-15 0,-5 27 0,15-44 0,-2 7 0,3-12 0,-8 24 0,0-9 0,3 12 0,-1-17 0,3 0 0,2-10 0,-5 5 0,6-6 0,0 3 0,-2-7 0,5 5 0,-2-8 0,0 4 0,3-4 0,-3 4 0,3-5 0,-3 3 0,2-4 0,-2 0 0,3 0 0,0 0 0,0-2 0,0-2 0</inkml:trace>
+</inkml:ink>
+</file>
+
+<file path=ppt/ink/ink109.xml><?xml version="1.0" encoding="utf-8"?>
+<inkml:ink xmlns:inkml="http://www.w3.org/2003/InkML">
+  <inkml:definitions>
+    <inkml:context xml:id="ctx0">
+      <inkml:inkSource xml:id="inkSrc0">
+        <inkml:traceFormat>
+          <inkml:channel name="X" type="integer" min="-2.14748E9" max="2.14748E9" units="cm"/>
+          <inkml:channel name="Y" type="integer" min="-2.14748E9" max="2.14748E9" units="cm"/>
+          <inkml:channel name="F" type="integer" max="32767" units="dev"/>
+        </inkml:traceFormat>
+        <inkml:channelProperties>
+          <inkml:channelProperty channel="X" name="resolution" value="1000" units="1/cm"/>
+          <inkml:channelProperty channel="Y" name="resolution" value="1000" units="1/cm"/>
+          <inkml:channelProperty channel="F" name="resolution" value="0" units="1/dev"/>
+        </inkml:channelProperties>
+      </inkml:inkSource>
+      <inkml:timestamp xml:id="ts0" timeString="2022-09-11T15:13:34.080"/>
+    </inkml:context>
+    <inkml:brush xml:id="br0">
+      <inkml:brushProperty name="width" value="0.3" units="cm"/>
+      <inkml:brushProperty name="height" value="0.6" units="cm"/>
+      <inkml:brushProperty name="color" value="#00B44B"/>
+      <inkml:brushProperty name="tip" value="rectangle"/>
+      <inkml:brushProperty name="rasterOp" value="maskPen"/>
+    </inkml:brush>
+  </inkml:definitions>
+  <inkml:trace contextRef="#ctx0" brushRef="#br0">0 174 16383,'58'0'0,"-10"0"0,-14 0 0,-8 0 0,9 0 0,11 0 0,0-4 0,8 3 0,-11-9 0,-12 8 0,-8-5 0,-10 7 0,0-3 0,12-8 0,-4 3 0,22-9 0,-28 12 0,17-1 0,-24 3 0,5 2 0,9-7 0,-8 6 0,13-4 0,-7 3 0,-7-1 0,8 0 0,-6-5 0,13 5 0,-8-3 0,12-3 0,-20 9 0,7-6 0,-6 1 0,1 2 0,2-6 0,1 3 0,-5 3 0,4 19 0,-12-4 0,2 20 0,-6-15 0,0 7 0,0-3 0,0 4 0,0 0 0,0 0 0,-4 5 0,3-4 0,-6 4 0,-1-5 0,-1 1 0,-2-6 0,-1 5 0,1-12 0,-2 6 0,0-7 0,-12 7 0,3-5 0,-39 8 0,30-11 0,-47 12 0,42-12 0,-42 13 0,43-12 0,-37 11 0,42-15 0,-33 14 0,35-15 0,-22 15 0,28-12 0,-8 8 0,18-13 0,0 2 0,-7 3 0,9-6 0,-12 9 0,12-8 0,-1 2 0,-4 6 0,4-1 0,1 2 0,-2-1 0,8-2 0,-8 3 0,2 3 0,0-5 0,0 4 0,31-1 0,-11-3 0,22-1 0,-17-4 0,4-5 0,-3 6 0,7-7 0,-7 4 0,7-1 0,-8-2 0,4 3 0,0-4 0,-3 3 0,3-2 0,-5 5 0,1-5 0,0 6 0,2-6 0,-1 5 0,5-5 0,-5 2 0,3-3 0,-4 3 0,4-2 0,-4 2 0,4-3 0,-4 0 0,2 0 0,2 4 0,-4-3 0,1 5 0,-2-6 0,0 7 0,7-7 0,-9 4 0,7-4 0,-7 3 0,4-3 0,1 6 0,-3-5 0,2 2 0,-2 0 0,3-2 0,-2 5 0,1-5 0,0 2 0,-2 0 0,4-2 0,-4 4 0,2-4 0,0 5 0,-2-2 0,2-1 0,-1 3 0,-1-2 0,2 2 0,0 1 0,-5-1 0,7-2 0,-63-5 0,25 0 0,-49-3 0,28 4 0,5 0 0,-5 0 0,6 0 0,5 0 0,1 0 0,5 0 0,0 0 0,4 0 0,1 0 0,8 0 0,-6 3 0,3 1 0,-5-1 0,2 3 0,3-5 0,0 5 0,-3-2 0,-1 0 0,3-1 0,-1-3 0,2 3 0,-1-2 0,-2 2 0,3 0 0,-3-2 0,3 2 0,-3 0 0,3-3 0,-3 3 0,3-3 0,-2 3 0,-1-2 0,4 2 0,-4 0 0,1-2 0,2 2 0,-5-3 0,6 3 0,-3-3 0,0 3 0,-1-3 0</inkml:trace>
 </inkml:ink>
 </file>
 
@@ -477,63 +480,6 @@
           <inkml:channelProperty channel="F" name="resolution" value="0" units="1/dev"/>
         </inkml:channelProperties>
       </inkml:inkSource>
-      <inkml:timestamp xml:id="ts0" timeString="2022-09-11T15:13:24.066"/>
-    </inkml:context>
-    <inkml:brush xml:id="br0">
-      <inkml:brushProperty name="width" value="0.1" units="cm"/>
-      <inkml:brushProperty name="height" value="0.1" units="cm"/>
-    </inkml:brush>
-  </inkml:definitions>
-  <inkml:trace contextRef="#ctx0" brushRef="#br0">324 0 24575,'0'13'0,"0"1"0,0 1 0,0-1 0,0 5 0,-8 22 0,6-11 0,-6 15 0,0 10 0,3-12 0,-4 15 0,2-19 0,2 2 0,-12 18 0,7-3 0,-11 2 0,-2 24 0,3-36 0,3 9 0,0-2 0,2-15 0,-5 27 0,15-44 0,-2 7 0,3-12 0,-8 24 0,0-9 0,3 12 0,-1-17 0,3 0 0,2-10 0,-5 5 0,6-6 0,0 3 0,-2-7 0,5 5 0,-2-8 0,0 4 0,3-4 0,-3 4 0,3-5 0,-3 3 0,2-4 0,-2 0 0,3 0 0,0 0 0,0-2 0,0-2 0</inkml:trace>
-</inkml:ink>
-</file>
-
-<file path=ppt/ink/ink111.xml><?xml version="1.0" encoding="utf-8"?>
-<inkml:ink xmlns:inkml="http://www.w3.org/2003/InkML">
-  <inkml:definitions>
-    <inkml:context xml:id="ctx0">
-      <inkml:inkSource xml:id="inkSrc0">
-        <inkml:traceFormat>
-          <inkml:channel name="X" type="integer" min="-2.14748E9" max="2.14748E9" units="cm"/>
-          <inkml:channel name="Y" type="integer" min="-2.14748E9" max="2.14748E9" units="cm"/>
-          <inkml:channel name="F" type="integer" max="32767" units="dev"/>
-        </inkml:traceFormat>
-        <inkml:channelProperties>
-          <inkml:channelProperty channel="X" name="resolution" value="1000" units="1/cm"/>
-          <inkml:channelProperty channel="Y" name="resolution" value="1000" units="1/cm"/>
-          <inkml:channelProperty channel="F" name="resolution" value="0" units="1/dev"/>
-        </inkml:channelProperties>
-      </inkml:inkSource>
-      <inkml:timestamp xml:id="ts0" timeString="2022-09-11T15:13:34.080"/>
-    </inkml:context>
-    <inkml:brush xml:id="br0">
-      <inkml:brushProperty name="width" value="0.3" units="cm"/>
-      <inkml:brushProperty name="height" value="0.6" units="cm"/>
-      <inkml:brushProperty name="color" value="#00B44B"/>
-      <inkml:brushProperty name="tip" value="rectangle"/>
-      <inkml:brushProperty name="rasterOp" value="maskPen"/>
-    </inkml:brush>
-  </inkml:definitions>
-  <inkml:trace contextRef="#ctx0" brushRef="#br0">0 174 16383,'58'0'0,"-10"0"0,-14 0 0,-8 0 0,9 0 0,11 0 0,0-4 0,8 3 0,-11-9 0,-12 8 0,-8-5 0,-10 7 0,0-3 0,12-8 0,-4 3 0,22-9 0,-28 12 0,17-1 0,-24 3 0,5 2 0,9-7 0,-8 6 0,13-4 0,-7 3 0,-7-1 0,8 0 0,-6-5 0,13 5 0,-8-3 0,12-3 0,-20 9 0,7-6 0,-6 1 0,1 2 0,2-6 0,1 3 0,-5 3 0,4 19 0,-12-4 0,2 20 0,-6-15 0,0 7 0,0-3 0,0 4 0,0 0 0,0 0 0,-4 5 0,3-4 0,-6 4 0,-1-5 0,-1 1 0,-2-6 0,-1 5 0,1-12 0,-2 6 0,0-7 0,-12 7 0,3-5 0,-39 8 0,30-11 0,-47 12 0,42-12 0,-42 13 0,43-12 0,-37 11 0,42-15 0,-33 14 0,35-15 0,-22 15 0,28-12 0,-8 8 0,18-13 0,0 2 0,-7 3 0,9-6 0,-12 9 0,12-8 0,-1 2 0,-4 6 0,4-1 0,1 2 0,-2-1 0,8-2 0,-8 3 0,2 3 0,0-5 0,0 4 0,31-1 0,-11-3 0,22-1 0,-17-4 0,4-5 0,-3 6 0,7-7 0,-7 4 0,7-1 0,-8-2 0,4 3 0,0-4 0,-3 3 0,3-2 0,-5 5 0,1-5 0,0 6 0,2-6 0,-1 5 0,5-5 0,-5 2 0,3-3 0,-4 3 0,4-2 0,-4 2 0,4-3 0,-4 0 0,2 0 0,2 4 0,-4-3 0,1 5 0,-2-6 0,0 7 0,7-7 0,-9 4 0,7-4 0,-7 3 0,4-3 0,1 6 0,-3-5 0,2 2 0,-2 0 0,3-2 0,-2 5 0,1-5 0,0 2 0,-2 0 0,4-2 0,-4 4 0,2-4 0,0 5 0,-2-2 0,2-1 0,-1 3 0,-1-2 0,2 2 0,0 1 0,-5-1 0,7-2 0,-63-5 0,25 0 0,-49-3 0,28 4 0,5 0 0,-5 0 0,6 0 0,5 0 0,1 0 0,5 0 0,0 0 0,4 0 0,1 0 0,8 0 0,-6 3 0,3 1 0,-5-1 0,2 3 0,3-5 0,0 5 0,-3-2 0,-1 0 0,3-1 0,-1-3 0,2 3 0,-1-2 0,-2 2 0,3 0 0,-3-2 0,3 2 0,-3 0 0,3-3 0,-3 3 0,3-3 0,-2 3 0,-1-2 0,4 2 0,-4 0 0,1-2 0,2 2 0,-5-3 0,6 3 0,-3-3 0,0 3 0,-1-3 0</inkml:trace>
-</inkml:ink>
-</file>
-
-<file path=ppt/ink/ink112.xml><?xml version="1.0" encoding="utf-8"?>
-<inkml:ink xmlns:inkml="http://www.w3.org/2003/InkML">
-  <inkml:definitions>
-    <inkml:context xml:id="ctx0">
-      <inkml:inkSource xml:id="inkSrc0">
-        <inkml:traceFormat>
-          <inkml:channel name="X" type="integer" min="-2.14748E9" max="2.14748E9" units="cm"/>
-          <inkml:channel name="Y" type="integer" min="-2.14748E9" max="2.14748E9" units="cm"/>
-          <inkml:channel name="F" type="integer" max="32767" units="dev"/>
-        </inkml:traceFormat>
-        <inkml:channelProperties>
-          <inkml:channelProperty channel="X" name="resolution" value="1000" units="1/cm"/>
-          <inkml:channelProperty channel="Y" name="resolution" value="1000" units="1/cm"/>
-          <inkml:channelProperty channel="F" name="resolution" value="0" units="1/dev"/>
-        </inkml:channelProperties>
-      </inkml:inkSource>
       <inkml:timestamp xml:id="ts0" timeString="2022-09-11T15:13:50.284"/>
     </inkml:context>
     <inkml:brush xml:id="br0">
@@ -548,7 +494,7 @@
 </inkml:ink>
 </file>
 
-<file path=ppt/ink/ink113.xml><?xml version="1.0" encoding="utf-8"?>
+<file path=ppt/ink/ink111.xml><?xml version="1.0" encoding="utf-8"?>
 <inkml:ink xmlns:inkml="http://www.w3.org/2003/InkML">
   <inkml:definitions>
     <inkml:context xml:id="ctx0">
@@ -578,7 +524,7 @@
 </inkml:ink>
 </file>
 
-<file path=ppt/ink/ink114.xml><?xml version="1.0" encoding="utf-8"?>
+<file path=ppt/ink/ink112.xml><?xml version="1.0" encoding="utf-8"?>
 <inkml:ink xmlns:inkml="http://www.w3.org/2003/InkML">
   <inkml:definitions>
     <inkml:context xml:id="ctx0">
@@ -608,7 +554,7 @@
 </inkml:ink>
 </file>
 
-<file path=ppt/ink/ink115.xml><?xml version="1.0" encoding="utf-8"?>
+<file path=ppt/ink/ink113.xml><?xml version="1.0" encoding="utf-8"?>
 <inkml:ink xmlns:inkml="http://www.w3.org/2003/InkML">
   <inkml:definitions>
     <inkml:context xml:id="ctx0">
@@ -638,7 +584,7 @@
 </inkml:ink>
 </file>
 
-<file path=ppt/ink/ink116.xml><?xml version="1.0" encoding="utf-8"?>
+<file path=ppt/ink/ink114.xml><?xml version="1.0" encoding="utf-8"?>
 <inkml:ink xmlns:inkml="http://www.w3.org/2003/InkML">
   <inkml:definitions>
     <inkml:context xml:id="ctx0">
@@ -668,7 +614,7 @@
 </inkml:ink>
 </file>
 
-<file path=ppt/ink/ink117.xml><?xml version="1.0" encoding="utf-8"?>
+<file path=ppt/ink/ink115.xml><?xml version="1.0" encoding="utf-8"?>
 <inkml:ink xmlns:inkml="http://www.w3.org/2003/InkML">
   <inkml:definitions>
     <inkml:context xml:id="ctx0">
@@ -698,7 +644,7 @@
 </inkml:ink>
 </file>
 
-<file path=ppt/ink/ink118.xml><?xml version="1.0" encoding="utf-8"?>
+<file path=ppt/ink/ink116.xml><?xml version="1.0" encoding="utf-8"?>
 <inkml:ink xmlns:inkml="http://www.w3.org/2003/InkML">
   <inkml:definitions>
     <inkml:context xml:id="ctx0">
@@ -728,7 +674,7 @@
 </inkml:ink>
 </file>
 
-<file path=ppt/ink/ink119.xml><?xml version="1.0" encoding="utf-8"?>
+<file path=ppt/ink/ink117.xml><?xml version="1.0" encoding="utf-8"?>
 <inkml:ink xmlns:inkml="http://www.w3.org/2003/InkML">
   <inkml:definitions>
     <inkml:context xml:id="ctx0">
@@ -755,6 +701,66 @@
     </inkml:brush>
   </inkml:definitions>
   <inkml:trace contextRef="#ctx0" brushRef="#br0">608 0 16383,'11'41'0,"3"-8"0,1-22 0,1-4 0,3 1 0,5-4 0,-7 3 0,15-6 0,-10 5 0,7-5 0,-5 6 0,-4-2 0,-2-1 0,-3 2 0,0-1 0,-1 5 0,0 0 0,0 1 0,-1-2 0,1-5 0,7-1 0,-5-3 0,6 4 0,-5-4 0,-1 7 0,0-6 0,-2 5 0,3 1 0,-4 0 0,1 2 0,1-2 0,-4-1 0,4 1 0,1-4 0,-2 0 0,5-3 0,-5 0 0,3 0 0,-2 0 0,-1 0 0,5 0 0,-5 0 0,2 0 0,0 0 0,-2 0 0,4 0 0,-4 0 0,4 0 0,-5-3 0,5 2 0,-3-1 0,1 2 0,2 0 0,-5 0 0,-33 28 0,15-18 0,-28 21 0,23-21 0,5-2 0,-10 8 0,7-1 0,-10 7 0,7-4 0,-4 1 0,7-4 0,-2-1 0,3-2 0,-1 4 0,1-4 0,-3 5 0,3-3 0,-3-1 0,4 0 0,2 3 0,1-2 0,3 9 0,-3-11 0,2 7 0,-2-1 0,0-5 0,3 7 0,-6-7 0,5 3 0,-2 3 0,3-5 0,0 3 0,0-1 0,-3-2 0,-1 5 0,1-5 0,0 2 0,0 0 0,-1-2 0,1 3 0,-3-1 0,5-1 0,-5 1 0,3-1 0,-12-7 0,0 0 0,-5-8 0,6 0 0,-2 0 0,1 0 0,-3 0 0,-2 0 0,5 0 0,-3 0 0,0 0 0,6 0 0,-10-3 0,13-1 0,-10-2 0,5-1 0,-1 0 0,-5 0 0,4 2 0,-1 2 0,2 3 0,0-3 0,-2 2 0,1-5 0,-1 5 0,-1-6 0,3 6 0,-3-5 0,0 5 0,3-5 0,-7 5 0,7-2 0,-4 3 0,4-4 0,0 3 0,-10-5 0,8 5 0,-9-6 0,12 6 0,-1-5 0,-4 5 0,3-6 0,-2 6 0,3-5 0,0 5 0,1-5 0,-5 5 0,7-5 0,-6 5 0,0-5 0,5 5 0,-7-6 0,10 4 0,-5-5 0,-2 1 0,5 0 0,-5 3 0,3-2 0,-1 6 0,-6-3 0,6-1 0,1 4 0,-3-7 0,6 7 0,-7-3 0,0 0 0,3-1 0,-2 0 0,2-2 0,2 5 0,-6-5 0,5 5 0,-4-1 0,2 2 0,2 0 0,39-26 0,-15 14 0,34-18 0,-25 15 0,-3 7 0,2-3 0,-7 4 0,0-4 0,2 0 0,-4 0 0,4-2 0,-6 2 0,4-4 0,0 0 0,5-3 0,-1-2 0,0 0 0,1-3 0,-4 7 0,2-3 0,-5 4 0,1 4 0,-3-2 0,3-1 0,-2-2 0,2-1 0,1 2 0,-3 0 0,7-4 0,-7 4 0,6-4 0,-6 8 0,2 0 0,3-1 0,4 25 0,2-10 0,5 24 0,-7-8 0,6-2 0,-2 2 0,8-2 0,-4-1 0,9 2 0,-9-6 0,4 4 0,-9-7 0,3 2 0,-11-4 0,12 4 0,-15-4 0,10 3 0,-12 2 0,5-4 0,5 0 0,-2-5 0,7 1 0,-8-4 0,0 7 0,3-7 0,0 3 0</inkml:trace>
+</inkml:ink>
+</file>
+
+<file path=ppt/ink/ink118.xml><?xml version="1.0" encoding="utf-8"?>
+<inkml:ink xmlns:inkml="http://www.w3.org/2003/InkML">
+  <inkml:definitions>
+    <inkml:context xml:id="ctx0">
+      <inkml:inkSource xml:id="inkSrc0">
+        <inkml:traceFormat>
+          <inkml:channel name="X" type="integer" min="-2.14748E9" max="2.14748E9" units="cm"/>
+          <inkml:channel name="Y" type="integer" min="-2.14748E9" max="2.14748E9" units="cm"/>
+          <inkml:channel name="F" type="integer" max="32767" units="dev"/>
+        </inkml:traceFormat>
+        <inkml:channelProperties>
+          <inkml:channelProperty channel="X" name="resolution" value="1000" units="1/cm"/>
+          <inkml:channelProperty channel="Y" name="resolution" value="1000" units="1/cm"/>
+          <inkml:channelProperty channel="F" name="resolution" value="0" units="1/dev"/>
+        </inkml:channelProperties>
+      </inkml:inkSource>
+      <inkml:timestamp xml:id="ts0" timeString="2022-09-11T15:15:08.039"/>
+    </inkml:context>
+    <inkml:brush xml:id="br0">
+      <inkml:brushProperty name="width" value="0.3" units="cm"/>
+      <inkml:brushProperty name="height" value="0.6" units="cm"/>
+      <inkml:brushProperty name="color" value="#EF0C4D"/>
+      <inkml:brushProperty name="tip" value="rectangle"/>
+      <inkml:brushProperty name="rasterOp" value="maskPen"/>
+    </inkml:brush>
+  </inkml:definitions>
+  <inkml:trace contextRef="#ctx0" brushRef="#br0">46 0 16383,'56'0'0,"6"0"0,-29 0 0,9 0 0,24 0 0,-24 0 0,17 0 0,-34 0 0,7 0 0,-10 0 0,15 0 0,-16 0 0,22 0 0,-28 0 0,32 4 0,-27-3 0,33 5 0,-29-1 0,25 8 0,-32-1 0,3 1 0,-11-4 0,-40 5 0,15-1 0,-30 2 0,22 0 0,0-6 0,0 6 0,4-3 0,-3 1 0,7 1 0,-3-6 0,8 2 0,-3 1 0,0 0 0,2 3 0,-5 1 0,6-1 0,-4 1 0,4 4 0,-3-4 0,1 9 0,-2-5 0,-1 1 0,4-1 0,2-4 0,2 0 0,1-1 0,-3 3 0,3-6 0,-3 5 0,-3-5 0,5-1 0,-9 3 0,10-3 0,-2 3 0,-6 0 0,2-3 0,-6 0 0,4-3 0,1 1 0,0 2 0,-1-2 0,5 1 0,-7 2 0,5-4 0,-6 4 0,7-1 0,-3-2 0,3 6 0,-4-6 0,4 6 0,-2-3 0,5 0 0,1-42 0,4 14 0,3-33 0,4 26 0,-3-1 0,2 1 0,-3 0 0,0 4 0,0-3 0,0 7 0,0-2 0,0 3 0,0 1 0,-6 60 0,4-23 0,-9 51 0,6-33 0,-4-5 0,0 5 0,4-6 0,-2-5 0,6-1 0,-2-5 0,3-4 0,0-1 0,0-4 0,0-1 0,0 7 0,-3-8 0,2 7 0,-2-6 0,3 2 0,0 4 0,-3-8 0,2 7 0,18-10 0,-5 4 0,16-6 0,-9-3 0,-4 2 0,4-5 0,-4 6 0,0-6 0,3 2 0,-2 0 0,3-2 0,-4 2 0,-1-3 0,3 0 0,-2 0 0,1 0 0,9 0 0,-9 0 0,14 0 0,-14 0 0,2-6 0,-3 1 0,-1-2 0,1-2 0,-2 4 0,-2-12 0,0 1 0,0-9 0,3-9 0,4-9 0,11-8 0,-7 3 0,11-6 0,-13 11 0,3-5 0,-5 12 0,-2 7 0,-3 5 0,-2 4 0,-3 1 0,-1 5 0,7-14 0,-1 6 0,12-24 0,-11 23 0,9-12 0,-17 27 0,3-1 0</inkml:trace>
+</inkml:ink>
+</file>
+
+<file path=ppt/ink/ink119.xml><?xml version="1.0" encoding="utf-8"?>
+<inkml:ink xmlns:inkml="http://www.w3.org/2003/InkML">
+  <inkml:definitions>
+    <inkml:context xml:id="ctx0">
+      <inkml:inkSource xml:id="inkSrc0">
+        <inkml:traceFormat>
+          <inkml:channel name="X" type="integer" min="-2.14748E9" max="2.14748E9" units="cm"/>
+          <inkml:channel name="Y" type="integer" min="-2.14748E9" max="2.14748E9" units="cm"/>
+          <inkml:channel name="F" type="integer" max="32767" units="dev"/>
+        </inkml:traceFormat>
+        <inkml:channelProperties>
+          <inkml:channelProperty channel="X" name="resolution" value="1000" units="1/cm"/>
+          <inkml:channelProperty channel="Y" name="resolution" value="1000" units="1/cm"/>
+          <inkml:channelProperty channel="F" name="resolution" value="0" units="1/dev"/>
+        </inkml:channelProperties>
+      </inkml:inkSource>
+      <inkml:timestamp xml:id="ts0" timeString="2022-09-11T15:15:12.631"/>
+    </inkml:context>
+    <inkml:brush xml:id="br0">
+      <inkml:brushProperty name="width" value="0.3" units="cm"/>
+      <inkml:brushProperty name="height" value="0.6" units="cm"/>
+      <inkml:brushProperty name="color" value="#EF0C4D"/>
+      <inkml:brushProperty name="tip" value="rectangle"/>
+      <inkml:brushProperty name="rasterOp" value="maskPen"/>
+    </inkml:brush>
+  </inkml:definitions>
+  <inkml:trace contextRef="#ctx0" brushRef="#br0">550 1 16383,'54'51'0,"-5"-4"0,-3-19 0,-2-3 0,16 4 0,-2 2 0,11-2 0,3 18 0,-16-7 0,-1 1 0,18 24 0,-12-8 0,-6-3 0,-22-15 0,24 15 0,-42-41 0,8 0 0,-14-10 0,-17-37 0,11 19 0,-16-28 0,13 29 0,0 3 0,0-9 0,0 9 0,9-8 0,-1 6 0,5 6 0,3-2 0,-45 40 0,29-24 0,-37 26 0,30-27 0,-4-2 0,-9 12 0,-2 7 0,-11 15 0,-8 9 0,-8 11 0,-5-3 0,11-3 0,-4 6 0,13-17 0,-2 9 0,8-18 0,7-2 0,6-7 0,3-7 0,2 0 0,4-6 0,-6 0 0,-6-1 0,3-2 0,-9-3 0,12 2 0,-3-3 0,-2 4 0,5-3 0,-6-1 0,0-3 0,2 0 0,-3 0 0,0 0 0,3 0 0,-7 0 0,8 0 0,-4 0 0,4-3 0,0-1 0,-3-18 0,2 8 0,-3-15 0,4 13 0,-1-7 0,1 7 0,-1-7 0,-3 7 0,3-3 0,-3 3 0,5 2 0,-1 2 0,4 2 0,-3 0 0,4 2 0,-5-2 0,1-4 0,0 9 0,0-8 0,-3 6 0,1-1 0,-1-2 0,2 6 0,0-3 0,-2 6 0,1-2 0,-1 0 0,-1 2 0,6-2 0,-7 3 0,5 0 0,-1 0 0,-3 0 0,6 0 0,-6 0 0,1 0 0,4 0 0,-5 0 0,34-30 0,-7 11 0,22-25 0,-7 23 0,-10 2 0,4 4 0,-7 0 0,0 0 0,0 1 0,-3-5 0,-1 3 0,1-7 0,3 7 0,-3-7 0,3 3 0,-2-9 0,-1 4 0,0-4 0,0 5 0,0 0 0,0 4 0,0-3 0,0 3 0,0-9 0,0 3 0,1-3 0,2 9 0,-3 1 0,3 5 0,-4-1 0,0 1 0,13 41 0,-14-13 0,14 40 0,-15-24 0,0 0 0,2-1 0,-6-5 0,3 0 0,-1-4 0,-2-1 0,5-4 0,-5-1 0,5 4 0,1-3 0,4-1 0,7-4 0,2-6 0,9 4 0,1-7 0,23 7 0,-13-6 0,19 2 0,-11 1 0,1-4 0,-1 8 0,-8-5 0,-5 1 0,0 3 0,-5-7 0,-1 3 0,-5 0 0,-4-4 0,4 4 0,-5-4 0,1 0 0,3 0 0,-7 0 0,3 0 0,-4 0 0,-1-3 0,1-1 0,0-4 0,-1 1 0,1 0 0,-4-4 0,6 0 0,-8 0 0,7 1 0,-6 1 0,4-5 0,-4 2 0,0-1 0,2 1 0,-3 4 0,6-7 0,-5 4 0,0 1 0,5 1 0,-2 5 0,3 1 0,0-3 0,-3 1 0,3-2 0,0 4 0</inkml:trace>
 </inkml:ink>
 </file>
 
@@ -801,66 +807,6 @@
           <inkml:channelProperty channel="F" name="resolution" value="0" units="1/dev"/>
         </inkml:channelProperties>
       </inkml:inkSource>
-      <inkml:timestamp xml:id="ts0" timeString="2022-09-11T15:15:08.039"/>
-    </inkml:context>
-    <inkml:brush xml:id="br0">
-      <inkml:brushProperty name="width" value="0.3" units="cm"/>
-      <inkml:brushProperty name="height" value="0.6" units="cm"/>
-      <inkml:brushProperty name="color" value="#EF0C4D"/>
-      <inkml:brushProperty name="tip" value="rectangle"/>
-      <inkml:brushProperty name="rasterOp" value="maskPen"/>
-    </inkml:brush>
-  </inkml:definitions>
-  <inkml:trace contextRef="#ctx0" brushRef="#br0">46 0 16383,'56'0'0,"6"0"0,-29 0 0,9 0 0,24 0 0,-24 0 0,17 0 0,-34 0 0,7 0 0,-10 0 0,15 0 0,-16 0 0,22 0 0,-28 0 0,32 4 0,-27-3 0,33 5 0,-29-1 0,25 8 0,-32-1 0,3 1 0,-11-4 0,-40 5 0,15-1 0,-30 2 0,22 0 0,0-6 0,0 6 0,4-3 0,-3 1 0,7 1 0,-3-6 0,8 2 0,-3 1 0,0 0 0,2 3 0,-5 1 0,6-1 0,-4 1 0,4 4 0,-3-4 0,1 9 0,-2-5 0,-1 1 0,4-1 0,2-4 0,2 0 0,1-1 0,-3 3 0,3-6 0,-3 5 0,-3-5 0,5-1 0,-9 3 0,10-3 0,-2 3 0,-6 0 0,2-3 0,-6 0 0,4-3 0,1 1 0,0 2 0,-1-2 0,5 1 0,-7 2 0,5-4 0,-6 4 0,7-1 0,-3-2 0,3 6 0,-4-6 0,4 6 0,-2-3 0,5 0 0,1-42 0,4 14 0,3-33 0,4 26 0,-3-1 0,2 1 0,-3 0 0,0 4 0,0-3 0,0 7 0,0-2 0,0 3 0,0 1 0,-6 60 0,4-23 0,-9 51 0,6-33 0,-4-5 0,0 5 0,4-6 0,-2-5 0,6-1 0,-2-5 0,3-4 0,0-1 0,0-4 0,0-1 0,0 7 0,-3-8 0,2 7 0,-2-6 0,3 2 0,0 4 0,-3-8 0,2 7 0,18-10 0,-5 4 0,16-6 0,-9-3 0,-4 2 0,4-5 0,-4 6 0,0-6 0,3 2 0,-2 0 0,3-2 0,-4 2 0,-1-3 0,3 0 0,-2 0 0,1 0 0,9 0 0,-9 0 0,14 0 0,-14 0 0,2-6 0,-3 1 0,-1-2 0,1-2 0,-2 4 0,-2-12 0,0 1 0,0-9 0,3-9 0,4-9 0,11-8 0,-7 3 0,11-6 0,-13 11 0,3-5 0,-5 12 0,-2 7 0,-3 5 0,-2 4 0,-3 1 0,-1 5 0,7-14 0,-1 6 0,12-24 0,-11 23 0,9-12 0,-17 27 0,3-1 0</inkml:trace>
-</inkml:ink>
-</file>
-
-<file path=ppt/ink/ink121.xml><?xml version="1.0" encoding="utf-8"?>
-<inkml:ink xmlns:inkml="http://www.w3.org/2003/InkML">
-  <inkml:definitions>
-    <inkml:context xml:id="ctx0">
-      <inkml:inkSource xml:id="inkSrc0">
-        <inkml:traceFormat>
-          <inkml:channel name="X" type="integer" min="-2.14748E9" max="2.14748E9" units="cm"/>
-          <inkml:channel name="Y" type="integer" min="-2.14748E9" max="2.14748E9" units="cm"/>
-          <inkml:channel name="F" type="integer" max="32767" units="dev"/>
-        </inkml:traceFormat>
-        <inkml:channelProperties>
-          <inkml:channelProperty channel="X" name="resolution" value="1000" units="1/cm"/>
-          <inkml:channelProperty channel="Y" name="resolution" value="1000" units="1/cm"/>
-          <inkml:channelProperty channel="F" name="resolution" value="0" units="1/dev"/>
-        </inkml:channelProperties>
-      </inkml:inkSource>
-      <inkml:timestamp xml:id="ts0" timeString="2022-09-11T15:15:12.631"/>
-    </inkml:context>
-    <inkml:brush xml:id="br0">
-      <inkml:brushProperty name="width" value="0.3" units="cm"/>
-      <inkml:brushProperty name="height" value="0.6" units="cm"/>
-      <inkml:brushProperty name="color" value="#EF0C4D"/>
-      <inkml:brushProperty name="tip" value="rectangle"/>
-      <inkml:brushProperty name="rasterOp" value="maskPen"/>
-    </inkml:brush>
-  </inkml:definitions>
-  <inkml:trace contextRef="#ctx0" brushRef="#br0">550 1 16383,'54'51'0,"-5"-4"0,-3-19 0,-2-3 0,16 4 0,-2 2 0,11-2 0,3 18 0,-16-7 0,-1 1 0,18 24 0,-12-8 0,-6-3 0,-22-15 0,24 15 0,-42-41 0,8 0 0,-14-10 0,-17-37 0,11 19 0,-16-28 0,13 29 0,0 3 0,0-9 0,0 9 0,9-8 0,-1 6 0,5 6 0,3-2 0,-45 40 0,29-24 0,-37 26 0,30-27 0,-4-2 0,-9 12 0,-2 7 0,-11 15 0,-8 9 0,-8 11 0,-5-3 0,11-3 0,-4 6 0,13-17 0,-2 9 0,8-18 0,7-2 0,6-7 0,3-7 0,2 0 0,4-6 0,-6 0 0,-6-1 0,3-2 0,-9-3 0,12 2 0,-3-3 0,-2 4 0,5-3 0,-6-1 0,0-3 0,2 0 0,-3 0 0,0 0 0,3 0 0,-7 0 0,8 0 0,-4 0 0,4-3 0,0-1 0,-3-18 0,2 8 0,-3-15 0,4 13 0,-1-7 0,1 7 0,-1-7 0,-3 7 0,3-3 0,-3 3 0,5 2 0,-1 2 0,4 2 0,-3 0 0,4 2 0,-5-2 0,1-4 0,0 9 0,0-8 0,-3 6 0,1-1 0,-1-2 0,2 6 0,0-3 0,-2 6 0,1-2 0,-1 0 0,-1 2 0,6-2 0,-7 3 0,5 0 0,-1 0 0,-3 0 0,6 0 0,-6 0 0,1 0 0,4 0 0,-5 0 0,34-30 0,-7 11 0,22-25 0,-7 23 0,-10 2 0,4 4 0,-7 0 0,0 0 0,0 1 0,-3-5 0,-1 3 0,1-7 0,3 7 0,-3-7 0,3 3 0,-2-9 0,-1 4 0,0-4 0,0 5 0,0 0 0,0 4 0,0-3 0,0 3 0,0-9 0,0 3 0,1-3 0,2 9 0,-3 1 0,3 5 0,-4-1 0,0 1 0,13 41 0,-14-13 0,14 40 0,-15-24 0,0 0 0,2-1 0,-6-5 0,3 0 0,-1-4 0,-2-1 0,5-4 0,-5-1 0,5 4 0,1-3 0,4-1 0,7-4 0,2-6 0,9 4 0,1-7 0,23 7 0,-13-6 0,19 2 0,-11 1 0,1-4 0,-1 8 0,-8-5 0,-5 1 0,0 3 0,-5-7 0,-1 3 0,-5 0 0,-4-4 0,4 4 0,-5-4 0,1 0 0,3 0 0,-7 0 0,3 0 0,-4 0 0,-1-3 0,1-1 0,0-4 0,-1 1 0,1 0 0,-4-4 0,6 0 0,-8 0 0,7 1 0,-6 1 0,4-5 0,-4 2 0,0-1 0,2 1 0,-3 4 0,6-7 0,-5 4 0,0 1 0,5 1 0,-2 5 0,3 1 0,0-3 0,-3 1 0,3-2 0,0 4 0</inkml:trace>
-</inkml:ink>
-</file>
-
-<file path=ppt/ink/ink122.xml><?xml version="1.0" encoding="utf-8"?>
-<inkml:ink xmlns:inkml="http://www.w3.org/2003/InkML">
-  <inkml:definitions>
-    <inkml:context xml:id="ctx0">
-      <inkml:inkSource xml:id="inkSrc0">
-        <inkml:traceFormat>
-          <inkml:channel name="X" type="integer" min="-2.14748E9" max="2.14748E9" units="cm"/>
-          <inkml:channel name="Y" type="integer" min="-2.14748E9" max="2.14748E9" units="cm"/>
-          <inkml:channel name="F" type="integer" max="32767" units="dev"/>
-        </inkml:traceFormat>
-        <inkml:channelProperties>
-          <inkml:channelProperty channel="X" name="resolution" value="1000" units="1/cm"/>
-          <inkml:channelProperty channel="Y" name="resolution" value="1000" units="1/cm"/>
-          <inkml:channelProperty channel="F" name="resolution" value="0" units="1/dev"/>
-        </inkml:channelProperties>
-      </inkml:inkSource>
       <inkml:timestamp xml:id="ts0" timeString="2022-09-11T15:15:17.923"/>
     </inkml:context>
     <inkml:brush xml:id="br0">
@@ -875,7 +821,7 @@
 </inkml:ink>
 </file>
 
-<file path=ppt/ink/ink123.xml><?xml version="1.0" encoding="utf-8"?>
+<file path=ppt/ink/ink121.xml><?xml version="1.0" encoding="utf-8"?>
 <inkml:ink xmlns:inkml="http://www.w3.org/2003/InkML">
   <inkml:definitions>
     <inkml:context xml:id="ctx0">
@@ -905,7 +851,7 @@
 </inkml:ink>
 </file>
 
-<file path=ppt/ink/ink124.xml><?xml version="1.0" encoding="utf-8"?>
+<file path=ppt/ink/ink122.xml><?xml version="1.0" encoding="utf-8"?>
 <inkml:ink xmlns:inkml="http://www.w3.org/2003/InkML">
   <inkml:definitions>
     <inkml:context xml:id="ctx0">
@@ -935,7 +881,7 @@
 </inkml:ink>
 </file>
 
-<file path=ppt/ink/ink125.xml><?xml version="1.0" encoding="utf-8"?>
+<file path=ppt/ink/ink123.xml><?xml version="1.0" encoding="utf-8"?>
 <inkml:ink xmlns:inkml="http://www.w3.org/2003/InkML">
   <inkml:definitions>
     <inkml:context xml:id="ctx0">
@@ -965,7 +911,7 @@
 </inkml:ink>
 </file>
 
-<file path=ppt/ink/ink126.xml><?xml version="1.0" encoding="utf-8"?>
+<file path=ppt/ink/ink124.xml><?xml version="1.0" encoding="utf-8"?>
 <inkml:ink xmlns:inkml="http://www.w3.org/2003/InkML">
   <inkml:definitions>
     <inkml:context xml:id="ctx0">
@@ -995,7 +941,7 @@
 </inkml:ink>
 </file>
 
-<file path=ppt/ink/ink127.xml><?xml version="1.0" encoding="utf-8"?>
+<file path=ppt/ink/ink125.xml><?xml version="1.0" encoding="utf-8"?>
 <inkml:ink xmlns:inkml="http://www.w3.org/2003/InkML">
   <inkml:definitions>
     <inkml:context xml:id="ctx0">
@@ -1022,7 +968,7 @@
 </inkml:ink>
 </file>
 
-<file path=ppt/ink/ink128.xml><?xml version="1.0" encoding="utf-8"?>
+<file path=ppt/ink/ink126.xml><?xml version="1.0" encoding="utf-8"?>
 <inkml:ink xmlns:inkml="http://www.w3.org/2003/InkML">
   <inkml:definitions>
     <inkml:context xml:id="ctx0">
@@ -1049,7 +995,7 @@
 </inkml:ink>
 </file>
 
-<file path=ppt/ink/ink129.xml><?xml version="1.0" encoding="utf-8"?>
+<file path=ppt/ink/ink127.xml><?xml version="1.0" encoding="utf-8"?>
 <inkml:ink xmlns:inkml="http://www.w3.org/2003/InkML">
   <inkml:definitions>
     <inkml:context xml:id="ctx0">
@@ -1076,6 +1022,64 @@
     </inkml:brush>
   </inkml:definitions>
   <inkml:trace contextRef="#ctx0" brushRef="#br0">146 1 16383,'40'26'0,"1"-3"0,-15-15 0,7 1 0,29-2 0,5 0 0,-8-1 0,22-1 0,-1-1 0,-28-4 0,1 2 0,1 0 0,20-1 0,8 3 0,-34-4 0,-2 0 0,-22 0 0,23 0 0,-29 0 0,23 0 0,-23-4 0,19 4 0,-20-4 0,31 4 0,-27 0 0,24-3 0,-29 2 0,14-5 0,-13 5 0,24-5 0,-23 5 0,15-2 0,-21 3 0,3-3 0,1 2 0,-2-2 0,8 6 0,-11 17 0,-1-6 0,-3 14 0,-3-14 0,0 1 0,2-1 0,-5 3 0,2-2 0,0 1 0,-2 2 0,5-3 0,-5 8 0,6-7 0,-7 3 0,4-2 0,0 8 0,0-5 0,1 7 0,1-11 0,-5 3 0,2-4 0,-3-1 0,3 3 0,-2 1 0,2 0 0,0-4 0,4 2 0,0-5 0,0 6 0,2-4 0,-2-3 0,12-4 0,-4-3 0,1-3 0,-56 0 0,20 0 0,-46 0 0,41 0 0,-9 0 0,4 0 0,-5-4 0,0-1 0,0-3 0,0-1 0,0-4 0,5 4 0,1 0 0,5 2 0,4 3 0,-3-1 0,7-1 0,-3 5 0,0-2 0,3 3 0,-2 0 0,0 0 0,-2 0 0,2 0 0,-1 0 0,4 0 0,0 0 0,-3 0 0,2 0 0,-3 0 0,0 0 0,3-4 0,-7 0 0,8-3 0,-8-1 0,3 0 0,-4 0 0,4-3 0,-3 2 0,3-5 0,-5 5 0,1-3 0,4 4 0,-3 0 0,3 4 0,-4-3 0,-5 6 0,4-2 0,-9 3 0,4 0 0,0-4 0,-4 3 0,9-2 0,-4 3 0,4-4 0,1 3 0,0-6 0,4 6 0,-3-6 0,7 6 0,-7-3 0,8 4 0,-8 0 0,7 0 0,-3 0 0,4 0 0,1 0 0,-2 0 0,2 0 0,-5 0 0,1 7 0,3-6 0,-5 12 0,12-9 0,-9 6 0,4 0 0,1-5 0,0 12 0,5-9 0,1 11 0,2-3 0,-2-5 0,6 7 0,17-7 0,-2-1 0,14-4 0,-6-6 0,-7 0 0,3 3 0,-4-2 0,-1 5 0,1-2 0,3 4 0,-3-4 0,3 2 0,-4-5 0,0 5 0,7-5 0,-9 2 0,7-3 0,-6 3 0,2-2 0,8 5 0,-7-5 0,10 2 0,-11-3 0,4 3 0,-4-2 0,0 2 0,4-3 0,-4 3 0,4 2 0,-4 2 0,-1 0 0,5 1 0,-3-1 0,3-2 0,0 1 0,1-1 0,0 3 0,3-4 0,-3 3 0,4-6 0,-4 6 0,3-3 0,-3 4 0,4 0 0,5 0 0,-4 0 0,9 1 0,-9-1 0,9 1 0,-8-1 0,9 3 0,-9-2 0,4 3 0,-10-5 0,3-2 0,-7 1 0,7-5 0,-7 6 0,3-7 0,-4 4 0,-1-4 0,5 0 0,-3 0 0,3 0 0,-1 0 0,-2 0 0,7 0 0,-7 0 0,2 0 0,-3 0 0,0 0 0,6 0 0,-5 0 0,5 0 0,-6 0 0,0 0 0,6 0 0,-5 0 0,2 0 0,-2 0 0,-5 0 0,11 0 0,-2 0 0,5 0 0,-1-7 0,-4 5 0,-1-9 0,-5 11 0,1-4 0,2 1 0,1 0 0</inkml:trace>
+</inkml:ink>
+</file>
+
+<file path=ppt/ink/ink128.xml><?xml version="1.0" encoding="utf-8"?>
+<inkml:ink xmlns:inkml="http://www.w3.org/2003/InkML">
+  <inkml:definitions>
+    <inkml:context xml:id="ctx0">
+      <inkml:inkSource xml:id="inkSrc0">
+        <inkml:traceFormat>
+          <inkml:channel name="X" type="integer" min="-2.14748E9" max="2.14748E9" units="cm"/>
+          <inkml:channel name="Y" type="integer" min="-2.14748E9" max="2.14748E9" units="cm"/>
+          <inkml:channel name="F" type="integer" max="32767" units="dev"/>
+        </inkml:traceFormat>
+        <inkml:channelProperties>
+          <inkml:channelProperty channel="X" name="resolution" value="1000" units="1/cm"/>
+          <inkml:channelProperty channel="Y" name="resolution" value="1000" units="1/cm"/>
+          <inkml:channelProperty channel="F" name="resolution" value="0" units="1/dev"/>
+        </inkml:channelProperties>
+      </inkml:inkSource>
+      <inkml:timestamp xml:id="ts0" timeString="2022-09-11T15:16:56.493"/>
+    </inkml:context>
+    <inkml:brush xml:id="br0">
+      <inkml:brushProperty name="width" value="0.3" units="cm"/>
+      <inkml:brushProperty name="height" value="0.6" units="cm"/>
+      <inkml:brushProperty name="tip" value="rectangle"/>
+      <inkml:brushProperty name="rasterOp" value="maskPen"/>
+    </inkml:brush>
+  </inkml:definitions>
+  <inkml:trace contextRef="#ctx0" brushRef="#br0">1 299 16383,'47'0'0,"-9"0"0,-10 0 0,-2 0 0,4 0 0,4 0 0,2 0 0,43 0 0,-23 0 0,24 0 0,-34 0 0,37 0 0,-36 0 0,49 0 0,-62-8 0,8 0 0,-4-12 0,-4 3 0,-1-2 0,16-6 0,-25 7 0,28-17 0,-28 21 0,25-18 0,-34 23 0,19-12 0,-26 17 0,7-8 0,-2 2 0,-2 2 0,4-6 0,-4 9 0,4-2 0,2 5 0,0 2 0,-1 0 0,0 0 0,-2 0 0,5 0 0,-6 0 0,3-6 0,0 1 0,-77 10 0,26-1 0,-56 12 0,32-6 0,10 0 0,-12 0 0,0 0 0,6-4 0,7-2 0,2-4 0,14 0 0,-7 0 0,18 0 0,-7 0 0,12 0 0,-3 0 0,2 0 0,5 0 0,-8 4 0,5 0 0,-3 3 0,4 0 0,1 0 0,3 3 0,-4-3 0,-7 10 0,4-5 0,-4 7 0,5 0 0,1 0 0,-1 6 0,0-1 0,0 0 0,3-4 0,-2 3 0,7-3 0,-4 0 0,4 8 0,-3-7 0,-3 13 0,-3 1 0,-1 2 0,-5 9 0,4-10 0,-4 10 0,9-10 0,-2 0 0,7-11 0,-2-10 0,7-1 0,1-1 0,9 5 0,1-2 0,4-6 0,4-1 0,-1-5 0,3 0 0,3 5 0,-9-5 0,6 3 0,-3 2 0,-2-7 0,7 7 0,-5-2 0,4 1 0,4 2 0,-7 1 0,4 1 0,-4 2 0,0 1 0,-4-4 0,-1-1 0,0 3 0,-6 2 0,3 4 0,-7-2 0,0-2 0,0-1 0,0 5 0,0-3 0,0 7 0,0-7 0,0 3 0,-4-5 0,3 1 0,-5 2 0,6-2 0,-6 0 0,2 2 0,0-3 0,-2 3 0,2-4 0,-5 0 0,2 2 0,0-1 0,29-2 0,-13-5 0,19-4 0,-15-3 0,-1 0 0,12 0 0,-4 0 0,7 0 0,-3 0 0,0-8 0,0 3 0,0-10 0,1 2 0,-1 1 0,0-3 0,0 2 0,0 1 0,0-3 0,-4 6 0,3-6 0,-3 6 0,0-2 0,-1 3 0,-8 1 0,6 0 0,-6 0 0,6 1 0,-2 2 0,-2-5 0,8 4 0,-9-2 0,9 1 0,-10 2 0,6-3 0,-1 0 0,1 0 0,-2-1 0,0 1 0,-1-4 0,5 3 0,-3-3 0,3 3 0,-8 1 0,3 0 0,0 1 0,1 2 0,1-2 0,-2 5 0,3-5 0,2 5 0,-5-2 0,3-1 0,-4 4 0,2-7 0,4 7 0,-5-6 0,2 5 0,1-8 0,-1 7 0,-2-7 0,2 8 0,-5-4 0,0-12 0,-5 3 0,-6-10 0,3 9 0,-2 1 0,2-3 0,-3 3 0,0-7 0,0-3 0,0-1 0,0-4 0,0 5 0,0-5 0,0-1 0,0 0 0,-3-10 0,2 17 0,-3-3 0,4 16 0,-14 3 0,-2 10 0,-4-2 0,1 10 0,11-5 0,-6 2 0,0 5 0,-1-4 0,-3 5 0,3-7 0,-4 5 0,-1-4 0,-4 7 0,-5-2 0,-1 0 0,-5 4 0,0-7 0,0 6 0,5-6 0,1 2 0,9-4 0,1-1 0,8-3 0,-5 3 0,2-1 0,-2 1 0,0 2 0,-1-2 0,6-1 0,-8 1 0,8 0 0,-6-1 0,0 4 0,3-3 0,-4 4 0,4-1 0,3-2 0,-3 3 0,3-2 0,0 2 0,-4-4 0,-3-1 0,6-6 0,-1 0 0</inkml:trace>
+</inkml:ink>
+</file>
+
+<file path=ppt/ink/ink129.xml><?xml version="1.0" encoding="utf-8"?>
+<inkml:ink xmlns:inkml="http://www.w3.org/2003/InkML">
+  <inkml:definitions>
+    <inkml:context xml:id="ctx0">
+      <inkml:inkSource xml:id="inkSrc0">
+        <inkml:traceFormat>
+          <inkml:channel name="X" type="integer" min="-2.14748E9" max="2.14748E9" units="cm"/>
+          <inkml:channel name="Y" type="integer" min="-2.14748E9" max="2.14748E9" units="cm"/>
+          <inkml:channel name="F" type="integer" max="32767" units="dev"/>
+        </inkml:traceFormat>
+        <inkml:channelProperties>
+          <inkml:channelProperty channel="X" name="resolution" value="1000" units="1/cm"/>
+          <inkml:channelProperty channel="Y" name="resolution" value="1000" units="1/cm"/>
+          <inkml:channelProperty channel="F" name="resolution" value="0" units="1/dev"/>
+        </inkml:channelProperties>
+      </inkml:inkSource>
+      <inkml:timestamp xml:id="ts0" timeString="2022-09-11T15:17:03.604"/>
+    </inkml:context>
+    <inkml:brush xml:id="br0">
+      <inkml:brushProperty name="width" value="0.3" units="cm"/>
+      <inkml:brushProperty name="height" value="0.6" units="cm"/>
+      <inkml:brushProperty name="tip" value="rectangle"/>
+      <inkml:brushProperty name="rasterOp" value="maskPen"/>
+    </inkml:brush>
+  </inkml:definitions>
+  <inkml:trace contextRef="#ctx0" brushRef="#br0">996 1 16383,'-20'53'0,"4"-6"0,-5-22 0,-6 11 0,5-13 0,-7 17 0,5-17 0,2 3 0,2-6 0,0-1 0,1-3 0,-3 9 0,2-5 0,-5 7 0,-4 9 0,1-7 0,-17 25 0,20-24 0,-19 24 0,16-20 0,-11 9 0,1-5 0,4 0 0,2-5 0,6-6 0,5-3 0,2-8 0,3 3 0,2-4 0,2-4 0,2 3 0,0-6 0,2 8 0,-2-5 0,1 2 0,1 2 0,-4-5 0,2 3 0,-3-4 0,0-2 0,37 9 0,-15-3 0,35 9 0,-28-3 0,8-2 0,-8 2 0,8 1 0,-8-4 0,4 4 0,-6-5 0,1-1 0,0-2 0,-1 2 0,-3-6 0,7 2 0,-5 1 0,10-2 0,-3 2 0,0 0 0,3 1 0,-8-1 0,8 5 0,-7-5 0,3 4 0,-8-3 0,-1-2 0,3 2 0,-5-1 0,7 2 0,-5-4 0,2 1 0,-1 1 0,2 6 0,-5-2 0,2-1 0,-3 0 0,3-4 0,-2 8 0,-2-4 0,0 2 0,6-5 0,0-2 0,7-3 0,-6 1 0,0 2 0,7-4 0,-5 1 0,5-6 0,-1 0 0,-7 0 0,6 0 0,-4 0 0,0 0 0,5-10 0,-8 1 0,3-13 0,1 6 0,-2-7 0,7-3 0,-3 1 0,4-5 0,-4 6 0,4-1 0,-9 5 0,2 1 0,-6 8 0,2 1 0,3-6 0,-5 7 0,5-11 0,-6 9 0,1-8 0,3-1 0,1 0 0,4-3 0,0 3 0,-4 0 0,-1 1 0,0 5 0,-3-1 0,2 0 0,1 1 0,-3 3 0,6-3 0,-3 3 0,0 0 0,2-2 0,-3 2 0,4 4 0,2-8 0,-5 9 0,2-11 0,-2 10 0,3-10 0,-2 8 0,4-4 0,-22-6 0,3 9 0,-11-12 0,0 11 0,2-1 0,-2-2 0,-1 3 0,4-4 0,-4-4 0,7 4 0,-3-4 0,3 0 0,1 3 0,-1-3 0,0 1 0,1 2 0,-1-3 0,4 0 0,-2 3 0,2-2 0,0 3 0,-3-4 0,3 3 0,-1-3 0,-4 2 0,4 1 0,-2 2 0,-5-2 0,7 8 0,-8-7 0,-2 10 0,4-1 0,-9 6 0,3 0 0,2 7 0,-7 2 0,0 16 0,-4 3 0,-3 14 0,1 1 0,-7 13 0,10-13 0,-10 17 0,11-17 0,-5 10 0,1-10 0,8-7 0,0-6 0,11-10 0,1-4 0,2-3 0,40-20 0,-25 10 0,29-14 0,-94 7 0,28-5 0,-57-5 0,49-4 0,-6-5 0,7 4 0,3-2 0,3 4 0,5 4 0,8 2 0,-2 4 0,10 0 0,-10 3 0,4 1 0,-3 3 0,-1 0 0,7 0 0,-8 0 0,1 0 0,4 3 0,-5-2 0,7 5 0,-4-2 0,-1 5 0,3-1 0,0 1 0,1-1 0,-1-1 0,-1 3 0,-2-3 0,7 3 0,-5-4 0,2 0 0,-4-2 0,-1-1 0,4-3 0,-2 0 0,0 3 0,2-3 0,-5 3 0,5 0 0,-1-2 0,2 2 0</inkml:trace>
 </inkml:ink>
 </file>
 
@@ -1122,64 +1126,6 @@
           <inkml:channelProperty channel="F" name="resolution" value="0" units="1/dev"/>
         </inkml:channelProperties>
       </inkml:inkSource>
-      <inkml:timestamp xml:id="ts0" timeString="2022-09-11T15:16:56.493"/>
-    </inkml:context>
-    <inkml:brush xml:id="br0">
-      <inkml:brushProperty name="width" value="0.3" units="cm"/>
-      <inkml:brushProperty name="height" value="0.6" units="cm"/>
-      <inkml:brushProperty name="tip" value="rectangle"/>
-      <inkml:brushProperty name="rasterOp" value="maskPen"/>
-    </inkml:brush>
-  </inkml:definitions>
-  <inkml:trace contextRef="#ctx0" brushRef="#br0">1 299 16383,'47'0'0,"-9"0"0,-10 0 0,-2 0 0,4 0 0,4 0 0,2 0 0,43 0 0,-23 0 0,24 0 0,-34 0 0,37 0 0,-36 0 0,49 0 0,-62-8 0,8 0 0,-4-12 0,-4 3 0,-1-2 0,16-6 0,-25 7 0,28-17 0,-28 21 0,25-18 0,-34 23 0,19-12 0,-26 17 0,7-8 0,-2 2 0,-2 2 0,4-6 0,-4 9 0,4-2 0,2 5 0,0 2 0,-1 0 0,0 0 0,-2 0 0,5 0 0,-6 0 0,3-6 0,0 1 0,-77 10 0,26-1 0,-56 12 0,32-6 0,10 0 0,-12 0 0,0 0 0,6-4 0,7-2 0,2-4 0,14 0 0,-7 0 0,18 0 0,-7 0 0,12 0 0,-3 0 0,2 0 0,5 0 0,-8 4 0,5 0 0,-3 3 0,4 0 0,1 0 0,3 3 0,-4-3 0,-7 10 0,4-5 0,-4 7 0,5 0 0,1 0 0,-1 6 0,0-1 0,0 0 0,3-4 0,-2 3 0,7-3 0,-4 0 0,4 8 0,-3-7 0,-3 13 0,-3 1 0,-1 2 0,-5 9 0,4-10 0,-4 10 0,9-10 0,-2 0 0,7-11 0,-2-10 0,7-1 0,1-1 0,9 5 0,1-2 0,4-6 0,4-1 0,-1-5 0,3 0 0,3 5 0,-9-5 0,6 3 0,-3 2 0,-2-7 0,7 7 0,-5-2 0,4 1 0,4 2 0,-7 1 0,4 1 0,-4 2 0,0 1 0,-4-4 0,-1-1 0,0 3 0,-6 2 0,3 4 0,-7-2 0,0-2 0,0-1 0,0 5 0,0-3 0,0 7 0,0-7 0,0 3 0,-4-5 0,3 1 0,-5 2 0,6-2 0,-6 0 0,2 2 0,0-3 0,-2 3 0,2-4 0,-5 0 0,2 2 0,0-1 0,29-2 0,-13-5 0,19-4 0,-15-3 0,-1 0 0,12 0 0,-4 0 0,7 0 0,-3 0 0,0-8 0,0 3 0,0-10 0,1 2 0,-1 1 0,0-3 0,0 2 0,0 1 0,0-3 0,-4 6 0,3-6 0,-3 6 0,0-2 0,-1 3 0,-8 1 0,6 0 0,-6 0 0,6 1 0,-2 2 0,-2-5 0,8 4 0,-9-2 0,9 1 0,-10 2 0,6-3 0,-1 0 0,1 0 0,-2-1 0,0 1 0,-1-4 0,5 3 0,-3-3 0,3 3 0,-8 1 0,3 0 0,0 1 0,1 2 0,1-2 0,-2 5 0,3-5 0,2 5 0,-5-2 0,3-1 0,-4 4 0,2-7 0,4 7 0,-5-6 0,2 5 0,1-8 0,-1 7 0,-2-7 0,2 8 0,-5-4 0,0-12 0,-5 3 0,-6-10 0,3 9 0,-2 1 0,2-3 0,-3 3 0,0-7 0,0-3 0,0-1 0,0-4 0,0 5 0,0-5 0,0-1 0,0 0 0,-3-10 0,2 17 0,-3-3 0,4 16 0,-14 3 0,-2 10 0,-4-2 0,1 10 0,11-5 0,-6 2 0,0 5 0,-1-4 0,-3 5 0,3-7 0,-4 5 0,-1-4 0,-4 7 0,-5-2 0,-1 0 0,-5 4 0,0-7 0,0 6 0,5-6 0,1 2 0,9-4 0,1-1 0,8-3 0,-5 3 0,2-1 0,-2 1 0,0 2 0,-1-2 0,6-1 0,-8 1 0,8 0 0,-6-1 0,0 4 0,3-3 0,-4 4 0,4-1 0,3-2 0,-3 3 0,3-2 0,0 2 0,-4-4 0,-3-1 0,6-6 0,-1 0 0</inkml:trace>
-</inkml:ink>
-</file>
-
-<file path=ppt/ink/ink131.xml><?xml version="1.0" encoding="utf-8"?>
-<inkml:ink xmlns:inkml="http://www.w3.org/2003/InkML">
-  <inkml:definitions>
-    <inkml:context xml:id="ctx0">
-      <inkml:inkSource xml:id="inkSrc0">
-        <inkml:traceFormat>
-          <inkml:channel name="X" type="integer" min="-2.14748E9" max="2.14748E9" units="cm"/>
-          <inkml:channel name="Y" type="integer" min="-2.14748E9" max="2.14748E9" units="cm"/>
-          <inkml:channel name="F" type="integer" max="32767" units="dev"/>
-        </inkml:traceFormat>
-        <inkml:channelProperties>
-          <inkml:channelProperty channel="X" name="resolution" value="1000" units="1/cm"/>
-          <inkml:channelProperty channel="Y" name="resolution" value="1000" units="1/cm"/>
-          <inkml:channelProperty channel="F" name="resolution" value="0" units="1/dev"/>
-        </inkml:channelProperties>
-      </inkml:inkSource>
-      <inkml:timestamp xml:id="ts0" timeString="2022-09-11T15:17:03.604"/>
-    </inkml:context>
-    <inkml:brush xml:id="br0">
-      <inkml:brushProperty name="width" value="0.3" units="cm"/>
-      <inkml:brushProperty name="height" value="0.6" units="cm"/>
-      <inkml:brushProperty name="tip" value="rectangle"/>
-      <inkml:brushProperty name="rasterOp" value="maskPen"/>
-    </inkml:brush>
-  </inkml:definitions>
-  <inkml:trace contextRef="#ctx0" brushRef="#br0">996 1 16383,'-20'53'0,"4"-6"0,-5-22 0,-6 11 0,5-13 0,-7 17 0,5-17 0,2 3 0,2-6 0,0-1 0,1-3 0,-3 9 0,2-5 0,-5 7 0,-4 9 0,1-7 0,-17 25 0,20-24 0,-19 24 0,16-20 0,-11 9 0,1-5 0,4 0 0,2-5 0,6-6 0,5-3 0,2-8 0,3 3 0,2-4 0,2-4 0,2 3 0,0-6 0,2 8 0,-2-5 0,1 2 0,1 2 0,-4-5 0,2 3 0,-3-4 0,0-2 0,37 9 0,-15-3 0,35 9 0,-28-3 0,8-2 0,-8 2 0,8 1 0,-8-4 0,4 4 0,-6-5 0,1-1 0,0-2 0,-1 2 0,-3-6 0,7 2 0,-5 1 0,10-2 0,-3 2 0,0 0 0,3 1 0,-8-1 0,8 5 0,-7-5 0,3 4 0,-8-3 0,-1-2 0,3 2 0,-5-1 0,7 2 0,-5-4 0,2 1 0,-1 1 0,2 6 0,-5-2 0,2-1 0,-3 0 0,3-4 0,-2 8 0,-2-4 0,0 2 0,6-5 0,0-2 0,7-3 0,-6 1 0,0 2 0,7-4 0,-5 1 0,5-6 0,-1 0 0,-7 0 0,6 0 0,-4 0 0,0 0 0,5-10 0,-8 1 0,3-13 0,1 6 0,-2-7 0,7-3 0,-3 1 0,4-5 0,-4 6 0,4-1 0,-9 5 0,2 1 0,-6 8 0,2 1 0,3-6 0,-5 7 0,5-11 0,-6 9 0,1-8 0,3-1 0,1 0 0,4-3 0,0 3 0,-4 0 0,-1 1 0,0 5 0,-3-1 0,2 0 0,1 1 0,-3 3 0,6-3 0,-3 3 0,0 0 0,2-2 0,-3 2 0,4 4 0,2-8 0,-5 9 0,2-11 0,-2 10 0,3-10 0,-2 8 0,4-4 0,-22-6 0,3 9 0,-11-12 0,0 11 0,2-1 0,-2-2 0,-1 3 0,4-4 0,-4-4 0,7 4 0,-3-4 0,3 0 0,1 3 0,-1-3 0,0 1 0,1 2 0,-1-3 0,4 0 0,-2 3 0,2-2 0,0 3 0,-3-4 0,3 3 0,-1-3 0,-4 2 0,4 1 0,-2 2 0,-5-2 0,7 8 0,-8-7 0,-2 10 0,4-1 0,-9 6 0,3 0 0,2 7 0,-7 2 0,0 16 0,-4 3 0,-3 14 0,1 1 0,-7 13 0,10-13 0,-10 17 0,11-17 0,-5 10 0,1-10 0,8-7 0,0-6 0,11-10 0,1-4 0,2-3 0,40-20 0,-25 10 0,29-14 0,-94 7 0,28-5 0,-57-5 0,49-4 0,-6-5 0,7 4 0,3-2 0,3 4 0,5 4 0,8 2 0,-2 4 0,10 0 0,-10 3 0,4 1 0,-3 3 0,-1 0 0,7 0 0,-8 0 0,1 0 0,4 3 0,-5-2 0,7 5 0,-4-2 0,-1 5 0,3-1 0,0 1 0,1-1 0,-1-1 0,-1 3 0,-2-3 0,7 3 0,-5-4 0,2 0 0,-4-2 0,-1-1 0,4-3 0,-2 0 0,0 3 0,2-3 0,-5 3 0,5 0 0,-1-2 0,2 2 0</inkml:trace>
-</inkml:ink>
-</file>
-
-<file path=ppt/ink/ink132.xml><?xml version="1.0" encoding="utf-8"?>
-<inkml:ink xmlns:inkml="http://www.w3.org/2003/InkML">
-  <inkml:definitions>
-    <inkml:context xml:id="ctx0">
-      <inkml:inkSource xml:id="inkSrc0">
-        <inkml:traceFormat>
-          <inkml:channel name="X" type="integer" min="-2.14748E9" max="2.14748E9" units="cm"/>
-          <inkml:channel name="Y" type="integer" min="-2.14748E9" max="2.14748E9" units="cm"/>
-          <inkml:channel name="F" type="integer" max="32767" units="dev"/>
-        </inkml:traceFormat>
-        <inkml:channelProperties>
-          <inkml:channelProperty channel="X" name="resolution" value="1000" units="1/cm"/>
-          <inkml:channelProperty channel="Y" name="resolution" value="1000" units="1/cm"/>
-          <inkml:channelProperty channel="F" name="resolution" value="0" units="1/dev"/>
-        </inkml:channelProperties>
-      </inkml:inkSource>
       <inkml:timestamp xml:id="ts0" timeString="2022-09-11T15:17:09.676"/>
     </inkml:context>
     <inkml:brush xml:id="br0">
@@ -1193,7 +1139,7 @@
 </inkml:ink>
 </file>
 
-<file path=ppt/ink/ink133.xml><?xml version="1.0" encoding="utf-8"?>
+<file path=ppt/ink/ink131.xml><?xml version="1.0" encoding="utf-8"?>
 <inkml:ink xmlns:inkml="http://www.w3.org/2003/InkML">
   <inkml:definitions>
     <inkml:context xml:id="ctx0">
@@ -1222,7 +1168,7 @@
 </inkml:ink>
 </file>
 
-<file path=ppt/ink/ink134.xml><?xml version="1.0" encoding="utf-8"?>
+<file path=ppt/ink/ink132.xml><?xml version="1.0" encoding="utf-8"?>
 <inkml:ink xmlns:inkml="http://www.w3.org/2003/InkML">
   <inkml:definitions>
     <inkml:context xml:id="ctx0">
@@ -1251,7 +1197,7 @@
 </inkml:ink>
 </file>
 
-<file path=ppt/ink/ink135.xml><?xml version="1.0" encoding="utf-8"?>
+<file path=ppt/ink/ink133.xml><?xml version="1.0" encoding="utf-8"?>
 <inkml:ink xmlns:inkml="http://www.w3.org/2003/InkML">
   <inkml:definitions>
     <inkml:context xml:id="ctx0">
@@ -1280,7 +1226,7 @@
 </inkml:ink>
 </file>
 
-<file path=ppt/ink/ink136.xml><?xml version="1.0" encoding="utf-8"?>
+<file path=ppt/ink/ink134.xml><?xml version="1.0" encoding="utf-8"?>
 <inkml:ink xmlns:inkml="http://www.w3.org/2003/InkML">
   <inkml:definitions>
     <inkml:context xml:id="ctx0">
@@ -1309,7 +1255,7 @@
 </inkml:ink>
 </file>
 
-<file path=ppt/ink/ink137.xml><?xml version="1.0" encoding="utf-8"?>
+<file path=ppt/ink/ink135.xml><?xml version="1.0" encoding="utf-8"?>
 <inkml:ink xmlns:inkml="http://www.w3.org/2003/InkML">
   <inkml:definitions>
     <inkml:context xml:id="ctx0">
@@ -1338,7 +1284,7 @@
 </inkml:ink>
 </file>
 
-<file path=ppt/ink/ink138.xml><?xml version="1.0" encoding="utf-8"?>
+<file path=ppt/ink/ink136.xml><?xml version="1.0" encoding="utf-8"?>
 <inkml:ink xmlns:inkml="http://www.w3.org/2003/InkML">
   <inkml:definitions>
     <inkml:context xml:id="ctx0">
@@ -1367,7 +1313,7 @@
 </inkml:ink>
 </file>
 
-<file path=ppt/ink/ink139.xml><?xml version="1.0" encoding="utf-8"?>
+<file path=ppt/ink/ink137.xml><?xml version="1.0" encoding="utf-8"?>
 <inkml:ink xmlns:inkml="http://www.w3.org/2003/InkML">
   <inkml:definitions>
     <inkml:context xml:id="ctx0">
@@ -1393,6 +1339,64 @@
     </inkml:brush>
   </inkml:definitions>
   <inkml:trace contextRef="#ctx0" brushRef="#br0">1 691 16383,'19'-35'0,"-4"-3"0,-4 26 0,0-11 0,6 2 0,0-3 0,4-2 0,-6 7 0,1-5 0,-4 9 0,3-8 0,-7 7 0,3-3 0,1 0 0,-1 4 0,2-8 0,6 2 0,-6-4 0,8 0 0,-5 1 0,-1 5 0,0 0 0,-3 4 0,-2 4 0,0-2 0,0 3 0,0-3 0,0 0 0,-4 0 0,1-3 0,3 6 0,-3-6 0,6 6 0,-6-3 0,5 0 0,-1 2 0,2 2 0,-1-1 0,4 6 0,0-2 0,0 6 0,0 0 0,3 0 0,-4 0 0,9 4 0,-9 3 0,8 6 0,-7 1 0,4 6 0,-6-4 0,-2 2 0,3 1 0,-7-7 0,3 6 0,-1-7 0,-3 0 0,9 4 0,-5-10 0,5 7 0,1-11 0,-2 5 0,5-2 0,-4 0 0,1 0 0,1-1 0,-6 0 0,7 4 0,-8-1 0,5-2 0,0 2 0,-1-2 0,1 0 0,2-1 0,-2-3 0,1 0 0,-2 0 0,-1 0 0,8 0 0,-6 0 0,5 0 0,-6 0 0,-1 0 0,3 0 0,-4 0 0,-14 30 0,1-20 0,-16 31 0,9-29 0,-2 16 0,-2-7 0,2 8 0,-7 0 0,3-3 0,0 2 0,-2-3 0,6-1 0,-6 0 0,6-4 0,-2-1 0,4-5 0,-1 1 0,-2 0 0,1 3 0,-1-2 0,-1 3 0,2-4 0,-4-1 0,4 1 0,-4 0 0,5-1 0,-3 1 0,4-4 0,0 6 0,0-6 0,0 6 0,0-4 0,1 0 0,-1 3 0,4-2 0,0 2 0,0 0 0,-12-8 0,3 1 0,-10-9 0,5 0 0,2-4 0,-3 0 0,4-6 0,-1 1 0,0-1 0,-3-1 0,2 2 0,-7-2 0,7 3 0,-3 1 0,4-1 0,-3 1 0,2 3 0,-3-3 0,4 6 0,-2-5 0,-1 2 0,3 0 0,-5-1 0,9 4 0,-9-2 0,6 3 0,-3 0 0,1-8 0,6 3 0,-5-7 0,5 2 0,-4 0 0,1 0 0,0-3 0,0 6 0,5-9 0,3 3 0,5-4 0,2-1 0,5 4 0,0 1 0,6 0 0,-2 3 0,-1-1 0,8 1 0,-2 2 0,8 0 0,5 0 0,-4 0 0,4 3 0,-5 1 0,-4 4 0,-1 0 0,-5 0 0,2 0 0,-2 0 0,5 6 0,-5-2 0,-1 9 0,-4 0 0,-2-2 0,2 7 0,-1-7 0,1 2 0,-2 11 0,-3-10 0,3 16 0,-6-15 0,2 8 0,0-7 0,-2 7 0,6-7 0,-6 3 0,5-5 0,-5 1 0,5 0 0,-2 5 0,0-7 0,2 6 0,-5-6 0,2 1 0,2 5 0,-4-6 0,8 3 0,-9-1 0,3-1 0,-3 2 0</inkml:trace>
+</inkml:ink>
+</file>
+
+<file path=ppt/ink/ink138.xml><?xml version="1.0" encoding="utf-8"?>
+<inkml:ink xmlns:inkml="http://www.w3.org/2003/InkML">
+  <inkml:definitions>
+    <inkml:context xml:id="ctx0">
+      <inkml:inkSource xml:id="inkSrc0">
+        <inkml:traceFormat>
+          <inkml:channel name="X" type="integer" min="-2.14748E9" max="2.14748E9" units="cm"/>
+          <inkml:channel name="Y" type="integer" min="-2.14748E9" max="2.14748E9" units="cm"/>
+          <inkml:channel name="F" type="integer" max="32767" units="dev"/>
+        </inkml:traceFormat>
+        <inkml:channelProperties>
+          <inkml:channelProperty channel="X" name="resolution" value="1000" units="1/cm"/>
+          <inkml:channelProperty channel="Y" name="resolution" value="1000" units="1/cm"/>
+          <inkml:channelProperty channel="F" name="resolution" value="0" units="1/dev"/>
+        </inkml:channelProperties>
+      </inkml:inkSource>
+      <inkml:timestamp xml:id="ts0" timeString="2022-09-11T15:18:05.645"/>
+    </inkml:context>
+    <inkml:brush xml:id="br0">
+      <inkml:brushProperty name="width" value="0.3" units="cm"/>
+      <inkml:brushProperty name="height" value="0.6" units="cm"/>
+      <inkml:brushProperty name="tip" value="rectangle"/>
+      <inkml:brushProperty name="rasterOp" value="maskPen"/>
+    </inkml:brush>
+  </inkml:definitions>
+  <inkml:trace contextRef="#ctx0" brushRef="#br0">1 887 16383,'30'-34'0,"-3"0"0,-20 19 0,1-9 0,0 5 0,0-6 0,3 2 0,-6 3 0,6-7 0,-7 10 0,0-10 0,3 7 0,-6-4 0,6 7 0,-7-10 0,6 14 0,-1-15 0,2 12 0,-2-7 0,-2 3 0,0 1 0,1 0 0,0 4 0,3 1 0,-4-3 0,1 3 0,-1-2 0,-3 1 0,0 1 0,0-5 0,0 4 0,3-3 0,1 4 0,0-1 0,2-3 0,-2 4 0,0-3 0,-1 1 0,-3 2 0,3-5 0,0 6 0,4-3 0,-1 3 0,4 0 0,0 1 0,2 2 0,-2-5 0,1 7 0,2-1 0,3 7 0,1 2 0,3 0 0,-6 0 0,4 0 0,-3 0 0,-1 3 0,5 1 0,-3 4 0,3-1 0,-5 1 0,1-1 0,4 1 0,-7-1 0,6 0 0,-7 0 0,4 1 0,-1-1 0,1 0 0,0 1 0,-1-1 0,1-3 0,0 2 0,2-2 0,-5 3 0,4 0 0,-3-1 0,1 1 0,3-3 0,-4 2 0,3-3 0,-2 1 0,5-1 0,-5-3 0,6 0 0,-5 0 0,2 0 0,0 0 0,-3 0 0,3 0 0,3 0 0,-7 0 0,6 3 0,-6-2 0,0 1 0,6 4 0,-9 3 0,5-1 0,-2 3 0,0-10 0,6 4 0,-5-1 0,2 3 0,-3-1 0,-5 9 0,-3-1 0,-5 6 0,0-4 0,-2-3 0,-12 3 0,5-4 0,-7 0 0,0 2 0,3-2 0,-8 6 0,6-4 0,0 1 0,1 0 0,-1-1 0,-4 2 0,4-2 0,-4 2 0,4-2 0,-5 6 0,4-4 0,-4 8 0,1-8 0,3 3 0,0-4 0,2 0 0,3 0 0,0-1 0,0 1 0,0-4 0,3 3 0,-2-2 0,-1 2 0,3 1 0,-6 0 0,6-1 0,-6 1 0,3 0 0,-1-1 0,-1 1 0,5-4 0,-3 3 0,2-4 0,1 4 0,-2 0 0,3-1 0,0 2 0,0-1 0,0 1 0,-4-4 0,3 9 0,-2-10 0,3 7 0,0-4 0,0-2 0,3 8 0,1-5 0,3 1 0,-30-30 0,16 11 0,-24-18 0,23 15 0,4 6 0,-8-2 0,7 3 0,-8 0 0,4 0 0,2 0 0,-5 0 0,5 0 0,4-18 0,4 6 0,6-19 0,4 7 0,1-2 0,6-3 0,-2 5 0,7 0 0,-7 0 0,2 4 0,0-3 0,-2 7 0,2-3 0,-4 5 0,0 3 0,3-6 0,-2 9 0,-1-11 0,-4 5 0,-3-3 0,3 1 0,0 3 0,4 0 0</inkml:trace>
+</inkml:ink>
+</file>
+
+<file path=ppt/ink/ink139.xml><?xml version="1.0" encoding="utf-8"?>
+<inkml:ink xmlns:inkml="http://www.w3.org/2003/InkML">
+  <inkml:definitions>
+    <inkml:context xml:id="ctx0">
+      <inkml:inkSource xml:id="inkSrc0">
+        <inkml:traceFormat>
+          <inkml:channel name="X" type="integer" min="-2.14748E9" max="2.14748E9" units="cm"/>
+          <inkml:channel name="Y" type="integer" min="-2.14748E9" max="2.14748E9" units="cm"/>
+          <inkml:channel name="F" type="integer" max="32767" units="dev"/>
+        </inkml:traceFormat>
+        <inkml:channelProperties>
+          <inkml:channelProperty channel="X" name="resolution" value="1000" units="1/cm"/>
+          <inkml:channelProperty channel="Y" name="resolution" value="1000" units="1/cm"/>
+          <inkml:channelProperty channel="F" name="resolution" value="0" units="1/dev"/>
+        </inkml:channelProperties>
+      </inkml:inkSource>
+      <inkml:timestamp xml:id="ts0" timeString="2022-09-11T15:18:17.554"/>
+    </inkml:context>
+    <inkml:brush xml:id="br0">
+      <inkml:brushProperty name="width" value="0.3" units="cm"/>
+      <inkml:brushProperty name="height" value="0.6" units="cm"/>
+      <inkml:brushProperty name="tip" value="rectangle"/>
+      <inkml:brushProperty name="rasterOp" value="maskPen"/>
+    </inkml:brush>
+  </inkml:definitions>
+  <inkml:trace contextRef="#ctx0" brushRef="#br0">1629 628 16383,'-46'0'0,"4"0"0,22 0 0,-8 0 0,11 0 0,-7 0 0,5 0 0,7-3 0,-9 2 0,9-5 0,-8 5 0,4-5 0,2 5 0,-6-9 0,7 5 0,-8-2 0,4-3 0,5 9 0,-8-9 0,9 3 0,-6-1 0,3-4 0,3 0 0,1 2 0,0-3 0,0 0 0,3 1 0,1-6 0,3 4 0,-1-3 0,-3-1 0,3 4 0,-2-1 0,2 0 0,0-4 0,-3 4 0,6-8 0,-2 7 0,0-3 0,-1 1 0,0 7 0,-3-8 0,-2 8 0,4-3 0,-13 2 0,10 2 0,-5 0 0,-2 0 0,4 1 0,-4 2 0,-2-6 0,6 9 0,-5-8 0,3 5 0,2-1 0,-8-6 0,8 8 0,-2-6 0,-3 5 0,8 0 0,-12-3 0,8 2 0,-2-2 0,1 1 0,6-2 0,-11 4 0,4 13 0,-3 2 0,5 8 0,6-3 0,-4-3 0,-1 10 0,1-8 0,0 8 0,0-9 0,1 8 0,-5-4 0,2 8 0,-4-3 0,4 4 0,-3 1 0,3-5 0,-4-2 0,5-3 0,1 0 0,3-5 0,0 7 0,6-4 0,16 5 0,-1-1 0,15-1 0,-13-2 0,7 2 0,-7 3 0,3-2 0,-3 2 0,-1-1 0,-3-2 0,2 3 0,-2-4 0,2-1 0,-2 1 0,1 0 0,-4-1 0,4 1 0,-4 0 0,1-1 0,-2 1 0,-1 0 0,0-1 0,3 3 0,-2-6 0,4 5 0,-1-8 0,6 5 0,-5-5 0,5 5 0,-10-5 0,7 6 0,-6-3 0,6 3 0,-6-3 0,5 3 0,1 0 0,-2-2 0,5 1 0,-6-6 0,7 4 0,-7-3 0,6 1 0,-4-5 0,0-1 0,6-3 0,-6-3 0,2-6 0,2-2 0,-3-2 0,4 3 0,-7 3 0,2-3 0,0 5 0,-60 21 0,31-4 0,-52 19 0,44-19 0,4 3 0,-3-6 0,7 1 0,1-2 0,1-1 0,4 3 0,-5-2 0,2 4 0,2-4 0,-5 5 0,8-6 0,-6 6 0,5 0 0,5 0 0,-2 6 0,-3-6 0,4 0 0,-11-1 0,5-4 0,-3 2 0,0-3 0,1 0 0,-1 2 0,1-2 0,0 6 0,-3-9 0,3 4 0,-3-4 0,3 2 0,-3-11 0,2 0 0,-3-12 0,2 6 0,0-3 0,-3 5 0,2-5 0,-3 3 0,4-4 0,1 0 0,-1 1 0,0-1 0,1 0 0,-1 1 0,4-1 0,-3 0 0,2 1 0,-2 2 0,2-2 0,-2 6 0,3-2 0,-7-1 0,7 4 0,-6 0 0,3-2 0,2 4 0,-8-5 0,9 3 0,-3 1 0,-3-7 0,9 5 0,-7-8 0,5 9 0,-3-2 0,-3 2 0,-1 3 0,3-2 0,-6 6 0,5-6 0,1 5 0,-5-5 0,8 3 0,-5-1 0,-3 1 0,8 3 0,-9 0 0,7 0 0,-3 0 0,44-38 0,-14 21 0,42-31 0,-30 28 0,3 5 0,-4-1 0,-1 8 0,-4 0 0,-1 1 0,-8 3 0,6 1 0,-3 0 0,4 2 0,-3-5 0,-2 0 0,0-1 0,-1-5 0,-2 2 0,3-4 0,0-2 0,-1 4 0,4-4 0,-8 8 0,6-2 0,-1 3 0,5 0 0</inkml:trace>
 </inkml:ink>
 </file>
 
@@ -1439,64 +1443,6 @@
           <inkml:channelProperty channel="F" name="resolution" value="0" units="1/dev"/>
         </inkml:channelProperties>
       </inkml:inkSource>
-      <inkml:timestamp xml:id="ts0" timeString="2022-09-11T15:18:05.645"/>
-    </inkml:context>
-    <inkml:brush xml:id="br0">
-      <inkml:brushProperty name="width" value="0.3" units="cm"/>
-      <inkml:brushProperty name="height" value="0.6" units="cm"/>
-      <inkml:brushProperty name="tip" value="rectangle"/>
-      <inkml:brushProperty name="rasterOp" value="maskPen"/>
-    </inkml:brush>
-  </inkml:definitions>
-  <inkml:trace contextRef="#ctx0" brushRef="#br0">1 887 16383,'30'-34'0,"-3"0"0,-20 19 0,1-9 0,0 5 0,0-6 0,3 2 0,-6 3 0,6-7 0,-7 10 0,0-10 0,3 7 0,-6-4 0,6 7 0,-7-10 0,6 14 0,-1-15 0,2 12 0,-2-7 0,-2 3 0,0 1 0,1 0 0,0 4 0,3 1 0,-4-3 0,1 3 0,-1-2 0,-3 1 0,0 1 0,0-5 0,0 4 0,3-3 0,1 4 0,0-1 0,2-3 0,-2 4 0,0-3 0,-1 1 0,-3 2 0,3-5 0,0 6 0,4-3 0,-1 3 0,4 0 0,0 1 0,2 2 0,-2-5 0,1 7 0,2-1 0,3 7 0,1 2 0,3 0 0,-6 0 0,4 0 0,-3 0 0,-1 3 0,5 1 0,-3 4 0,3-1 0,-5 1 0,1-1 0,4 1 0,-7-1 0,6 0 0,-7 0 0,4 1 0,-1-1 0,1 0 0,0 1 0,-1-1 0,1-3 0,0 2 0,2-2 0,-5 3 0,4 0 0,-3-1 0,1 1 0,3-3 0,-4 2 0,3-3 0,-2 1 0,5-1 0,-5-3 0,6 0 0,-5 0 0,2 0 0,0 0 0,-3 0 0,3 0 0,3 0 0,-7 0 0,6 3 0,-6-2 0,0 1 0,6 4 0,-9 3 0,5-1 0,-2 3 0,0-10 0,6 4 0,-5-1 0,2 3 0,-3-1 0,-5 9 0,-3-1 0,-5 6 0,0-4 0,-2-3 0,-12 3 0,5-4 0,-7 0 0,0 2 0,3-2 0,-8 6 0,6-4 0,0 1 0,1 0 0,-1-1 0,-4 2 0,4-2 0,-4 2 0,4-2 0,-5 6 0,4-4 0,-4 8 0,1-8 0,3 3 0,0-4 0,2 0 0,3 0 0,0-1 0,0 1 0,0-4 0,3 3 0,-2-2 0,-1 2 0,3 1 0,-6 0 0,6-1 0,-6 1 0,3 0 0,-1-1 0,-1 1 0,5-4 0,-3 3 0,2-4 0,1 4 0,-2 0 0,3-1 0,0 2 0,0-1 0,0 1 0,-4-4 0,3 9 0,-2-10 0,3 7 0,0-4 0,0-2 0,3 8 0,1-5 0,3 1 0,-30-30 0,16 11 0,-24-18 0,23 15 0,4 6 0,-8-2 0,7 3 0,-8 0 0,4 0 0,2 0 0,-5 0 0,5 0 0,4-18 0,4 6 0,6-19 0,4 7 0,1-2 0,6-3 0,-2 5 0,7 0 0,-7 0 0,2 4 0,0-3 0,-2 7 0,2-3 0,-4 5 0,0 3 0,3-6 0,-2 9 0,-1-11 0,-4 5 0,-3-3 0,3 1 0,0 3 0,4 0 0</inkml:trace>
-</inkml:ink>
-</file>
-
-<file path=ppt/ink/ink141.xml><?xml version="1.0" encoding="utf-8"?>
-<inkml:ink xmlns:inkml="http://www.w3.org/2003/InkML">
-  <inkml:definitions>
-    <inkml:context xml:id="ctx0">
-      <inkml:inkSource xml:id="inkSrc0">
-        <inkml:traceFormat>
-          <inkml:channel name="X" type="integer" min="-2.14748E9" max="2.14748E9" units="cm"/>
-          <inkml:channel name="Y" type="integer" min="-2.14748E9" max="2.14748E9" units="cm"/>
-          <inkml:channel name="F" type="integer" max="32767" units="dev"/>
-        </inkml:traceFormat>
-        <inkml:channelProperties>
-          <inkml:channelProperty channel="X" name="resolution" value="1000" units="1/cm"/>
-          <inkml:channelProperty channel="Y" name="resolution" value="1000" units="1/cm"/>
-          <inkml:channelProperty channel="F" name="resolution" value="0" units="1/dev"/>
-        </inkml:channelProperties>
-      </inkml:inkSource>
-      <inkml:timestamp xml:id="ts0" timeString="2022-09-11T15:18:17.554"/>
-    </inkml:context>
-    <inkml:brush xml:id="br0">
-      <inkml:brushProperty name="width" value="0.3" units="cm"/>
-      <inkml:brushProperty name="height" value="0.6" units="cm"/>
-      <inkml:brushProperty name="tip" value="rectangle"/>
-      <inkml:brushProperty name="rasterOp" value="maskPen"/>
-    </inkml:brush>
-  </inkml:definitions>
-  <inkml:trace contextRef="#ctx0" brushRef="#br0">1629 628 16383,'-46'0'0,"4"0"0,22 0 0,-8 0 0,11 0 0,-7 0 0,5 0 0,7-3 0,-9 2 0,9-5 0,-8 5 0,4-5 0,2 5 0,-6-9 0,7 5 0,-8-2 0,4-3 0,5 9 0,-8-9 0,9 3 0,-6-1 0,3-4 0,3 0 0,1 2 0,0-3 0,0 0 0,3 1 0,1-6 0,3 4 0,-1-3 0,-3-1 0,3 4 0,-2-1 0,2 0 0,0-4 0,-3 4 0,6-8 0,-2 7 0,0-3 0,-1 1 0,0 7 0,-3-8 0,-2 8 0,4-3 0,-13 2 0,10 2 0,-5 0 0,-2 0 0,4 1 0,-4 2 0,-2-6 0,6 9 0,-5-8 0,3 5 0,2-1 0,-8-6 0,8 8 0,-2-6 0,-3 5 0,8 0 0,-12-3 0,8 2 0,-2-2 0,1 1 0,6-2 0,-11 4 0,4 13 0,-3 2 0,5 8 0,6-3 0,-4-3 0,-1 10 0,1-8 0,0 8 0,0-9 0,1 8 0,-5-4 0,2 8 0,-4-3 0,4 4 0,-3 1 0,3-5 0,-4-2 0,5-3 0,1 0 0,3-5 0,0 7 0,6-4 0,16 5 0,-1-1 0,15-1 0,-13-2 0,7 2 0,-7 3 0,3-2 0,-3 2 0,-1-1 0,-3-2 0,2 3 0,-2-4 0,2-1 0,-2 1 0,1 0 0,-4-1 0,4 1 0,-4 0 0,1-1 0,-2 1 0,-1 0 0,0-1 0,3 3 0,-2-6 0,4 5 0,-1-8 0,6 5 0,-5-5 0,5 5 0,-10-5 0,7 6 0,-6-3 0,6 3 0,-6-3 0,5 3 0,1 0 0,-2-2 0,5 1 0,-6-6 0,7 4 0,-7-3 0,6 1 0,-4-5 0,0-1 0,6-3 0,-6-3 0,2-6 0,2-2 0,-3-2 0,4 3 0,-7 3 0,2-3 0,0 5 0,-60 21 0,31-4 0,-52 19 0,44-19 0,4 3 0,-3-6 0,7 1 0,1-2 0,1-1 0,4 3 0,-5-2 0,2 4 0,2-4 0,-5 5 0,8-6 0,-6 6 0,5 0 0,5 0 0,-2 6 0,-3-6 0,4 0 0,-11-1 0,5-4 0,-3 2 0,0-3 0,1 0 0,-1 2 0,1-2 0,0 6 0,-3-9 0,3 4 0,-3-4 0,3 2 0,-3-11 0,2 0 0,-3-12 0,2 6 0,0-3 0,-3 5 0,2-5 0,-3 3 0,4-4 0,1 0 0,-1 1 0,0-1 0,1 0 0,-1 1 0,4-1 0,-3 0 0,2 1 0,-2 2 0,2-2 0,-2 6 0,3-2 0,-7-1 0,7 4 0,-6 0 0,3-2 0,2 4 0,-8-5 0,9 3 0,-3 1 0,-3-7 0,9 5 0,-7-8 0,5 9 0,-3-2 0,-3 2 0,-1 3 0,3-2 0,-6 6 0,5-6 0,1 5 0,-5-5 0,8 3 0,-5-1 0,-3 1 0,8 3 0,-9 0 0,7 0 0,-3 0 0,44-38 0,-14 21 0,42-31 0,-30 28 0,3 5 0,-4-1 0,-1 8 0,-4 0 0,-1 1 0,-8 3 0,6 1 0,-3 0 0,4 2 0,-3-5 0,-2 0 0,0-1 0,-1-5 0,-2 2 0,3-4 0,0-2 0,-1 4 0,4-4 0,-8 8 0,6-2 0,-1 3 0,5 0 0</inkml:trace>
-</inkml:ink>
-</file>
-
-<file path=ppt/ink/ink142.xml><?xml version="1.0" encoding="utf-8"?>
-<inkml:ink xmlns:inkml="http://www.w3.org/2003/InkML">
-  <inkml:definitions>
-    <inkml:context xml:id="ctx0">
-      <inkml:inkSource xml:id="inkSrc0">
-        <inkml:traceFormat>
-          <inkml:channel name="X" type="integer" min="-2.14748E9" max="2.14748E9" units="cm"/>
-          <inkml:channel name="Y" type="integer" min="-2.14748E9" max="2.14748E9" units="cm"/>
-          <inkml:channel name="F" type="integer" max="32767" units="dev"/>
-        </inkml:traceFormat>
-        <inkml:channelProperties>
-          <inkml:channelProperty channel="X" name="resolution" value="1000" units="1/cm"/>
-          <inkml:channelProperty channel="Y" name="resolution" value="1000" units="1/cm"/>
-          <inkml:channelProperty channel="F" name="resolution" value="0" units="1/dev"/>
-        </inkml:channelProperties>
-      </inkml:inkSource>
       <inkml:timestamp xml:id="ts0" timeString="2022-09-11T15:18:22.730"/>
     </inkml:context>
     <inkml:brush xml:id="br0">
@@ -1510,7 +1456,7 @@
 </inkml:ink>
 </file>
 
-<file path=ppt/ink/ink143.xml><?xml version="1.0" encoding="utf-8"?>
+<file path=ppt/ink/ink141.xml><?xml version="1.0" encoding="utf-8"?>
 <inkml:ink xmlns:inkml="http://www.w3.org/2003/InkML">
   <inkml:definitions>
     <inkml:context xml:id="ctx0">
@@ -1539,7 +1485,7 @@
 </inkml:ink>
 </file>
 
-<file path=ppt/ink/ink144.xml><?xml version="1.0" encoding="utf-8"?>
+<file path=ppt/ink/ink142.xml><?xml version="1.0" encoding="utf-8"?>
 <inkml:ink xmlns:inkml="http://www.w3.org/2003/InkML">
   <inkml:definitions>
     <inkml:context xml:id="ctx0">
@@ -1568,7 +1514,7 @@
 </inkml:ink>
 </file>
 
-<file path=ppt/ink/ink145.xml><?xml version="1.0" encoding="utf-8"?>
+<file path=ppt/ink/ink143.xml><?xml version="1.0" encoding="utf-8"?>
 <inkml:ink xmlns:inkml="http://www.w3.org/2003/InkML">
   <inkml:definitions>
     <inkml:context xml:id="ctx0">
@@ -1597,7 +1543,7 @@
 </inkml:ink>
 </file>
 
-<file path=ppt/ink/ink146.xml><?xml version="1.0" encoding="utf-8"?>
+<file path=ppt/ink/ink144.xml><?xml version="1.0" encoding="utf-8"?>
 <inkml:ink xmlns:inkml="http://www.w3.org/2003/InkML">
   <inkml:definitions>
     <inkml:context xml:id="ctx0">
@@ -1624,6 +1570,141 @@
     </inkml:brush>
   </inkml:definitions>
   <inkml:trace contextRef="#ctx0" brushRef="#br0">1 325 16383,'49'0'0,"-5"0"0,-20 0 0,0 0 0,-8 0 0,-1 0 0,1 0 0,-4 0 0,8 0 0,-4 0 0,-1 0 0,7-7 0,8-9 0,-3-2 0,23-13 0,-26 17 0,15-6 0,-27 13 0,6 0 0,-5 3 0,2-2 0,1-1 0,-3 0 0,0-6 0,0 6 0,0-5 0,1 1 0,0 0 0,0 0 0,1 4 0,2-3 0,-5 2 0,1-2 0,1 3 0,0-3 0,1 2 0,2-2 0,-7 1 0,4 4 0,-1-7 0,3 11 0,-2-5 0,8 3 0,-10 0 0,7-1 0,-5 1 0,1 3 0,2 0 0,0 0 0,-1 0 0,1 0 0,2 0 0,-3 3 0,7 5 0,3 10 0,0-1 0,5 9 0,-7-8 0,2 7 0,5-2 0,-8 2 0,7 2 0,-13-7 0,3 0 0,-6-5 0,1-1 0,0 1 0,-4 0 0,3-4 0,-6 3 0,6 0 0,-7-2 0,6 4 0,-3-5 0,1-1 0,-2 5 0,1-4 0,-3 3 0,6-2 0,-3-5 0,3 6 0,1-6 0,-2 3 0,4-4 0,-2-2 0,2 1 0,3-4 0,-7 2 0,8-3 0,-7 0 0,2 0 0,4 3 0,-5-2 0,2 2 0,0-3 0,-3 0 0,-44 24 0,15-18 0,-39 22 0,31-28 0,0 8 0,4-4 0,-3 0 0,7 3 0,1-7 0,-1 7 0,5-1 0,-2 5 0,-2 2 0,7-3 0,-8 3 0,6-3 0,0 0 0,-7 3 0,9-5 0,-11 5 0,10-2 0,-8 0 0,9 3 0,-6-6 0,3 6 0,-1-3 0,-1 0 0,1 3 0,-3-2 0,1-1 0,-1 3 0,4-6 0,-3 2 0,3 1 0,-3-3 0,-1 6 0,4-7 0,-3 4 0,4-1 0,-4-3 0,0 3 0,-1-7 0,-3 3 0,4-2 0,-3 0 0,3 5 0,-1-4 0,1 4 0,-2-2 0,5 0 0,-5 0 0,-1-1 0,6 1 0,-5 0 0,6 2 0,-8-1 0,7 1 0,-5-2 0,3 0 0,-1 0 0,-8-4 0,10 0 0,-11-3 0,12 0 0,-5 0 0,-1 0 0,4-9 0,-4 1 0,7-9 0,0 3 0,2 0 0,4-1 0,-2-4 0,1 4 0,-2-4 0,-1 4 0,1 4 0,-3-6 0,3 9 0,-6-8 0,2 2 0,1 3 0,0-6 0,3 3 0,3 2 0,-5-7 0,4 8 0,-7-2 0,1 1 0,1 1 0,-2-2 0,2 3 0,-6 3 0,0 4 0,-1 3 0,2 0 0,-1 0 0,2 0 0,-5-5 0,5 0 0,1-7 0,6-4 0,4 2 0,3-5 0,0 5 0,7 1 0,5 2 0,8 4 0,4 0 0,5 6 0,1-7 0,5 7 0,0-3 0,0 4 0,-4 0 0,2 0 0,-7 0 0,8 0 0,-9 0 0,4 4 0,-5 0 0,0 1 0,0 2 0,-4-6 0,3 6 0,-7-6 0,-1 3 0,2-1 0,-6-2 0,9 2 0,-6-3 0,3 0 0,-1 0 0,-1 0 0,3 0 0,-4-6 0,-1-1 0,-4-7 0</inkml:trace>
+</inkml:ink>
+</file>
+
+<file path=ppt/ink/ink145.xml><?xml version="1.0" encoding="utf-8"?>
+<inkml:ink xmlns:inkml="http://www.w3.org/2003/InkML">
+  <inkml:definitions>
+    <inkml:context xml:id="ctx0">
+      <inkml:inkSource xml:id="inkSrc0">
+        <inkml:traceFormat>
+          <inkml:channel name="X" type="integer" min="-2.14748E9" max="2.14748E9" units="cm"/>
+          <inkml:channel name="Y" type="integer" min="-2.14748E9" max="2.14748E9" units="cm"/>
+          <inkml:channel name="F" type="integer" max="32767" units="dev"/>
+        </inkml:traceFormat>
+        <inkml:channelProperties>
+          <inkml:channelProperty channel="X" name="resolution" value="1000" units="1/cm"/>
+          <inkml:channelProperty channel="Y" name="resolution" value="1000" units="1/cm"/>
+          <inkml:channelProperty channel="F" name="resolution" value="0" units="1/dev"/>
+        </inkml:channelProperties>
+      </inkml:inkSource>
+      <inkml:timestamp xml:id="ts0" timeString="2022-09-11T15:20:38.220"/>
+    </inkml:context>
+    <inkml:brush xml:id="br0">
+      <inkml:brushProperty name="width" value="0.1" units="cm"/>
+      <inkml:brushProperty name="height" value="0.1" units="cm"/>
+    </inkml:brush>
+  </inkml:definitions>
+  <inkml:trace contextRef="#ctx0" brushRef="#br0">747 1 24575,'0'13'0,"0"1"0,0 0 0,-3-3 0,2 3 0,-2-3 0,-3 10 0,4-5 0,-4 2 0,6-8 0,0-4 0,-3 1 0,2 0 0,-2-1 0,3 1 0,-3-1 0,-1 7 0,-3-1 0,3 2 0,-2 0 0,5-7 0,-3 4 0,4-5 0,-2 1 0,1 2 0,-5 2 0,5 0 0,-6 3 0,3-3 0,0 3 0,-2 1 0,2 0 0,-4-1 0,4-3 0,1 3 0,0-6 0,2 2 0,-2-3 0,3-1 0,0 1 0,-3-1 0,-1 5 0,-3 4 0,-1 5 0,4 4 0,-7 0 0,6 0 0,-7 0 0,4 0 0,0 1 0,4-1 0,-7 0 0,9 0 0,-12 0 0,8 0 0,-5 0 0,-4 11 0,5-8 0,-2 4 0,5-8 0,3-8 0,-4 4 0,1 0 0,2-3 0,-2 7 0,3-3 0,-5 9 0,-2-4 0,1 9 0,-2-4 0,0 0 0,3-1 0,-3-5 0,4 1 0,4-6 0,-3 0 0,3 3 0,-4-6 0,1 9 0,-1-5 0,0 4 0,-4 0 0,3 5 0,-7 1 0,3 5 0,-1 0 0,-2-4 0,3 2 0,0-2 0,-3-1 0,7-2 0,-7 1 0,3-4 0,0 9 0,-3-4 0,2 5 0,-4 6 0,0-5 0,4 5 0,-2-11 0,7 4 0,-3-9 0,4 11 0,3-15 0,2 5 0,3-12 0,0 1 0,0 0 0,0-1 0,0 1 0,0 0 0,0 3 0,0-2 0,0 3 0,0 0 0,0 1 0,0 0 0,0 3 0,0-7 0,0 7 0,3 3 0,-2 0 0,5 0 0,-5-3 0,6-3 0,-6 0 0,6 3 0,-6-3 0,12 17 0,-7-14 0,8 9 0,-6-17 0,5 5 0,-5-7 0,5 6 0,-6-11 0,3 5 0,-3-6 0,11 7 0,-6-6 0,7 7 0,0-7 0,14 13 0,-10-11 0,8 7 0,-19-10 0,1 1 0,-2-1 0,4-3 0,15 3 0,-8-3 0,13 1 0,-6 2 0,1-6 0,5 3 0,0-4 0,-1 4 0,-4-3 0,4 3 0,-8-4 0,2 0 0,1 0 0,-3 0 0,3 0 0,-5 0 0,0 0 0,0 0 0,-4 0 0,3 0 0,-7 0 0,3 0 0,-5 0 0,1 0 0,0 0 0,-1 0 0,1 0 0,-4 0 0,3 0 0,-3-4 0,0 3 0,-1-2 0,-3 0 0,-1 2 0,1-1 0,-3-1 0,1-1 0,2 1 0,4-3 0,8-2 0,-3-1 0,7-2 0,-7 3 0,-1 1 0,-1 3 0,-7-2 0,3 3 0,-3-1 0,0 1 0,-1 0 0,1-4 0,0-1 0,3-6 0,6 3 0,-1-4 0,4 3 0,-8 2 0,0-1 0,-1 3 0,-2 1 0,2 1 0,-3-1 0,-1 0 0,1-6 0,0 2 0,0 0 0,0 1 0,-3 0 0,1 5 0,-4-4 0,2 5 0,-3-2 0,0-14 0,4-2 0,-3-24 0,3-11 0,-4 1 0,0-11 0,0 5 0,0 0 0,0-6 0,0 13 0,0 7 0,0 8 0,0 5 0,0 0 0,-4 0 0,3 0 0,-7-6 0,3 5 0,-4-10 0,4 4 0,-4-5 0,4 5 0,-4 2 0,0-1 0,0 5 0,-4-4 0,4 5 0,-4 0 0,4 0 0,0-5 0,1 3 0,2-3 0,-1 10 0,2-4 0,-3-12 0,-1 12 0,1-15 0,-1 23 0,5-3 0,-3 5 0,2 0 0,-3 0 0,0 0 0,0 0 0,0 4 0,0-3 0,1 7 0,-4-3 0,2 0 0,-1 4 0,2-4 0,1 0 0,-1 3 0,1-2 0,-1 3 0,1 0 0,0 1 0,-1-1 0,1 0 0,0 1 0,-1-1 0,1 0 0,3 4 0,-3-3 0,0-3 0,-1 4 0,1-7 0,1 9 0,2 0 0,-3-3 0,0 3 0,3-4 0,-3 4 0,3-3 0,-3 3 0,0-3 0,0-1 0,3 4 0,-3-3 0,4 7 0,-1-4 0,-3 1 0,4 3 0,-1-7 0,-2 6 0,2-2 0,0 0 0,-2 3 0,6-4 0,-6 8 0,5-3 0,-5 2 0,5-2 0,-4-1 0,4 0 0,-5 4 0,5-7 0,-5 6 0,6-7 0,-6 5 0,5-1 0,-5 1 0,5-1 0,-4 0 0,4 1 0,-2-1 0,0-3 0,2 2 0,-2-2 0,0 4 0,2-1 0,-2 0 0,3 1 0,-3 2 0,2-1 0,-2 1 0,0 1 0,3-5 0,-3 3 0,3-3 0,-6 4 0,5 4 0,-5 3 0,6 0 0,0 0 0</inkml:trace>
+</inkml:ink>
+</file>
+
+<file path=ppt/ink/ink146.xml><?xml version="1.0" encoding="utf-8"?>
+<inkml:ink xmlns:inkml="http://www.w3.org/2003/InkML">
+  <inkml:definitions>
+    <inkml:context xml:id="ctx0">
+      <inkml:inkSource xml:id="inkSrc0">
+        <inkml:traceFormat>
+          <inkml:channel name="X" type="integer" min="-2.14748E9" max="2.14748E9" units="cm"/>
+          <inkml:channel name="Y" type="integer" min="-2.14748E9" max="2.14748E9" units="cm"/>
+          <inkml:channel name="F" type="integer" max="32767" units="dev"/>
+        </inkml:traceFormat>
+        <inkml:channelProperties>
+          <inkml:channelProperty channel="X" name="resolution" value="1000" units="1/cm"/>
+          <inkml:channelProperty channel="Y" name="resolution" value="1000" units="1/cm"/>
+          <inkml:channelProperty channel="F" name="resolution" value="0" units="1/dev"/>
+        </inkml:channelProperties>
+      </inkml:inkSource>
+      <inkml:timestamp xml:id="ts0" timeString="2022-09-11T15:21:27.525"/>
+    </inkml:context>
+    <inkml:brush xml:id="br0">
+      <inkml:brushProperty name="width" value="0.35" units="cm"/>
+      <inkml:brushProperty name="height" value="0.35" units="cm"/>
+    </inkml:brush>
+  </inkml:definitions>
+  <inkml:trace contextRef="#ctx0" brushRef="#br0">230 2014 24575,'-11'-38'0,"1"5"0,2 14 0,0 0 0,-3-6 0,2 1 0,-12-12 0,14 17 0,-8-7 0,11 22 0,0-2 0,-9 6 0,7 0 0,-9 3 0,9 4 0,2-1 0,-2 4 0,5-1 0,1 1 0,4-1 0,2-3 0,1 1 0,0 3 0,-4-3 0,3 3 0,-2-1 0,2-2 0,1 3 0,-4-4 0,3 1 0,-2 2 0,0-2 0,-23-4 0,7-1 0,-18-9 0,15 3 0,4-3 0,-2 0 0,5 0 0,-2 0 0,6 1 0,-2-1 0,3-2 0,-1 1 0,1-4 0,3 5 0,0-5 0,0 5 0,0-6 0,0 5 0,0-2 0,0 0 0,0 2 0,0-5 0,0 2 0,0-1 0,0 2 0,0 0 0,0 3 0,0-6 0,0 5 0,0-1 0,0 0 0,0 2 0,6-9 0,-4 7 0,7-7 0,-8 8 0,2-2 0,0 1 0,1 2 0,2-3 0,-2 0 0,2 3 0,-3-3 0,4-1 0,0 0 0,0 0 0,-3 1 0,2 3 0,-5-2 0,8-2 0,-8 1 0,8 0 0,-8 0 0,5 2 0,-2-2 0,2 0 0,-2-1 0,2 4 0,-5-5 0,4 4 0,-1-2 0,0 1 0,2-1 0,-2 2 0,0-2 0,2 3 0,-6-2 0,6 2 0,-5-6 0,2 6 0,-3-4 0,3 3 0,-2-5 0,2 6 0,0-7 0,-2 7 0,5-7 0,-5 3 0,5 0 0,-5-3 0,5 6 0,-6-2 0,7 0 0,-6 3 0,5-4 0,-6 2 0,3 2 0,-21 9 0,14 1 0,-17 9 0,17-5 0,1-1 0,-3 4 0,2-3 0,0 2 0,-2 0 0,3-2 0,-1 2 0,-5-3 0,5 1 0,-5 2 0,5-2 0,-2 3 0,3-4 0,-4 1 0,0-1 0,0 5 0,1-4 0,2 3 0,-2-3 0,2 0 0,0 2 0,-1-2 0,1 5 0,1-5 0,15-25 0,4 3 0,9-24 0,-4 14 0,-5 1 0,0 0 0,-4 4 0,3-3 0,-6 3 0,6-4 0,-3 0 0,5 0 0,-1 0 0,-1 4 0,-3-3 0,-1 7 0,-4 1 0,1 1 0,-2 7 0,1-1 0,-3 0 0,2 0 0,-5-5 0,4 2 0,-4 1 0,2 3 0,3-6 0,-4 1 0,7-5 0,-5 6 0,0-3 0,2 6 0,-5-2 0,5 1 0,-6 2 0,3-6 0,-3 6 0,0-2 0,0 0 0,0-1 0,0 0 0,0 1 0,4-1 0,-4 2 0,7-6 0,-6 7 0,2-7 0,0 7 0,-2-4 0,2 2 0,0-2 0,-2 0 0,2-2 0,-3 5 0,3-6 0,1 3 0,0-3 0,3-1 0,-6 0 0,2 4 0,0-3 0,-2 7 0,2-3 0,-3-3 0,3 4 0,-2-4 0,2 7 0,-3-4 0,3 0 0,-2 0 0,1 0 0,1 1 0,-2 2 0,2-5 0,-3 5 0,3-3 0,0 1 0,1 1 0,-1-4 0,0 5 0,-2-2 0,2-1 0,0 3 0,0-5 0,1 5 0,2-3 0,-5 1 0,4 2 0,-1-5 0,-1 5 0,3-2 0,-2-1 0,-1 3 0,3-3 0,-5 1 0,5 1 0,-6-4 0,3 5 0,0-2 0,-2 0 0,2 2 0,0-6 0,-2 6 0,4-3 0,-4 1 0,2 2 0,0-5 0,-2 5 0,2-3 0,0-1 0,-3 3 0,3-4 0,-3 4 0,15 27 0,-11-16 0,10 24 0,-11-20 0,-2-1 0,5 4 0,-5-2 0,2 2 0,0 0 0,-2-3 0,5 3 0,-3-1 0,1-2 0,2 3 0,-5-1 0,2-1 0,0 4 0,-3-5 0,6 2 0,-2 1 0,-1-3 0,0 4 0,0-3 0,-2 1 0,2 0 0,-1-2 0,2 2 0,0 0 0,-1-1 0,-1 4 0,-1-5 0,5 2 0,-6 1 0,3-3 0,-3 6 0,0-5 0,0 2 0,3 0 0,-2-3 0,2 6 0,-3-6 0,0 2 0,3 1 0,-2-3 0,2 6 0,0-2 0,-2-1 0,2 4 0,-3-6 0,0 2 0,3-1 0,-2 2 0,2 0 0,0-1 0,-3 0 0,3 1 0,-3 0 0,3 3 0,-2-3 0,3 4 0,-4-4 0,0 3 0,0-3 0,0 0 0,0-1 0,0 0 0,0-3 0,0 5 0,0-4 0,2 1 0,-1 0 0,2-2 0,-3 6 0,0-6 0,3 3 0,-2-1 0,1-2 0,-2 5 0,0-4 0,0 1 0,0 1 0,0-3 0,0 6 0,0-6 0,0 6 0,0-5 0,0 2 0,0 0 0,0-2 0,3 5 0,-2-6 0,2 3 0,-3 0 0,0-3 0,3 3 0,-2 0 0,2-3 0,0 6 0,-3-2 0,3 3 0,-3-3 0,0 3 0,0-7 0,0 7 0,0-7 0,0 7 0,3-6 0,-2 2 0,2-1 0,0-1 0,-2 4 0,2-4 0,0 1 0,-3 1 0,3-2 0,0 5 0,-2-6 0,2 6 0,-3-5 0,3 2 0,-3 0 0,6-3 0,4-23 0,-5 10 0,3-21 0,-8 21 0,4-4 0,-3 2 0,2-6 0,0 7 0,-3-7 0,3 7 0,-3-7 0,3 6 0,-2-2 0,5 1 0,-5 1 0,2-4 0,-3 5 0,0-5 0,0 5 0,0-3 0,0 0 0,0 3 0,0-7 0,0 7 0,0-2 0,0-3 0,0 39 0,0-24 0,0 36 0,0-32 0,0 7 0,0-7 0,0 7 0,3-6 0,-3 2 0,3 0 0,-3-3 0,3 7 0,-2-4 0,2 1 0,-3-1 0,0-1 0,3-2 0,-3 6 0,6-6 0,-5 2 0,5 1 0,-6-3 0,3 6 0,-3-6 0,3 3 0,-2-1 0,2-2 0,-3 5 0,0-1 0,0-1 0,0 1 0,0-2 0,0-2 0,0 6 0,0-6 0,0 2 0,0 1 0,0-3 0,0 6 0,0-3 0,0 1 0,0 3 0,0-7 0,0 3 0,0 1 0,0-4 0,0 10 0,0-9 0,0 5 0,0 0 0,0-4 0,0 4 0,0-4 0,0-2 0,0 5 0,0-4 0,0 1 0,0 1 0,0-3 0,0 6 0,0-6 0,0 2 0,0 0 0,0 1 0,0 0 0,0 1 0,0-4 0,0 5 0,0-5 0,0 3 0,0-1 0,0-1 0,0 4 0,0-4 0,0 1 0,0 1 0,0-3 0,0 5 0,0-5 0,0 3 0,0-1 0,0 0 0,0 1 0,0 0 0,-3-1 0,2-2 0,-5 3 0,6-1 0,-6-1 0,0 1 0,2-3 0,-1 4 0,2-3 0,-1 3 0,-2-1 0,-1-2 0,1 1 0,0-1 0,3 2 0,-6-2 0,8 2 0,-8-3 0,6 1 0,-7 0 0,3-1 0,-3-2 0,2 1 0,-3-4 0,1 2 0,0 0 0,0-3 0,-1 3 0,-4-3 0,4 3 0,-3-2 0,3 2 0,0 0 0,1-2 0,0 1 0,2-2 0,-5 0 0,6 0 0,-2 0 0,-4 0 0,4 0 0,-7 0 0,8 0 0,-2 0 0,0 0 0,2 0 0,-5 0 0,6 0 0,-3 0 0,1 0 0,-1 0 0,0 0 0,-1 0 0,3-13 0,-2 4 0,3-13 0,3 8 0,-3-5 0,6-1 0,-2-4 0,-1 0 0,3-5 0,-2-1 0,3-5 0,0 1 0,0 3 0,0-2 0,0 3 0,0 0 0,3 1 0,2 5 0,2 4 0,1 1 0,-4 5 0,2-1 0,-1-4 0,-1-1 0,3-4 0,-2 0 0,2 4 0,1-3 0,0 3 0,0 0 0,-1 5 0,-3 4 0,2 5 0,-5-3 0,2-1 0,-3 0 0,0 1 0,0-1 0,0 3 0,0-6 0,0 6 0,11 0 0,-2 18 0,8 3 0,-6 12 0,-3-2 0,4 0 0,-4 0 0,4-4 0,-4 3 0,-1-7 0,1 3 0,-1-4 0,0-1 0,1 1 0,-4-4 0,2-1 0,-2 0 0,0-2 0,2 2 0,-5 0 0,5-2 0,-6 2 0,6 0 0,-5-3 0,5 2 0,-2 1 0,2-3 0,-2 7 0,2-7 0,-6 7 0,7-3 0,-7 0 0,7 3 0,-6-3 0,5 0 0,-5 3 0,5-7 0,-6 3 0,6 0 0,-2-3 0,0 3 0,7-4 0,-9 0 0,9 1 0,-7 2 0,2-2 0,-2 3 0,2-1 0,-6-2 0,3 5 0,3-5 0,-5 2 0,11-3 0,-8 1 0,2-1 0,3 1 0,-5-1 0,7-2 0,-4 1 0,2-4 0,0 2 0,-2-3 0,0-12 0,-7 3 0,-4-12 0,-4 3 0,1 2 0,-1-7 0,0 3 0,3 0 0,-2-3 0,3 7 0,-4-3 0,1 5 0,3-1 0,-3 0 0,3 1 0,0-1 0,-2 0 0,5 1 0,-5-1 0,5 0 0,-6 4 0,7-3 0,-3 3 0,3 0 0,-3-3 0,2 7 0,-2-6 0,-1 2 0,3 0 0,-5 1 0,6 0 0,-3 3 0,0-4 0,-1 1 0,0 3 0,-3-7 0,7 6 0,-7-2 0,7 0 0,-6 3 0,5-4 0,-5 2 0,3 2 0,-1-7 0,-2 7 0,5-3 0,-5 0 0,6 3 0,-3-6 0,3 6 0,0-2 0,0 0 0,0-1 0,0 0 0,0 1 0,0-4 0,0 5 0,0-9 0,0 6 0,0 0 0,0-3 0,0 3 0,0-4 0,0 4 0,0-3 0,0 3 0,0 0 0,0 1 0,0 0 0,0 3 0,0-6 0,0 6 0,0-2 0,0-1 0,3 3 0,0-5 0,1 5 0,2-2 0,-3 0 0,1 2 0,2-2 0,-3 2 0,1-3 0,2 2 0,-2-2 0,2 1 0,-2 1 0,2-1 0,-6 0 0,3 2 0,-3-5 0,-5 6 0,3 38 0,-3-10 0,5 31 0,4-19 0,0-4 0,1 0 0,3 4 0,-7-9 0,6 0 0,-6-2 0,2-7 0,1 3 0,-4-5 0,4-3 0,-4 3 0,0-6 0,3 2 0,-3-1 0,3-1 0,1 8 0,-4-8 0,4 5 0,-4-3 0,0-3 0,3 9 0,-2-7 0,2 7 0,-3-8 0,0 6 0,0-7 0,0 7 0,0-7 0,0 3 0,0 0 0,0-3 0,0 6 0,0-2 0,0-1 0,0 4 0,0-6 0,0 2 0,0 0 0,0-3 0,0 7 0,0-7 0,0 3 0,0-1 0,0-2 0,0 6 0,0-6 0,0 5 0,0-3 0,0 1 0,0 0 0,0-1 0,3-2 0,-2 6 0,2-6 0,-3 3 0,5-1 0,-4-2 0,8 2 0,-6-3 0,4 4 0,0-3 0,-4 3 0,5-1 0,-6-2 0,3 2 0,1 1 0,-2-6 0,6 8 0,-4-8 0,1 5 0,-1 1 0,-2-3 0,-1 3 0,0-1 0,-3-2 0,3 5 0,-3-3 0,0 1 0,0 1 0,0-4 0,0 4 0,0-1 0,0 0 0,-11-4 0,6-4 0,-10-5 0,8-4 0,-4-8 0,-1-9 0,-1-2 0,-4-12 0,4 6 0,-5-9 0,4 6 0,-2 0 0,6 5 0,-2 1 0,4 5 0,3 0 0,-2 4 0,7-3 0,-7 7 0,6-3 0,-5 8 0,5-2 0,-2 5 0,3-6 0,-2 7 0,1-3 0,-5 0 0,3 3 0,-4-2 0,4 0 0,-3 2 0,3-2 0,-1-2 0,-2 4 0,2-11 0,0 6 0,-3-11 0,6 3 0,-6-4 0,3 4 0,-1-8 0,-1 11 0,5-16 0,-6 16 0,7-11 0,-4 13 0,1-4 0,2 4 0,-2 0 0,0 4 0,2-2 0,-2 5 0,0-2 0,3 1 0,-6 2 0,3-5 0,-1 5 0,-1-2 0,-1 0 0,1 2 0,-3-2 0,1 2 0,3 1 0,-5-1 0,6 0 0,-4-2 0,3 1 0,-2-1 0,3 3 0</inkml:trace>
+</inkml:ink>
+</file>
+
+<file path=ppt/ink/ink147.xml><?xml version="1.0" encoding="utf-8"?>
+<inkml:ink xmlns:inkml="http://www.w3.org/2003/InkML">
+  <inkml:definitions>
+    <inkml:context xml:id="ctx0">
+      <inkml:inkSource xml:id="inkSrc0">
+        <inkml:traceFormat>
+          <inkml:channel name="X" type="integer" min="-2.14748E9" max="2.14748E9" units="cm"/>
+          <inkml:channel name="Y" type="integer" min="-2.14748E9" max="2.14748E9" units="cm"/>
+          <inkml:channel name="F" type="integer" max="32767" units="dev"/>
+        </inkml:traceFormat>
+        <inkml:channelProperties>
+          <inkml:channelProperty channel="X" name="resolution" value="1000" units="1/cm"/>
+          <inkml:channelProperty channel="Y" name="resolution" value="1000" units="1/cm"/>
+          <inkml:channelProperty channel="F" name="resolution" value="0" units="1/dev"/>
+        </inkml:channelProperties>
+      </inkml:inkSource>
+      <inkml:timestamp xml:id="ts0" timeString="2022-09-11T15:11:50.938"/>
+    </inkml:context>
+    <inkml:brush xml:id="br0">
+      <inkml:brushProperty name="width" value="0.1" units="cm"/>
+      <inkml:brushProperty name="height" value="0.1" units="cm"/>
+    </inkml:brush>
+  </inkml:definitions>
+  <inkml:trace contextRef="#ctx0" brushRef="#br0">0 0 24575,'0'28'0,"0"-1"0,0 2 0,0 11 0,0 19 0,0 14 0,0-12 0,4 37 0,-3-46 0,3 27 0,0-42 0,-3-8 0,2-5 0,-3 11 0,0-13 0,0 23 0,0-23 0,0 26 0,0-20 0,0 22 0,0-27 0,0 18 0,0-27 0,0 19 0,0-20 0,0 27 0,0-21 0,0 21 0,0-23 0,0 9 0,0-14 0,0 4 0,0-9 0,0 2 0,0-3 0,0 0 0,0 1 0,0-1 0,0 0 0,0 1 0,0-1 0,0 1 0,0-1 0,0 1 0,0-1 0,0 1 0,0 0 0,0-1 0,0 1 0,0-1 0,0 1 0,0-1 0,0 1 0,0-1 0,0 1 0,0-1 0,0-3 0,0 0 0</inkml:trace>
+</inkml:ink>
+</file>
+
+<file path=ppt/ink/ink148.xml><?xml version="1.0" encoding="utf-8"?>
+<inkml:ink xmlns:inkml="http://www.w3.org/2003/InkML">
+  <inkml:definitions>
+    <inkml:context xml:id="ctx0">
+      <inkml:inkSource xml:id="inkSrc0">
+        <inkml:traceFormat>
+          <inkml:channel name="X" type="integer" min="-2.14748E9" max="2.14748E9" units="cm"/>
+          <inkml:channel name="Y" type="integer" min="-2.14748E9" max="2.14748E9" units="cm"/>
+          <inkml:channel name="F" type="integer" max="32767" units="dev"/>
+        </inkml:traceFormat>
+        <inkml:channelProperties>
+          <inkml:channelProperty channel="X" name="resolution" value="1000" units="1/cm"/>
+          <inkml:channelProperty channel="Y" name="resolution" value="1000" units="1/cm"/>
+          <inkml:channelProperty channel="F" name="resolution" value="0" units="1/dev"/>
+        </inkml:channelProperties>
+      </inkml:inkSource>
+      <inkml:timestamp xml:id="ts0" timeString="2022-09-11T15:11:53.065"/>
+    </inkml:context>
+    <inkml:brush xml:id="br0">
+      <inkml:brushProperty name="width" value="0.1" units="cm"/>
+      <inkml:brushProperty name="height" value="0.1" units="cm"/>
+    </inkml:brush>
+  </inkml:definitions>
+  <inkml:trace contextRef="#ctx0" brushRef="#br0">22 0 24575,'0'13'0,"0"7"0,0-4 0,0 13 0,0-4 0,0 15 0,0-13 0,0 12 0,0 23 0,0 2 0,0 13 0,0-20 0,0 31 0,0-41 0,0 8 0,0-1 0,0-12 0,0 17 0,0 1 0,0-11 0,0 14 0,0-2 0,0-18 0,0 18 0,0-27 0,-3 13 0,2-13 0,-3 21 0,4-33 0,0 8 0,0-19 0,0 2 0,0-7 0,0 1 0,0-1 0,-3 0 0,2 0 0,-2 5 0,1-4 0,1 3 0,-2-3 0,3-1 0,0 1 0,0 0 0,0-1 0,0 1 0,0-1 0,0 0 0,0 0 0,0 1 0,0-1 0,0-3 0,0 0 0</inkml:trace>
+</inkml:ink>
+</file>
+
+<file path=ppt/ink/ink149.xml><?xml version="1.0" encoding="utf-8"?>
+<inkml:ink xmlns:inkml="http://www.w3.org/2003/InkML">
+  <inkml:definitions>
+    <inkml:context xml:id="ctx0">
+      <inkml:inkSource xml:id="inkSrc0">
+        <inkml:traceFormat>
+          <inkml:channel name="X" type="integer" min="-2.14748E9" max="2.14748E9" units="cm"/>
+          <inkml:channel name="Y" type="integer" min="-2.14748E9" max="2.14748E9" units="cm"/>
+          <inkml:channel name="F" type="integer" max="32767" units="dev"/>
+        </inkml:traceFormat>
+        <inkml:channelProperties>
+          <inkml:channelProperty channel="X" name="resolution" value="1000" units="1/cm"/>
+          <inkml:channelProperty channel="Y" name="resolution" value="1000" units="1/cm"/>
+          <inkml:channelProperty channel="F" name="resolution" value="0" units="1/dev"/>
+        </inkml:channelProperties>
+      </inkml:inkSource>
+      <inkml:timestamp xml:id="ts0" timeString="2022-09-11T15:21:34.666"/>
+    </inkml:context>
+    <inkml:brush xml:id="br0">
+      <inkml:brushProperty name="width" value="0.1" units="cm"/>
+      <inkml:brushProperty name="height" value="0.1" units="cm"/>
+    </inkml:brush>
+  </inkml:definitions>
+  <inkml:trace contextRef="#ctx0" brushRef="#br0">1 315 24575,'0'-17'0,"0"-6"0,0 11 0,0-7 0,0 12 0,2-2 0,-1 3 0,5 2 0,-6-1 0,6-2 0,-5-1 0,6-10 0,-3 6 0,4-6 0,-1 3 0,0 0 0,-3 4 0,3 1 0,-7 3 0,3 1 0,-3-3 0,0 2 0,0-2 0,0 3 0,0 0 0,0-1 0,3 1 0,1 0 0,2-1 0,-2 1 0,1-1 0,-1 1 0,2 3 0,-3 3 0,0 3 0,-3 3 0,0 0 0,0 0 0,0 1 0,0-1 0,0 0 0,0 1 0,0-1 0,0 0 0,0 1 0,0-1 0,0 0 0,0 1 0,0-1 0,0 1 0,0 3 0,0-2 0,3 2 0,1-4 0,-1 1 0,0 0 0,0-1 0,-2 1 0,2-1 0,-3 1 0,2-4 0,-1 3 0,2-3 0,0 4 0,-3-1 0,3 1 0,-3 0 0,3-1 0,-2 1 0,5-3 0,-6 1 0,6-4 0,-3 2 0,4-3 0,-1 3 0,1 0 0,-1 1 0,-2 2 0,2-5 0,-3 4 0,4-4 0,-4 4 0,3-4 0,-5 5 0,4-3 0,-1 4 0,0-1 0,1-2 0,-4 1 0,5-1 0,-2 2 0,2 1 0,1-1 0,-4 1 0,3 0 0,-2 3 0,0-3 0,2 3 0,-5-3 0,5 0 0,-6-1 0,6 1 0,-5-1 0,2 0 0,0 1 0,-3-1 0,3 1 0,0-1 0,-2 1 0,2-1 0,-3 1 0,3-1 0,-3 0 0,6 4 0,-5-2 0,6 10 0,-6-6 0,5 3 0,-5-1 0,5-7 0,-5 3 0,1-3 0,-2 0 0,0-4 0,0 0 0</inkml:trace>
 </inkml:ink>
 </file>
 
@@ -3544,14 +3625,14 @@
           <inkml:channelProperty channel="F" name="resolution" value="0" units="1/dev"/>
         </inkml:channelProperties>
       </inkml:inkSource>
-      <inkml:timestamp xml:id="ts0" timeString="2022-09-11T15:11:50.938"/>
+      <inkml:timestamp xml:id="ts0" timeString="2022-09-11T15:12:13.026"/>
     </inkml:context>
     <inkml:brush xml:id="br0">
       <inkml:brushProperty name="width" value="0.1" units="cm"/>
       <inkml:brushProperty name="height" value="0.1" units="cm"/>
     </inkml:brush>
   </inkml:definitions>
-  <inkml:trace contextRef="#ctx0" brushRef="#br0">0 0 24575,'0'28'0,"0"-1"0,0 2 0,0 11 0,0 19 0,0 14 0,0-12 0,4 37 0,-3-46 0,3 27 0,0-42 0,-3-8 0,2-5 0,-3 11 0,0-13 0,0 23 0,0-23 0,0 26 0,0-20 0,0 22 0,0-27 0,0 18 0,0-27 0,0 19 0,0-20 0,0 27 0,0-21 0,0 21 0,0-23 0,0 9 0,0-14 0,0 4 0,0-9 0,0 2 0,0-3 0,0 0 0,0 1 0,0-1 0,0 0 0,0 1 0,0-1 0,0 1 0,0-1 0,0 1 0,0-1 0,0 1 0,0 0 0,0-1 0,0 1 0,0-1 0,0 1 0,0-1 0,0 1 0,0-1 0,0 1 0,0-1 0,0-3 0,0 0 0</inkml:trace>
+  <inkml:trace contextRef="#ctx0" brushRef="#br0">1 0 24575,'0'28'0,"0"9"0,0 17 0,0-3 0,0 14 0,5 31 0,-4-30 0,5 5 0,1-1 0,0 1 0,10 15 0,-6-34 0,14 26 0,-13-27 0,14 42 0,-21-59 0,7 37 0,-11-45 0,6 29 0,-7-41 0,4 5 0,-1-12 0,-3-1 0,3 1 0,-3-1 0,0 4 0,3 7 0,-2 0 0,3 24 0,-4-25 0,0 17 0,2-25 0,-1 11 0,5-7 0,-5 9 0,5-7 0,-5 10 0,2-10 0,0 11 0,-2-17 0,2 2 0,-3-8 0</inkml:trace>
 </inkml:ink>
 </file>
 
@@ -3598,60 +3679,6 @@
           <inkml:channelProperty channel="F" name="resolution" value="0" units="1/dev"/>
         </inkml:channelProperties>
       </inkml:inkSource>
-      <inkml:timestamp xml:id="ts0" timeString="2022-09-11T15:11:53.065"/>
-    </inkml:context>
-    <inkml:brush xml:id="br0">
-      <inkml:brushProperty name="width" value="0.1" units="cm"/>
-      <inkml:brushProperty name="height" value="0.1" units="cm"/>
-    </inkml:brush>
-  </inkml:definitions>
-  <inkml:trace contextRef="#ctx0" brushRef="#br0">22 0 24575,'0'13'0,"0"7"0,0-4 0,0 13 0,0-4 0,0 15 0,0-13 0,0 12 0,0 23 0,0 2 0,0 13 0,0-20 0,0 31 0,0-41 0,0 8 0,0-1 0,0-12 0,0 17 0,0 1 0,0-11 0,0 14 0,0-2 0,0-18 0,0 18 0,0-27 0,-3 13 0,2-13 0,-3 21 0,4-33 0,0 8 0,0-19 0,0 2 0,0-7 0,0 1 0,0-1 0,-3 0 0,2 0 0,-2 5 0,1-4 0,1 3 0,-2-3 0,3-1 0,0 1 0,0 0 0,0-1 0,0 1 0,0-1 0,0 0 0,0 0 0,0 1 0,0-1 0,0-3 0,0 0 0</inkml:trace>
-</inkml:ink>
-</file>
-
-<file path=ppt/ink/ink81.xml><?xml version="1.0" encoding="utf-8"?>
-<inkml:ink xmlns:inkml="http://www.w3.org/2003/InkML">
-  <inkml:definitions>
-    <inkml:context xml:id="ctx0">
-      <inkml:inkSource xml:id="inkSrc0">
-        <inkml:traceFormat>
-          <inkml:channel name="X" type="integer" min="-2.14748E9" max="2.14748E9" units="cm"/>
-          <inkml:channel name="Y" type="integer" min="-2.14748E9" max="2.14748E9" units="cm"/>
-          <inkml:channel name="F" type="integer" max="32767" units="dev"/>
-        </inkml:traceFormat>
-        <inkml:channelProperties>
-          <inkml:channelProperty channel="X" name="resolution" value="1000" units="1/cm"/>
-          <inkml:channelProperty channel="Y" name="resolution" value="1000" units="1/cm"/>
-          <inkml:channelProperty channel="F" name="resolution" value="0" units="1/dev"/>
-        </inkml:channelProperties>
-      </inkml:inkSource>
-      <inkml:timestamp xml:id="ts0" timeString="2022-09-11T15:12:13.026"/>
-    </inkml:context>
-    <inkml:brush xml:id="br0">
-      <inkml:brushProperty name="width" value="0.1" units="cm"/>
-      <inkml:brushProperty name="height" value="0.1" units="cm"/>
-    </inkml:brush>
-  </inkml:definitions>
-  <inkml:trace contextRef="#ctx0" brushRef="#br0">1 0 24575,'0'28'0,"0"9"0,0 17 0,0-3 0,0 14 0,5 31 0,-4-30 0,5 5 0,1-1 0,0 1 0,10 15 0,-6-34 0,14 26 0,-13-27 0,14 42 0,-21-59 0,7 37 0,-11-45 0,6 29 0,-7-41 0,4 5 0,-1-12 0,-3-1 0,3 1 0,-3-1 0,0 4 0,3 7 0,-2 0 0,3 24 0,-4-25 0,0 17 0,2-25 0,-1 11 0,5-7 0,-5 9 0,5-7 0,-5 10 0,2-10 0,0 11 0,-2-17 0,2 2 0,-3-8 0</inkml:trace>
-</inkml:ink>
-</file>
-
-<file path=ppt/ink/ink82.xml><?xml version="1.0" encoding="utf-8"?>
-<inkml:ink xmlns:inkml="http://www.w3.org/2003/InkML">
-  <inkml:definitions>
-    <inkml:context xml:id="ctx0">
-      <inkml:inkSource xml:id="inkSrc0">
-        <inkml:traceFormat>
-          <inkml:channel name="X" type="integer" min="-2.14748E9" max="2.14748E9" units="cm"/>
-          <inkml:channel name="Y" type="integer" min="-2.14748E9" max="2.14748E9" units="cm"/>
-          <inkml:channel name="F" type="integer" max="32767" units="dev"/>
-        </inkml:traceFormat>
-        <inkml:channelProperties>
-          <inkml:channelProperty channel="X" name="resolution" value="1000" units="1/cm"/>
-          <inkml:channelProperty channel="Y" name="resolution" value="1000" units="1/cm"/>
-          <inkml:channelProperty channel="F" name="resolution" value="0" units="1/dev"/>
-        </inkml:channelProperties>
-      </inkml:inkSource>
       <inkml:timestamp xml:id="ts0" timeString="2022-09-11T15:12:14.537"/>
     </inkml:context>
     <inkml:brush xml:id="br0">
@@ -3663,7 +3690,7 @@
 </inkml:ink>
 </file>
 
-<file path=ppt/ink/ink83.xml><?xml version="1.0" encoding="utf-8"?>
+<file path=ppt/ink/ink81.xml><?xml version="1.0" encoding="utf-8"?>
 <inkml:ink xmlns:inkml="http://www.w3.org/2003/InkML">
   <inkml:definitions>
     <inkml:context xml:id="ctx0">
@@ -3690,7 +3717,7 @@
 </inkml:ink>
 </file>
 
-<file path=ppt/ink/ink84.xml><?xml version="1.0" encoding="utf-8"?>
+<file path=ppt/ink/ink82.xml><?xml version="1.0" encoding="utf-8"?>
 <inkml:ink xmlns:inkml="http://www.w3.org/2003/InkML">
   <inkml:definitions>
     <inkml:context xml:id="ctx0">
@@ -3717,7 +3744,7 @@
 </inkml:ink>
 </file>
 
-<file path=ppt/ink/ink85.xml><?xml version="1.0" encoding="utf-8"?>
+<file path=ppt/ink/ink83.xml><?xml version="1.0" encoding="utf-8"?>
 <inkml:ink xmlns:inkml="http://www.w3.org/2003/InkML">
   <inkml:definitions>
     <inkml:context xml:id="ctx0">
@@ -3744,7 +3771,7 @@
 </inkml:ink>
 </file>
 
-<file path=ppt/ink/ink86.xml><?xml version="1.0" encoding="utf-8"?>
+<file path=ppt/ink/ink84.xml><?xml version="1.0" encoding="utf-8"?>
 <inkml:ink xmlns:inkml="http://www.w3.org/2003/InkML">
   <inkml:definitions>
     <inkml:context xml:id="ctx0">
@@ -3771,7 +3798,7 @@
 </inkml:ink>
 </file>
 
-<file path=ppt/ink/ink87.xml><?xml version="1.0" encoding="utf-8"?>
+<file path=ppt/ink/ink85.xml><?xml version="1.0" encoding="utf-8"?>
 <inkml:ink xmlns:inkml="http://www.w3.org/2003/InkML">
   <inkml:definitions>
     <inkml:context xml:id="ctx0">
@@ -3798,7 +3825,7 @@
 </inkml:ink>
 </file>
 
-<file path=ppt/ink/ink88.xml><?xml version="1.0" encoding="utf-8"?>
+<file path=ppt/ink/ink86.xml><?xml version="1.0" encoding="utf-8"?>
 <inkml:ink xmlns:inkml="http://www.w3.org/2003/InkML">
   <inkml:definitions>
     <inkml:context xml:id="ctx0">
@@ -3825,7 +3852,7 @@
 </inkml:ink>
 </file>
 
-<file path=ppt/ink/ink89.xml><?xml version="1.0" encoding="utf-8"?>
+<file path=ppt/ink/ink87.xml><?xml version="1.0" encoding="utf-8"?>
 <inkml:ink xmlns:inkml="http://www.w3.org/2003/InkML">
   <inkml:definitions>
     <inkml:context xml:id="ctx0">
@@ -3849,6 +3876,60 @@
     </inkml:brush>
   </inkml:definitions>
   <inkml:trace contextRef="#ctx0" brushRef="#br0">1 0 24575,'25'0'0,"-2"0"0,29 0 0,-12 0 0,27 0 0,-12 0 0,0 0 0,40 0 0,-37 0 0,3 0 0,-2 0 0,-9 0 0,22 0 0,-36 0 0,0 0 0,-9 0 0,12 0 0,-20 0 0,14 0 0,-13 0 0,15 0 0,-8 0 0,44 0 0,-33 0 0,23 0 0,-32 0 0,8 0 0,-17 0 0,20 0 0,-27 0 0,18 0 0,-15 0 0,15 0 0,-17 0 0,8 0 0,-14 0 0,4 3 0,-5-2 0,16 8 0,-13-7 0,9 4 0,-12-6 0,6 0 0,-8 0 0,4 0 0</inkml:trace>
+</inkml:ink>
+</file>
+
+<file path=ppt/ink/ink88.xml><?xml version="1.0" encoding="utf-8"?>
+<inkml:ink xmlns:inkml="http://www.w3.org/2003/InkML">
+  <inkml:definitions>
+    <inkml:context xml:id="ctx0">
+      <inkml:inkSource xml:id="inkSrc0">
+        <inkml:traceFormat>
+          <inkml:channel name="X" type="integer" min="-2.14748E9" max="2.14748E9" units="cm"/>
+          <inkml:channel name="Y" type="integer" min="-2.14748E9" max="2.14748E9" units="cm"/>
+          <inkml:channel name="F" type="integer" max="32767" units="dev"/>
+        </inkml:traceFormat>
+        <inkml:channelProperties>
+          <inkml:channelProperty channel="X" name="resolution" value="1000" units="1/cm"/>
+          <inkml:channelProperty channel="Y" name="resolution" value="1000" units="1/cm"/>
+          <inkml:channelProperty channel="F" name="resolution" value="0" units="1/dev"/>
+        </inkml:channelProperties>
+      </inkml:inkSource>
+      <inkml:timestamp xml:id="ts0" timeString="2022-09-11T15:12:34.352"/>
+    </inkml:context>
+    <inkml:brush xml:id="br0">
+      <inkml:brushProperty name="width" value="0.1" units="cm"/>
+      <inkml:brushProperty name="height" value="0.1" units="cm"/>
+    </inkml:brush>
+  </inkml:definitions>
+  <inkml:trace contextRef="#ctx0" brushRef="#br0">0 2 24575,'28'4'0,"3"-1"0,17-3 0,5 0 0,-4 0 0,10 0 0,17 0 0,12 0 0,-7 0 0,-25 0 0,-1 0 0,17 0 0,10 0 0,-20 0 0,-26 0 0,4 0 0,1 0 0,-4 0 0,9-4 0,-9 3 0,-1-3 0,-7 4 0,17 0 0,-21 0 0,19 0 0,-28 0 0,16 0 0,-18 0 0,13 0 0,-13 0 0,2 0 0,1 0 0,1 0 0,-3 0 0,-1 0 0,0 0 0,-3 0 0,-1 0 0,6 0 0,-8 0 0,5 0 0,-7 0 0,7 0 0,-5 0 0,4 0 0,-8 0 0,-1 0 0</inkml:trace>
+</inkml:ink>
+</file>
+
+<file path=ppt/ink/ink89.xml><?xml version="1.0" encoding="utf-8"?>
+<inkml:ink xmlns:inkml="http://www.w3.org/2003/InkML">
+  <inkml:definitions>
+    <inkml:context xml:id="ctx0">
+      <inkml:inkSource xml:id="inkSrc0">
+        <inkml:traceFormat>
+          <inkml:channel name="X" type="integer" min="-2.14748E9" max="2.14748E9" units="cm"/>
+          <inkml:channel name="Y" type="integer" min="-2.14748E9" max="2.14748E9" units="cm"/>
+          <inkml:channel name="F" type="integer" max="32767" units="dev"/>
+        </inkml:traceFormat>
+        <inkml:channelProperties>
+          <inkml:channelProperty channel="X" name="resolution" value="1000" units="1/cm"/>
+          <inkml:channelProperty channel="Y" name="resolution" value="1000" units="1/cm"/>
+          <inkml:channelProperty channel="F" name="resolution" value="0" units="1/dev"/>
+        </inkml:channelProperties>
+      </inkml:inkSource>
+      <inkml:timestamp xml:id="ts0" timeString="2022-09-11T15:12:36.101"/>
+    </inkml:context>
+    <inkml:brush xml:id="br0">
+      <inkml:brushProperty name="width" value="0.1" units="cm"/>
+      <inkml:brushProperty name="height" value="0.1" units="cm"/>
+    </inkml:brush>
+  </inkml:definitions>
+  <inkml:trace contextRef="#ctx0" brushRef="#br0">0 528 24575,'33'-8'0,"-1"-1"0,9-10 0,1 1 0,11-6 0,-4 4 0,41-16 0,-39 15 0,3-1 0,1 2 0,-6 0 0,14-8 0,-28 15 0,0-2 0,-8 2 0,27-9 0,-29 8 0,26-6 0,-33 15 0,10-5 0,-14 9 0,11-9 0,-8 5 0,3-2 0,-10 1 0,10 2 0,-4-3 0,13 3 0,-6-3 0,12-1 0,-8 3 0,19-10 0,-20 10 0,22-10 0,-24 10 0,4-4 0,-18 8 0,3-5 0,-6 5 0,3-4 0,-5 4 0,-1-2 0,-1 0 0,3 3 0,-2-6 0,2 5 0,1-2 0,-3 0 0,1 2 0,-4-4 0,2-3 0,-3 4 0,0-3 0</inkml:trace>
 </inkml:ink>
 </file>
 
@@ -3895,60 +3976,6 @@
           <inkml:channelProperty channel="F" name="resolution" value="0" units="1/dev"/>
         </inkml:channelProperties>
       </inkml:inkSource>
-      <inkml:timestamp xml:id="ts0" timeString="2022-09-11T15:12:34.352"/>
-    </inkml:context>
-    <inkml:brush xml:id="br0">
-      <inkml:brushProperty name="width" value="0.1" units="cm"/>
-      <inkml:brushProperty name="height" value="0.1" units="cm"/>
-    </inkml:brush>
-  </inkml:definitions>
-  <inkml:trace contextRef="#ctx0" brushRef="#br0">0 2 24575,'28'4'0,"3"-1"0,17-3 0,5 0 0,-4 0 0,10 0 0,17 0 0,12 0 0,-7 0 0,-25 0 0,-1 0 0,17 0 0,10 0 0,-20 0 0,-26 0 0,4 0 0,1 0 0,-4 0 0,9-4 0,-9 3 0,-1-3 0,-7 4 0,17 0 0,-21 0 0,19 0 0,-28 0 0,16 0 0,-18 0 0,13 0 0,-13 0 0,2 0 0,1 0 0,1 0 0,-3 0 0,-1 0 0,0 0 0,-3 0 0,-1 0 0,6 0 0,-8 0 0,5 0 0,-7 0 0,7 0 0,-5 0 0,4 0 0,-8 0 0,-1 0 0</inkml:trace>
-</inkml:ink>
-</file>
-
-<file path=ppt/ink/ink91.xml><?xml version="1.0" encoding="utf-8"?>
-<inkml:ink xmlns:inkml="http://www.w3.org/2003/InkML">
-  <inkml:definitions>
-    <inkml:context xml:id="ctx0">
-      <inkml:inkSource xml:id="inkSrc0">
-        <inkml:traceFormat>
-          <inkml:channel name="X" type="integer" min="-2.14748E9" max="2.14748E9" units="cm"/>
-          <inkml:channel name="Y" type="integer" min="-2.14748E9" max="2.14748E9" units="cm"/>
-          <inkml:channel name="F" type="integer" max="32767" units="dev"/>
-        </inkml:traceFormat>
-        <inkml:channelProperties>
-          <inkml:channelProperty channel="X" name="resolution" value="1000" units="1/cm"/>
-          <inkml:channelProperty channel="Y" name="resolution" value="1000" units="1/cm"/>
-          <inkml:channelProperty channel="F" name="resolution" value="0" units="1/dev"/>
-        </inkml:channelProperties>
-      </inkml:inkSource>
-      <inkml:timestamp xml:id="ts0" timeString="2022-09-11T15:12:36.101"/>
-    </inkml:context>
-    <inkml:brush xml:id="br0">
-      <inkml:brushProperty name="width" value="0.1" units="cm"/>
-      <inkml:brushProperty name="height" value="0.1" units="cm"/>
-    </inkml:brush>
-  </inkml:definitions>
-  <inkml:trace contextRef="#ctx0" brushRef="#br0">0 528 24575,'33'-8'0,"-1"-1"0,9-10 0,1 1 0,11-6 0,-4 4 0,41-16 0,-39 15 0,3-1 0,1 2 0,-6 0 0,14-8 0,-28 15 0,0-2 0,-8 2 0,27-9 0,-29 8 0,26-6 0,-33 15 0,10-5 0,-14 9 0,11-9 0,-8 5 0,3-2 0,-10 1 0,10 2 0,-4-3 0,13 3 0,-6-3 0,12-1 0,-8 3 0,19-10 0,-20 10 0,22-10 0,-24 10 0,4-4 0,-18 8 0,3-5 0,-6 5 0,3-4 0,-5 4 0,-1-2 0,-1 0 0,3 3 0,-2-6 0,2 5 0,1-2 0,-3 0 0,1 2 0,-4-4 0,2-3 0,-3 4 0,0-3 0</inkml:trace>
-</inkml:ink>
-</file>
-
-<file path=ppt/ink/ink92.xml><?xml version="1.0" encoding="utf-8"?>
-<inkml:ink xmlns:inkml="http://www.w3.org/2003/InkML">
-  <inkml:definitions>
-    <inkml:context xml:id="ctx0">
-      <inkml:inkSource xml:id="inkSrc0">
-        <inkml:traceFormat>
-          <inkml:channel name="X" type="integer" min="-2.14748E9" max="2.14748E9" units="cm"/>
-          <inkml:channel name="Y" type="integer" min="-2.14748E9" max="2.14748E9" units="cm"/>
-          <inkml:channel name="F" type="integer" max="32767" units="dev"/>
-        </inkml:traceFormat>
-        <inkml:channelProperties>
-          <inkml:channelProperty channel="X" name="resolution" value="1000" units="1/cm"/>
-          <inkml:channelProperty channel="Y" name="resolution" value="1000" units="1/cm"/>
-          <inkml:channelProperty channel="F" name="resolution" value="0" units="1/dev"/>
-        </inkml:channelProperties>
-      </inkml:inkSource>
       <inkml:timestamp xml:id="ts0" timeString="2022-09-11T15:12:38.061"/>
     </inkml:context>
     <inkml:brush xml:id="br0">
@@ -3960,7 +3987,7 @@
 </inkml:ink>
 </file>
 
-<file path=ppt/ink/ink93.xml><?xml version="1.0" encoding="utf-8"?>
+<file path=ppt/ink/ink91.xml><?xml version="1.0" encoding="utf-8"?>
 <inkml:ink xmlns:inkml="http://www.w3.org/2003/InkML">
   <inkml:definitions>
     <inkml:context xml:id="ctx0">
@@ -3987,7 +4014,7 @@
 </inkml:ink>
 </file>
 
-<file path=ppt/ink/ink94.xml><?xml version="1.0" encoding="utf-8"?>
+<file path=ppt/ink/ink92.xml><?xml version="1.0" encoding="utf-8"?>
 <inkml:ink xmlns:inkml="http://www.w3.org/2003/InkML">
   <inkml:definitions>
     <inkml:context xml:id="ctx0">
@@ -4014,7 +4041,7 @@
 </inkml:ink>
 </file>
 
-<file path=ppt/ink/ink95.xml><?xml version="1.0" encoding="utf-8"?>
+<file path=ppt/ink/ink93.xml><?xml version="1.0" encoding="utf-8"?>
 <inkml:ink xmlns:inkml="http://www.w3.org/2003/InkML">
   <inkml:definitions>
     <inkml:context xml:id="ctx0">
@@ -4041,7 +4068,7 @@
 </inkml:ink>
 </file>
 
-<file path=ppt/ink/ink96.xml><?xml version="1.0" encoding="utf-8"?>
+<file path=ppt/ink/ink94.xml><?xml version="1.0" encoding="utf-8"?>
 <inkml:ink xmlns:inkml="http://www.w3.org/2003/InkML">
   <inkml:definitions>
     <inkml:context xml:id="ctx0">
@@ -4068,7 +4095,7 @@
 </inkml:ink>
 </file>
 
-<file path=ppt/ink/ink97.xml><?xml version="1.0" encoding="utf-8"?>
+<file path=ppt/ink/ink95.xml><?xml version="1.0" encoding="utf-8"?>
 <inkml:ink xmlns:inkml="http://www.w3.org/2003/InkML">
   <inkml:definitions>
     <inkml:context xml:id="ctx0">
@@ -4095,7 +4122,7 @@
 </inkml:ink>
 </file>
 
-<file path=ppt/ink/ink98.xml><?xml version="1.0" encoding="utf-8"?>
+<file path=ppt/ink/ink96.xml><?xml version="1.0" encoding="utf-8"?>
 <inkml:ink xmlns:inkml="http://www.w3.org/2003/InkML">
   <inkml:definitions>
     <inkml:context xml:id="ctx0">
@@ -4122,7 +4149,7 @@
 </inkml:ink>
 </file>
 
-<file path=ppt/ink/ink99.xml><?xml version="1.0" encoding="utf-8"?>
+<file path=ppt/ink/ink97.xml><?xml version="1.0" encoding="utf-8"?>
 <inkml:ink xmlns:inkml="http://www.w3.org/2003/InkML">
   <inkml:definitions>
     <inkml:context xml:id="ctx0">
@@ -4146,6 +4173,60 @@
     </inkml:brush>
   </inkml:definitions>
   <inkml:trace contextRef="#ctx0" brushRef="#br0">0 1 24575,'28'0'0,"-7"0"0,43 9 0,-36-3 0,35 13 0,-36-6 0,46 23 0,-38-15 0,32 10 0,-43-17 0,3-2 0,-2-4 0,-6 5 0,0-8 0,-1 2 0,-4-1 0,0 1 0,-6 1 0,7 1 0,-10-2 0,8-4 0,-7 3 0,7-2 0,-5 3 0,10-1 0,-10-2 0,21 5 0,-15-7 0,26 10 0,-26-10 0,16 8 0,-22-7 0,12 4 0,-12-3 0,5 2 0,-6-5 0,6 7 0,-5-3 0,14 4 0,-13-2 0,13 0 0,-11-1 0,2 1 0,-4-3 0,1 1 0,-3-4 0,-1 5 0,0-6 0,-2 3 0,2-3 0,-2 3 0,1-2 0,-1 2 0,0 0 0,1-3 0,-1 3 0,2 0 0,0-2 0,-2 4 0,1-4 0,-1 2 0,2-3 0,1 3 0,0-3 0,-1 6 0,0-5 0,-2 1 0,-1-2 0</inkml:trace>
+</inkml:ink>
+</file>
+
+<file path=ppt/ink/ink98.xml><?xml version="1.0" encoding="utf-8"?>
+<inkml:ink xmlns:inkml="http://www.w3.org/2003/InkML">
+  <inkml:definitions>
+    <inkml:context xml:id="ctx0">
+      <inkml:inkSource xml:id="inkSrc0">
+        <inkml:traceFormat>
+          <inkml:channel name="X" type="integer" min="-2.14748E9" max="2.14748E9" units="cm"/>
+          <inkml:channel name="Y" type="integer" min="-2.14748E9" max="2.14748E9" units="cm"/>
+          <inkml:channel name="F" type="integer" max="32767" units="dev"/>
+        </inkml:traceFormat>
+        <inkml:channelProperties>
+          <inkml:channelProperty channel="X" name="resolution" value="1000" units="1/cm"/>
+          <inkml:channelProperty channel="Y" name="resolution" value="1000" units="1/cm"/>
+          <inkml:channelProperty channel="F" name="resolution" value="0" units="1/dev"/>
+        </inkml:channelProperties>
+      </inkml:inkSource>
+      <inkml:timestamp xml:id="ts0" timeString="2022-09-11T15:13:03.714"/>
+    </inkml:context>
+    <inkml:brush xml:id="br0">
+      <inkml:brushProperty name="width" value="0.1" units="cm"/>
+      <inkml:brushProperty name="height" value="0.1" units="cm"/>
+    </inkml:brush>
+  </inkml:definitions>
+  <inkml:trace contextRef="#ctx0" brushRef="#br0">1 0 24575,'18'0'0,"-1"0"0,2 0 0,-3 4 0,3-3 0,0 5 0,13 5 0,-4-5 0,22 11 0,-20-12 0,3 6 0,-12-7 0,4 3 0,-8-3 0,13 3 0,-18 0 0,14-1 0,-17-2 0,19 2 0,-18-5 0,9 5 0,-15-3 0,4 1 0,-3 2 0,4-6 0,-2 3 0,-1 0 0,1-2 0,-1 5 0,5-2 0,0 3 0,3 0 0,1-3 0,0 3 0,-1-3 0,1 0 0,0 2 0,-1-2 0,1 4 0,-4-4 0,3 2 0,-7-5 0,4 5 0,-5-5 0,1 2 0,-1 0 0,0-3 0,1 3 0,-1-3 0,1 3 0,0 1 0,-1 0 0,1 1 0,-1-4 0,1 2 0,0 0 0,-1-2 0,0 1 0,1-2 0,-1 0 0,4 4 0,-2-1 0,2 4 0,-3-3 0,-1-1 0,-2 0 0,-1-3 0,-3 3 0</inkml:trace>
+</inkml:ink>
+</file>
+
+<file path=ppt/ink/ink99.xml><?xml version="1.0" encoding="utf-8"?>
+<inkml:ink xmlns:inkml="http://www.w3.org/2003/InkML">
+  <inkml:definitions>
+    <inkml:context xml:id="ctx0">
+      <inkml:inkSource xml:id="inkSrc0">
+        <inkml:traceFormat>
+          <inkml:channel name="X" type="integer" min="-2.14748E9" max="2.14748E9" units="cm"/>
+          <inkml:channel name="Y" type="integer" min="-2.14748E9" max="2.14748E9" units="cm"/>
+          <inkml:channel name="F" type="integer" max="32767" units="dev"/>
+        </inkml:traceFormat>
+        <inkml:channelProperties>
+          <inkml:channelProperty channel="X" name="resolution" value="1000" units="1/cm"/>
+          <inkml:channelProperty channel="Y" name="resolution" value="1000" units="1/cm"/>
+          <inkml:channelProperty channel="F" name="resolution" value="0" units="1/dev"/>
+        </inkml:channelProperties>
+      </inkml:inkSource>
+      <inkml:timestamp xml:id="ts0" timeString="2022-09-11T15:13:05.681"/>
+    </inkml:context>
+    <inkml:brush xml:id="br0">
+      <inkml:brushProperty name="width" value="0.1" units="cm"/>
+      <inkml:brushProperty name="height" value="0.1" units="cm"/>
+    </inkml:brush>
+  </inkml:definitions>
+  <inkml:trace contextRef="#ctx0" brushRef="#br0">1 0 24575,'9'0'0,"13"0"0,-2 0 0,5 0 0,-4 0 0,-2 0 0,18 11 0,-13-5 0,23 12 0,-25-6 0,11 4 0,-2-1 0,-11-4 0,5 0 0,-10-7 0,1 3 0,2-3 0,-3 0 0,0 2 0,4-5 0,-4 6 0,4-3 0,-4 0 0,-1 2 0,1-5 0,-4 5 0,3-5 0,-3 2 0,0-3 0,3 0 0,-3 0 0,4 0 0,-1 0 0,1 0 0,4 3 0,-3-2 0,7 3 0,-8-4 0,15 0 0,-13 0 0,9 0 0,-15 0 0,-1 0 0,-3 0 0,-1 0 0,1 0 0,-1 0 0,1 0 0,-1 0 0,1 0 0,-1 0 0,1 0 0,3 0 0,-3 0 0,4 0 0,-5 0 0,1 3 0,0-2 0,-1 2 0,0-3 0,1 0 0,-1 0 0,1 0 0,-1 0 0,1 2 0,3-1 0,-2 2 0,2-3 0,-4 3 0,1-2 0,0 2 0,-1-3 0,1 0 0,-1 3 0,1-3 0,0 3 0,-1-3 0,1 3 0,0-2 0,-1 2 0,-2-3 0,-2 0 0</inkml:trace>
 </inkml:ink>
 </file>
 
@@ -10931,7 +11012,7 @@
         </p:nvGrpSpPr>
         <p:grpSpPr>
           <a:xfrm>
-            <a:off x="5735364" y="652944"/>
+            <a:off x="2724309" y="569817"/>
             <a:ext cx="6216480" cy="3162960"/>
             <a:chOff x="5735364" y="652944"/>
             <a:chExt cx="6216480" cy="3162960"/>
@@ -11126,7 +11207,7 @@
         </p:nvSpPr>
         <p:spPr>
           <a:xfrm>
-            <a:off x="7523023" y="1019466"/>
+            <a:off x="4511968" y="936339"/>
             <a:ext cx="3151055" cy="369332"/>
           </a:xfrm>
           <a:prstGeom prst="rect">
@@ -11161,7 +11242,7 @@
         </p:nvSpPr>
         <p:spPr>
           <a:xfrm>
-            <a:off x="7493890" y="6048998"/>
+            <a:off x="4482835" y="5965871"/>
             <a:ext cx="3784754" cy="369332"/>
           </a:xfrm>
           <a:prstGeom prst="rect">
@@ -11197,7 +11278,7 @@
               <p14:nvPr/>
             </p14:nvContentPartPr>
             <p14:xfrm>
-              <a:off x="6759744" y="5132547"/>
+              <a:off x="3748689" y="5049420"/>
               <a:ext cx="901800" cy="821520"/>
             </p14:xfrm>
           </p:contentPart>
@@ -11223,7 +11304,7 @@
             </p:blipFill>
             <p:spPr>
               <a:xfrm>
-                <a:off x="6742104" y="5114547"/>
+                <a:off x="3731049" y="5031420"/>
                 <a:ext cx="937440" cy="857160"/>
               </a:xfrm>
               <a:prstGeom prst="rect">
@@ -11248,7 +11329,7 @@
               <p14:nvPr/>
             </p14:nvContentPartPr>
             <p14:xfrm>
-              <a:off x="8035982" y="5158344"/>
+              <a:off x="5024927" y="5075217"/>
               <a:ext cx="968400" cy="795960"/>
             </p14:xfrm>
           </p:contentPart>
@@ -11274,7 +11355,7 @@
             </p:blipFill>
             <p:spPr>
               <a:xfrm>
-                <a:off x="8018342" y="5140704"/>
+                <a:off x="5007287" y="5057577"/>
                 <a:ext cx="1004040" cy="831600"/>
               </a:xfrm>
               <a:prstGeom prst="rect">
@@ -11299,7 +11380,7 @@
               <p14:nvPr/>
             </p14:nvContentPartPr>
             <p14:xfrm>
-              <a:off x="9494124" y="5165184"/>
+              <a:off x="6483069" y="5082057"/>
               <a:ext cx="847440" cy="723600"/>
             </p14:xfrm>
           </p:contentPart>
@@ -11325,7 +11406,7 @@
             </p:blipFill>
             <p:spPr>
               <a:xfrm>
-                <a:off x="9476124" y="5147544"/>
+                <a:off x="6465069" y="5064417"/>
                 <a:ext cx="883080" cy="759240"/>
               </a:xfrm>
               <a:prstGeom prst="rect">
@@ -11350,7 +11431,7 @@
               <p14:nvPr/>
             </p14:nvContentPartPr>
             <p14:xfrm>
-              <a:off x="10826484" y="5079144"/>
+              <a:off x="7815429" y="4996017"/>
               <a:ext cx="794880" cy="821520"/>
             </p14:xfrm>
           </p:contentPart>
@@ -11376,7 +11457,7 @@
             </p:blipFill>
             <p:spPr>
               <a:xfrm>
-                <a:off x="10808844" y="5061504"/>
+                <a:off x="7797789" y="4978377"/>
                 <a:ext cx="830520" cy="857160"/>
               </a:xfrm>
               <a:prstGeom prst="rect">
@@ -11401,7 +11482,7 @@
               <p14:nvPr/>
             </p14:nvContentPartPr>
             <p14:xfrm>
-              <a:off x="6767124" y="1577064"/>
+              <a:off x="3756069" y="1493937"/>
               <a:ext cx="1041480" cy="875160"/>
             </p14:xfrm>
           </p:contentPart>
@@ -11427,7 +11508,7 @@
             </p:blipFill>
             <p:spPr>
               <a:xfrm>
-                <a:off x="6749124" y="1559424"/>
+                <a:off x="3738069" y="1476297"/>
                 <a:ext cx="1077120" cy="910800"/>
               </a:xfrm>
               <a:prstGeom prst="rect">
@@ -11452,7 +11533,7 @@
               <p14:nvPr/>
             </p14:nvContentPartPr>
             <p14:xfrm>
-              <a:off x="8830644" y="2302464"/>
+              <a:off x="5819589" y="2219337"/>
               <a:ext cx="959400" cy="882000"/>
             </p14:xfrm>
           </p:contentPart>
@@ -11478,7 +11559,7 @@
             </p:blipFill>
             <p:spPr>
               <a:xfrm>
-                <a:off x="8813004" y="2284824"/>
+                <a:off x="5801949" y="2201697"/>
                 <a:ext cx="995040" cy="917640"/>
               </a:xfrm>
               <a:prstGeom prst="rect">
@@ -11503,7 +11584,7 @@
               <p14:nvPr/>
             </p14:nvContentPartPr>
             <p14:xfrm>
-              <a:off x="10630284" y="1470144"/>
+              <a:off x="7619229" y="1387017"/>
               <a:ext cx="785160" cy="823320"/>
             </p14:xfrm>
           </p:contentPart>
@@ -11529,7 +11610,7 @@
             </p:blipFill>
             <p:spPr>
               <a:xfrm>
-                <a:off x="10612644" y="1452144"/>
+                <a:off x="7601589" y="1369017"/>
                 <a:ext cx="820800" cy="858960"/>
               </a:xfrm>
               <a:prstGeom prst="rect">
@@ -11553,7 +11634,7 @@
         </p:nvGrpSpPr>
         <p:grpSpPr>
           <a:xfrm>
-            <a:off x="9783204" y="2118144"/>
+            <a:off x="6772149" y="2035017"/>
             <a:ext cx="903600" cy="502200"/>
             <a:chOff x="9783204" y="2118144"/>
             <a:chExt cx="903600" cy="502200"/>
@@ -11676,7 +11757,7 @@
         </p:nvGrpSpPr>
         <p:grpSpPr>
           <a:xfrm>
-            <a:off x="7828404" y="2156304"/>
+            <a:off x="4817349" y="2073177"/>
             <a:ext cx="991800" cy="597240"/>
             <a:chOff x="7828404" y="2156304"/>
             <a:chExt cx="991800" cy="597240"/>
@@ -11799,7 +11880,7 @@
         </p:nvGrpSpPr>
         <p:grpSpPr>
           <a:xfrm>
-            <a:off x="8356524" y="3191664"/>
+            <a:off x="5345469" y="3108537"/>
             <a:ext cx="769680" cy="1954080"/>
             <a:chOff x="8356524" y="3191664"/>
             <a:chExt cx="769680" cy="1954080"/>
@@ -11922,7 +12003,7 @@
         </p:nvGrpSpPr>
         <p:grpSpPr>
           <a:xfrm>
-            <a:off x="9555684" y="3206064"/>
+            <a:off x="6544629" y="3122937"/>
             <a:ext cx="488880" cy="1940760"/>
             <a:chOff x="9555684" y="3206064"/>
             <a:chExt cx="488880" cy="1940760"/>
@@ -12046,7 +12127,7 @@
               <p14:nvPr/>
             </p14:nvContentPartPr>
             <p14:xfrm>
-              <a:off x="11054724" y="2329104"/>
+              <a:off x="8043669" y="2245977"/>
               <a:ext cx="223920" cy="2770560"/>
             </p14:xfrm>
           </p:contentPart>
@@ -12072,7 +12153,7 @@
             </p:blipFill>
             <p:spPr>
               <a:xfrm>
-                <a:off x="11036724" y="2311104"/>
+                <a:off x="8025669" y="2227977"/>
                 <a:ext cx="259560" cy="2806200"/>
               </a:xfrm>
               <a:prstGeom prst="rect">
@@ -12096,7 +12177,7 @@
         </p:nvGrpSpPr>
         <p:grpSpPr>
           <a:xfrm>
-            <a:off x="7079244" y="2483904"/>
+            <a:off x="4068189" y="2400777"/>
             <a:ext cx="358200" cy="2604960"/>
             <a:chOff x="7079244" y="2483904"/>
             <a:chExt cx="358200" cy="2604960"/>
@@ -12270,7 +12351,7 @@
         </p:nvSpPr>
         <p:spPr>
           <a:xfrm>
-            <a:off x="6778198" y="5336015"/>
+            <a:off x="3767143" y="5252888"/>
             <a:ext cx="830933" cy="307777"/>
           </a:xfrm>
           <a:prstGeom prst="rect">
@@ -12305,7 +12386,7 @@
         </p:nvSpPr>
         <p:spPr>
           <a:xfrm>
-            <a:off x="8104715" y="5401738"/>
+            <a:off x="5093660" y="5318611"/>
             <a:ext cx="830933" cy="307777"/>
           </a:xfrm>
           <a:prstGeom prst="rect">
@@ -12340,7 +12421,7 @@
         </p:nvSpPr>
         <p:spPr>
           <a:xfrm>
-            <a:off x="9513439" y="5375740"/>
+            <a:off x="6502384" y="5292613"/>
             <a:ext cx="830933" cy="307777"/>
           </a:xfrm>
           <a:prstGeom prst="rect">
@@ -12375,7 +12456,7 @@
         </p:nvSpPr>
         <p:spPr>
           <a:xfrm>
-            <a:off x="10823676" y="5382497"/>
+            <a:off x="7812621" y="5299370"/>
             <a:ext cx="830933" cy="307777"/>
           </a:xfrm>
           <a:prstGeom prst="rect">
@@ -12410,7 +12491,7 @@
         </p:nvSpPr>
         <p:spPr>
           <a:xfrm>
-            <a:off x="6856351" y="1839498"/>
+            <a:off x="3845296" y="1756371"/>
             <a:ext cx="892809" cy="307777"/>
           </a:xfrm>
           <a:prstGeom prst="rect">
@@ -12445,7 +12526,7 @@
         </p:nvSpPr>
         <p:spPr>
           <a:xfrm>
-            <a:off x="8854844" y="2584189"/>
+            <a:off x="5843789" y="2501062"/>
             <a:ext cx="892809" cy="307777"/>
           </a:xfrm>
           <a:prstGeom prst="rect">
@@ -12480,7 +12561,7 @@
         </p:nvSpPr>
         <p:spPr>
           <a:xfrm>
-            <a:off x="10587676" y="1671631"/>
+            <a:off x="7576621" y="1588504"/>
             <a:ext cx="892809" cy="307777"/>
           </a:xfrm>
           <a:prstGeom prst="rect">
@@ -12515,7 +12596,7 @@
         </p:nvSpPr>
         <p:spPr>
           <a:xfrm rot="1434751">
-            <a:off x="7883403" y="1604232"/>
+            <a:off x="4872348" y="1521105"/>
             <a:ext cx="1353087" cy="738664"/>
           </a:xfrm>
           <a:prstGeom prst="rect">
@@ -12551,7 +12632,7 @@
         </p:nvSpPr>
         <p:spPr>
           <a:xfrm>
-            <a:off x="5656082" y="3690155"/>
+            <a:off x="2645027" y="3607028"/>
             <a:ext cx="1548339" cy="738664"/>
           </a:xfrm>
           <a:prstGeom prst="rect">
@@ -12709,108 +12790,6 @@
         <mc:Choice xmlns:p14="http://schemas.microsoft.com/office/powerpoint/2010/main" Requires="p14">
           <p:contentPart p14:bwMode="auto" r:id="rId6">
             <p14:nvContentPartPr>
-              <p14:cNvPr id="6" name="Ink 5">
-                <a:extLst>
-                  <a:ext uri="{FF2B5EF4-FFF2-40B4-BE49-F238E27FC236}">
-                    <a16:creationId xmlns:a16="http://schemas.microsoft.com/office/drawing/2014/main" id="{1493401B-1673-08D2-5BE9-F35DE8CCE57C}"/>
-                  </a:ext>
-                </a:extLst>
-              </p14:cNvPr>
-              <p14:cNvContentPartPr/>
-              <p14:nvPr/>
-            </p14:nvContentPartPr>
-            <p14:xfrm>
-              <a:off x="5959513" y="459065"/>
-              <a:ext cx="6480" cy="484200"/>
-            </p14:xfrm>
-          </p:contentPart>
-        </mc:Choice>
-        <mc:Fallback>
-          <p:pic>
-            <p:nvPicPr>
-              <p:cNvPr id="6" name="Ink 5">
-                <a:extLst>
-                  <a:ext uri="{FF2B5EF4-FFF2-40B4-BE49-F238E27FC236}">
-                    <a16:creationId xmlns:a16="http://schemas.microsoft.com/office/drawing/2014/main" id="{1493401B-1673-08D2-5BE9-F35DE8CCE57C}"/>
-                  </a:ext>
-                </a:extLst>
-              </p:cNvPr>
-              <p:cNvPicPr/>
-              <p:nvPr/>
-            </p:nvPicPr>
-            <p:blipFill>
-              <a:blip r:embed="rId7"/>
-              <a:stretch>
-                <a:fillRect/>
-              </a:stretch>
-            </p:blipFill>
-            <p:spPr>
-              <a:xfrm>
-                <a:off x="5941513" y="441065"/>
-                <a:ext cx="42120" cy="519840"/>
-              </a:xfrm>
-              <a:prstGeom prst="rect">
-                <a:avLst/>
-              </a:prstGeom>
-            </p:spPr>
-          </p:pic>
-        </mc:Fallback>
-      </mc:AlternateContent>
-      <mc:AlternateContent xmlns:mc="http://schemas.openxmlformats.org/markup-compatibility/2006">
-        <mc:Choice xmlns:p14="http://schemas.microsoft.com/office/powerpoint/2010/main" Requires="p14">
-          <p:contentPart p14:bwMode="auto" r:id="rId8">
-            <p14:nvContentPartPr>
-              <p14:cNvPr id="7" name="Ink 6">
-                <a:extLst>
-                  <a:ext uri="{FF2B5EF4-FFF2-40B4-BE49-F238E27FC236}">
-                    <a16:creationId xmlns:a16="http://schemas.microsoft.com/office/drawing/2014/main" id="{DC62378B-DD10-7F17-0247-19557DB0A788}"/>
-                  </a:ext>
-                </a:extLst>
-              </p14:cNvPr>
-              <p14:cNvContentPartPr/>
-              <p14:nvPr/>
-            </p14:nvContentPartPr>
-            <p14:xfrm>
-              <a:off x="6455233" y="406505"/>
-              <a:ext cx="7920" cy="552240"/>
-            </p14:xfrm>
-          </p:contentPart>
-        </mc:Choice>
-        <mc:Fallback>
-          <p:pic>
-            <p:nvPicPr>
-              <p:cNvPr id="7" name="Ink 6">
-                <a:extLst>
-                  <a:ext uri="{FF2B5EF4-FFF2-40B4-BE49-F238E27FC236}">
-                    <a16:creationId xmlns:a16="http://schemas.microsoft.com/office/drawing/2014/main" id="{DC62378B-DD10-7F17-0247-19557DB0A788}"/>
-                  </a:ext>
-                </a:extLst>
-              </p:cNvPr>
-              <p:cNvPicPr/>
-              <p:nvPr/>
-            </p:nvPicPr>
-            <p:blipFill>
-              <a:blip r:embed="rId9"/>
-              <a:stretch>
-                <a:fillRect/>
-              </a:stretch>
-            </p:blipFill>
-            <p:spPr>
-              <a:xfrm>
-                <a:off x="6437593" y="388505"/>
-                <a:ext cx="43560" cy="587880"/>
-              </a:xfrm>
-              <a:prstGeom prst="rect">
-                <a:avLst/>
-              </a:prstGeom>
-            </p:spPr>
-          </p:pic>
-        </mc:Fallback>
-      </mc:AlternateContent>
-      <mc:AlternateContent xmlns:mc="http://schemas.openxmlformats.org/markup-compatibility/2006">
-        <mc:Choice xmlns:p14="http://schemas.microsoft.com/office/powerpoint/2010/main" Requires="p14">
-          <p:contentPart p14:bwMode="auto" r:id="rId10">
-            <p14:nvContentPartPr>
               <p14:cNvPr id="8" name="Ink 7">
                 <a:extLst>
                   <a:ext uri="{FF2B5EF4-FFF2-40B4-BE49-F238E27FC236}">
@@ -12841,7 +12820,7 @@
               <p:nvPr/>
             </p:nvPicPr>
             <p:blipFill>
-              <a:blip r:embed="rId11"/>
+              <a:blip r:embed="rId7"/>
               <a:stretch>
                 <a:fillRect/>
               </a:stretch>
@@ -12880,7 +12859,7 @@
         </p:grpSpPr>
         <mc:AlternateContent xmlns:mc="http://schemas.openxmlformats.org/markup-compatibility/2006">
           <mc:Choice xmlns:p14="http://schemas.microsoft.com/office/powerpoint/2010/main" Requires="p14">
-            <p:contentPart p14:bwMode="auto" r:id="rId12">
+            <p:contentPart p14:bwMode="auto" r:id="rId8">
               <p14:nvContentPartPr>
                 <p14:cNvPr id="9" name="Ink 8">
                   <a:extLst>
@@ -12912,7 +12891,7 @@
                 <p:nvPr/>
               </p:nvPicPr>
               <p:blipFill>
-                <a:blip r:embed="rId13"/>
+                <a:blip r:embed="rId9"/>
                 <a:stretch>
                   <a:fillRect/>
                 </a:stretch>
@@ -12931,7 +12910,7 @@
         </mc:AlternateContent>
         <mc:AlternateContent xmlns:mc="http://schemas.openxmlformats.org/markup-compatibility/2006">
           <mc:Choice xmlns:p14="http://schemas.microsoft.com/office/powerpoint/2010/main" Requires="p14">
-            <p:contentPart p14:bwMode="auto" r:id="rId14">
+            <p:contentPart p14:bwMode="auto" r:id="rId10">
               <p14:nvContentPartPr>
                 <p14:cNvPr id="10" name="Ink 9">
                   <a:extLst>
@@ -12963,7 +12942,7 @@
                 <p:nvPr/>
               </p:nvPicPr>
               <p:blipFill>
-                <a:blip r:embed="rId15"/>
+                <a:blip r:embed="rId11"/>
                 <a:stretch>
                   <a:fillRect/>
                 </a:stretch>
@@ -13003,7 +12982,7 @@
         </p:grpSpPr>
         <mc:AlternateContent xmlns:mc="http://schemas.openxmlformats.org/markup-compatibility/2006">
           <mc:Choice xmlns:p14="http://schemas.microsoft.com/office/powerpoint/2010/main" Requires="p14">
-            <p:contentPart p14:bwMode="auto" r:id="rId16">
+            <p:contentPart p14:bwMode="auto" r:id="rId12">
               <p14:nvContentPartPr>
                 <p14:cNvPr id="15" name="Ink 14">
                   <a:extLst>
@@ -13035,7 +13014,7 @@
                 <p:nvPr/>
               </p:nvPicPr>
               <p:blipFill>
-                <a:blip r:embed="rId17"/>
+                <a:blip r:embed="rId13"/>
                 <a:stretch>
                   <a:fillRect/>
                 </a:stretch>
@@ -13054,7 +13033,7 @@
         </mc:AlternateContent>
         <mc:AlternateContent xmlns:mc="http://schemas.openxmlformats.org/markup-compatibility/2006">
           <mc:Choice xmlns:p14="http://schemas.microsoft.com/office/powerpoint/2010/main" Requires="p14">
-            <p:contentPart p14:bwMode="auto" r:id="rId18">
+            <p:contentPart p14:bwMode="auto" r:id="rId14">
               <p14:nvContentPartPr>
                 <p14:cNvPr id="16" name="Ink 15">
                   <a:extLst>
@@ -13086,7 +13065,7 @@
                 <p:nvPr/>
               </p:nvPicPr>
               <p:blipFill>
-                <a:blip r:embed="rId19"/>
+                <a:blip r:embed="rId15"/>
                 <a:stretch>
                   <a:fillRect/>
                 </a:stretch>
@@ -13105,7 +13084,7 @@
         </mc:AlternateContent>
         <mc:AlternateContent xmlns:mc="http://schemas.openxmlformats.org/markup-compatibility/2006">
           <mc:Choice xmlns:p14="http://schemas.microsoft.com/office/powerpoint/2010/main" Requires="p14">
-            <p:contentPart p14:bwMode="auto" r:id="rId20">
+            <p:contentPart p14:bwMode="auto" r:id="rId16">
               <p14:nvContentPartPr>
                 <p14:cNvPr id="18" name="Ink 17">
                   <a:extLst>
@@ -13137,7 +13116,7 @@
                 <p:nvPr/>
               </p:nvPicPr>
               <p:blipFill>
-                <a:blip r:embed="rId21"/>
+                <a:blip r:embed="rId17"/>
                 <a:stretch>
                   <a:fillRect/>
                 </a:stretch>
@@ -13157,7 +13136,7 @@
       </p:grpSp>
       <mc:AlternateContent xmlns:mc="http://schemas.openxmlformats.org/markup-compatibility/2006">
         <mc:Choice xmlns:p14="http://schemas.microsoft.com/office/powerpoint/2010/main" Requires="p14">
-          <p:contentPart p14:bwMode="auto" r:id="rId22">
+          <p:contentPart p14:bwMode="auto" r:id="rId18">
             <p14:nvContentPartPr>
               <p14:cNvPr id="20" name="Ink 19">
                 <a:extLst>
@@ -13189,7 +13168,7 @@
               <p:nvPr/>
             </p:nvPicPr>
             <p:blipFill>
-              <a:blip r:embed="rId23"/>
+              <a:blip r:embed="rId19"/>
               <a:stretch>
                 <a:fillRect/>
               </a:stretch>
@@ -13208,7 +13187,7 @@
       </mc:AlternateContent>
       <mc:AlternateContent xmlns:mc="http://schemas.openxmlformats.org/markup-compatibility/2006">
         <mc:Choice xmlns:p14="http://schemas.microsoft.com/office/powerpoint/2010/main" Requires="p14">
-          <p:contentPart p14:bwMode="auto" r:id="rId24">
+          <p:contentPart p14:bwMode="auto" r:id="rId20">
             <p14:nvContentPartPr>
               <p14:cNvPr id="21" name="Ink 20">
                 <a:extLst>
@@ -13240,7 +13219,7 @@
               <p:nvPr/>
             </p:nvPicPr>
             <p:blipFill>
-              <a:blip r:embed="rId25"/>
+              <a:blip r:embed="rId21"/>
               <a:stretch>
                 <a:fillRect/>
               </a:stretch>
@@ -13259,7 +13238,7 @@
       </mc:AlternateContent>
       <mc:AlternateContent xmlns:mc="http://schemas.openxmlformats.org/markup-compatibility/2006">
         <mc:Choice xmlns:p14="http://schemas.microsoft.com/office/powerpoint/2010/main" Requires="p14">
-          <p:contentPart p14:bwMode="auto" r:id="rId26">
+          <p:contentPart p14:bwMode="auto" r:id="rId22">
             <p14:nvContentPartPr>
               <p14:cNvPr id="22" name="Ink 21">
                 <a:extLst>
@@ -13291,7 +13270,7 @@
               <p:nvPr/>
             </p:nvPicPr>
             <p:blipFill>
-              <a:blip r:embed="rId27"/>
+              <a:blip r:embed="rId23"/>
               <a:stretch>
                 <a:fillRect/>
               </a:stretch>
@@ -13310,7 +13289,7 @@
       </mc:AlternateContent>
       <mc:AlternateContent xmlns:mc="http://schemas.openxmlformats.org/markup-compatibility/2006">
         <mc:Choice xmlns:p14="http://schemas.microsoft.com/office/powerpoint/2010/main" Requires="p14">
-          <p:contentPart p14:bwMode="auto" r:id="rId28">
+          <p:contentPart p14:bwMode="auto" r:id="rId24">
             <p14:nvContentPartPr>
               <p14:cNvPr id="23" name="Ink 22">
                 <a:extLst>
@@ -13342,7 +13321,7 @@
               <p:nvPr/>
             </p:nvPicPr>
             <p:blipFill>
-              <a:blip r:embed="rId29"/>
+              <a:blip r:embed="rId25"/>
               <a:stretch>
                 <a:fillRect/>
               </a:stretch>
@@ -13361,7 +13340,7 @@
       </mc:AlternateContent>
       <mc:AlternateContent xmlns:mc="http://schemas.openxmlformats.org/markup-compatibility/2006">
         <mc:Choice xmlns:p14="http://schemas.microsoft.com/office/powerpoint/2010/main" Requires="p14">
-          <p:contentPart p14:bwMode="auto" r:id="rId30">
+          <p:contentPart p14:bwMode="auto" r:id="rId26">
             <p14:nvContentPartPr>
               <p14:cNvPr id="24" name="Ink 23">
                 <a:extLst>
@@ -13393,7 +13372,7 @@
               <p:nvPr/>
             </p:nvPicPr>
             <p:blipFill>
-              <a:blip r:embed="rId31"/>
+              <a:blip r:embed="rId27"/>
               <a:stretch>
                 <a:fillRect/>
               </a:stretch>
@@ -13432,7 +13411,7 @@
         </p:grpSpPr>
         <mc:AlternateContent xmlns:mc="http://schemas.openxmlformats.org/markup-compatibility/2006">
           <mc:Choice xmlns:p14="http://schemas.microsoft.com/office/powerpoint/2010/main" Requires="p14">
-            <p:contentPart p14:bwMode="auto" r:id="rId32">
+            <p:contentPart p14:bwMode="auto" r:id="rId28">
               <p14:nvContentPartPr>
                 <p14:cNvPr id="25" name="Ink 24">
                   <a:extLst>
@@ -13464,7 +13443,7 @@
                 <p:nvPr/>
               </p:nvPicPr>
               <p:blipFill>
-                <a:blip r:embed="rId33"/>
+                <a:blip r:embed="rId29"/>
                 <a:stretch>
                   <a:fillRect/>
                 </a:stretch>
@@ -13483,7 +13462,7 @@
         </mc:AlternateContent>
         <mc:AlternateContent xmlns:mc="http://schemas.openxmlformats.org/markup-compatibility/2006">
           <mc:Choice xmlns:p14="http://schemas.microsoft.com/office/powerpoint/2010/main" Requires="p14">
-            <p:contentPart p14:bwMode="auto" r:id="rId34">
+            <p:contentPart p14:bwMode="auto" r:id="rId30">
               <p14:nvContentPartPr>
                 <p14:cNvPr id="26" name="Ink 25">
                   <a:extLst>
@@ -13515,7 +13494,7 @@
                 <p:nvPr/>
               </p:nvPicPr>
               <p:blipFill>
-                <a:blip r:embed="rId35"/>
+                <a:blip r:embed="rId31"/>
                 <a:stretch>
                   <a:fillRect/>
                 </a:stretch>
@@ -13534,7 +13513,7 @@
         </mc:AlternateContent>
         <mc:AlternateContent xmlns:mc="http://schemas.openxmlformats.org/markup-compatibility/2006">
           <mc:Choice xmlns:p14="http://schemas.microsoft.com/office/powerpoint/2010/main" Requires="p14">
-            <p:contentPart p14:bwMode="auto" r:id="rId36">
+            <p:contentPart p14:bwMode="auto" r:id="rId32">
               <p14:nvContentPartPr>
                 <p14:cNvPr id="28" name="Ink 27">
                   <a:extLst>
@@ -13566,7 +13545,7 @@
                 <p:nvPr/>
               </p:nvPicPr>
               <p:blipFill>
-                <a:blip r:embed="rId37"/>
+                <a:blip r:embed="rId33"/>
                 <a:stretch>
                   <a:fillRect/>
                 </a:stretch>
@@ -13585,7 +13564,7 @@
         </mc:AlternateContent>
         <mc:AlternateContent xmlns:mc="http://schemas.openxmlformats.org/markup-compatibility/2006">
           <mc:Choice xmlns:p14="http://schemas.microsoft.com/office/powerpoint/2010/main" Requires="p14">
-            <p:contentPart p14:bwMode="auto" r:id="rId38">
+            <p:contentPart p14:bwMode="auto" r:id="rId34">
               <p14:nvContentPartPr>
                 <p14:cNvPr id="30" name="Ink 29">
                   <a:extLst>
@@ -13617,7 +13596,7 @@
                 <p:nvPr/>
               </p:nvPicPr>
               <p:blipFill>
-                <a:blip r:embed="rId39"/>
+                <a:blip r:embed="rId35"/>
                 <a:stretch>
                   <a:fillRect/>
                 </a:stretch>
@@ -13637,7 +13616,7 @@
       </p:grpSp>
       <mc:AlternateContent xmlns:mc="http://schemas.openxmlformats.org/markup-compatibility/2006">
         <mc:Choice xmlns:p14="http://schemas.microsoft.com/office/powerpoint/2010/main" Requires="p14">
-          <p:contentPart p14:bwMode="auto" r:id="rId40">
+          <p:contentPart p14:bwMode="auto" r:id="rId36">
             <p14:nvContentPartPr>
               <p14:cNvPr id="37" name="Ink 36">
                 <a:extLst>
@@ -13669,7 +13648,7 @@
               <p:nvPr/>
             </p:nvPicPr>
             <p:blipFill>
-              <a:blip r:embed="rId41"/>
+              <a:blip r:embed="rId37"/>
               <a:stretch>
                 <a:fillRect/>
               </a:stretch>
@@ -13708,7 +13687,7 @@
         </p:grpSpPr>
         <mc:AlternateContent xmlns:mc="http://schemas.openxmlformats.org/markup-compatibility/2006">
           <mc:Choice xmlns:p14="http://schemas.microsoft.com/office/powerpoint/2010/main" Requires="p14">
-            <p:contentPart p14:bwMode="auto" r:id="rId42">
+            <p:contentPart p14:bwMode="auto" r:id="rId38">
               <p14:nvContentPartPr>
                 <p14:cNvPr id="38" name="Ink 37">
                   <a:extLst>
@@ -13740,7 +13719,7 @@
                 <p:nvPr/>
               </p:nvPicPr>
               <p:blipFill>
-                <a:blip r:embed="rId43"/>
+                <a:blip r:embed="rId39"/>
                 <a:stretch>
                   <a:fillRect/>
                 </a:stretch>
@@ -13759,7 +13738,7 @@
         </mc:AlternateContent>
         <mc:AlternateContent xmlns:mc="http://schemas.openxmlformats.org/markup-compatibility/2006">
           <mc:Choice xmlns:p14="http://schemas.microsoft.com/office/powerpoint/2010/main" Requires="p14">
-            <p:contentPart p14:bwMode="auto" r:id="rId44">
+            <p:contentPart p14:bwMode="auto" r:id="rId40">
               <p14:nvContentPartPr>
                 <p14:cNvPr id="39" name="Ink 38">
                   <a:extLst>
@@ -13791,7 +13770,7 @@
                 <p:nvPr/>
               </p:nvPicPr>
               <p:blipFill>
-                <a:blip r:embed="rId45"/>
+                <a:blip r:embed="rId41"/>
                 <a:stretch>
                   <a:fillRect/>
                 </a:stretch>
@@ -13811,7 +13790,7 @@
       </p:grpSp>
       <mc:AlternateContent xmlns:mc="http://schemas.openxmlformats.org/markup-compatibility/2006">
         <mc:Choice xmlns:p14="http://schemas.microsoft.com/office/powerpoint/2010/main" Requires="p14">
-          <p:contentPart p14:bwMode="auto" r:id="rId46">
+          <p:contentPart p14:bwMode="auto" r:id="rId42">
             <p14:nvContentPartPr>
               <p14:cNvPr id="41" name="Ink 40">
                 <a:extLst>
@@ -13843,7 +13822,7 @@
               <p:nvPr/>
             </p:nvPicPr>
             <p:blipFill>
-              <a:blip r:embed="rId47"/>
+              <a:blip r:embed="rId43"/>
               <a:stretch>
                 <a:fillRect/>
               </a:stretch>
@@ -13862,7 +13841,7 @@
       </mc:AlternateContent>
       <mc:AlternateContent xmlns:mc="http://schemas.openxmlformats.org/markup-compatibility/2006">
         <mc:Choice xmlns:p14="http://schemas.microsoft.com/office/powerpoint/2010/main" Requires="p14">
-          <p:contentPart p14:bwMode="auto" r:id="rId48">
+          <p:contentPart p14:bwMode="auto" r:id="rId44">
             <p14:nvContentPartPr>
               <p14:cNvPr id="42" name="Ink 41">
                 <a:extLst>
@@ -13894,7 +13873,7 @@
               <p:nvPr/>
             </p:nvPicPr>
             <p:blipFill>
-              <a:blip r:embed="rId49"/>
+              <a:blip r:embed="rId45"/>
               <a:stretch>
                 <a:fillRect/>
               </a:stretch>
@@ -13913,7 +13892,7 @@
       </mc:AlternateContent>
       <mc:AlternateContent xmlns:mc="http://schemas.openxmlformats.org/markup-compatibility/2006">
         <mc:Choice xmlns:p14="http://schemas.microsoft.com/office/powerpoint/2010/main" Requires="p14">
-          <p:contentPart p14:bwMode="auto" r:id="rId50">
+          <p:contentPart p14:bwMode="auto" r:id="rId46">
             <p14:nvContentPartPr>
               <p14:cNvPr id="43" name="Ink 42">
                 <a:extLst>
@@ -13945,7 +13924,7 @@
               <p:nvPr/>
             </p:nvPicPr>
             <p:blipFill>
-              <a:blip r:embed="rId51"/>
+              <a:blip r:embed="rId47"/>
               <a:stretch>
                 <a:fillRect/>
               </a:stretch>
@@ -13964,7 +13943,7 @@
       </mc:AlternateContent>
       <mc:AlternateContent xmlns:mc="http://schemas.openxmlformats.org/markup-compatibility/2006">
         <mc:Choice xmlns:p14="http://schemas.microsoft.com/office/powerpoint/2010/main" Requires="p14">
-          <p:contentPart p14:bwMode="auto" r:id="rId52">
+          <p:contentPart p14:bwMode="auto" r:id="rId48">
             <p14:nvContentPartPr>
               <p14:cNvPr id="44" name="Ink 43">
                 <a:extLst>
@@ -13996,7 +13975,7 @@
               <p:nvPr/>
             </p:nvPicPr>
             <p:blipFill>
-              <a:blip r:embed="rId53"/>
+              <a:blip r:embed="rId49"/>
               <a:stretch>
                 <a:fillRect/>
               </a:stretch>
@@ -14015,7 +13994,7 @@
       </mc:AlternateContent>
       <mc:AlternateContent xmlns:mc="http://schemas.openxmlformats.org/markup-compatibility/2006">
         <mc:Choice xmlns:p14="http://schemas.microsoft.com/office/powerpoint/2010/main" Requires="p14">
-          <p:contentPart p14:bwMode="auto" r:id="rId54">
+          <p:contentPart p14:bwMode="auto" r:id="rId50">
             <p14:nvContentPartPr>
               <p14:cNvPr id="45" name="Ink 44">
                 <a:extLst>
@@ -14047,7 +14026,7 @@
               <p:nvPr/>
             </p:nvPicPr>
             <p:blipFill>
-              <a:blip r:embed="rId55"/>
+              <a:blip r:embed="rId51"/>
               <a:stretch>
                 <a:fillRect/>
               </a:stretch>
@@ -14066,7 +14045,7 @@
       </mc:AlternateContent>
       <mc:AlternateContent xmlns:mc="http://schemas.openxmlformats.org/markup-compatibility/2006">
         <mc:Choice xmlns:p14="http://schemas.microsoft.com/office/powerpoint/2010/main" Requires="p14">
-          <p:contentPart p14:bwMode="auto" r:id="rId56">
+          <p:contentPart p14:bwMode="auto" r:id="rId52">
             <p14:nvContentPartPr>
               <p14:cNvPr id="46" name="Ink 45">
                 <a:extLst>
@@ -14098,7 +14077,7 @@
               <p:nvPr/>
             </p:nvPicPr>
             <p:blipFill>
-              <a:blip r:embed="rId57"/>
+              <a:blip r:embed="rId53"/>
               <a:stretch>
                 <a:fillRect/>
               </a:stretch>
@@ -14117,7 +14096,7 @@
       </mc:AlternateContent>
       <mc:AlternateContent xmlns:mc="http://schemas.openxmlformats.org/markup-compatibility/2006">
         <mc:Choice xmlns:p14="http://schemas.microsoft.com/office/powerpoint/2010/main" Requires="p14">
-          <p:contentPart p14:bwMode="auto" r:id="rId58">
+          <p:contentPart p14:bwMode="auto" r:id="rId54">
             <p14:nvContentPartPr>
               <p14:cNvPr id="47" name="Ink 46">
                 <a:extLst>
@@ -14149,7 +14128,7 @@
               <p:nvPr/>
             </p:nvPicPr>
             <p:blipFill>
-              <a:blip r:embed="rId59"/>
+              <a:blip r:embed="rId55"/>
               <a:stretch>
                 <a:fillRect/>
               </a:stretch>
@@ -14188,7 +14167,7 @@
         </p:grpSpPr>
         <mc:AlternateContent xmlns:mc="http://schemas.openxmlformats.org/markup-compatibility/2006">
           <mc:Choice xmlns:p14="http://schemas.microsoft.com/office/powerpoint/2010/main" Requires="p14">
-            <p:contentPart p14:bwMode="auto" r:id="rId60">
+            <p:contentPart p14:bwMode="auto" r:id="rId56">
               <p14:nvContentPartPr>
                 <p14:cNvPr id="48" name="Ink 47">
                   <a:extLst>
@@ -14220,7 +14199,7 @@
                 <p:nvPr/>
               </p:nvPicPr>
               <p:blipFill>
-                <a:blip r:embed="rId61"/>
+                <a:blip r:embed="rId57"/>
                 <a:stretch>
                   <a:fillRect/>
                 </a:stretch>
@@ -14239,7 +14218,7 @@
         </mc:AlternateContent>
         <mc:AlternateContent xmlns:mc="http://schemas.openxmlformats.org/markup-compatibility/2006">
           <mc:Choice xmlns:p14="http://schemas.microsoft.com/office/powerpoint/2010/main" Requires="p14">
-            <p:contentPart p14:bwMode="auto" r:id="rId62">
+            <p:contentPart p14:bwMode="auto" r:id="rId58">
               <p14:nvContentPartPr>
                 <p14:cNvPr id="49" name="Ink 48">
                   <a:extLst>
@@ -14271,7 +14250,7 @@
                 <p:nvPr/>
               </p:nvPicPr>
               <p:blipFill>
-                <a:blip r:embed="rId63"/>
+                <a:blip r:embed="rId59"/>
                 <a:stretch>
                   <a:fillRect/>
                 </a:stretch>
@@ -14290,7 +14269,7 @@
         </mc:AlternateContent>
         <mc:AlternateContent xmlns:mc="http://schemas.openxmlformats.org/markup-compatibility/2006">
           <mc:Choice xmlns:p14="http://schemas.microsoft.com/office/powerpoint/2010/main" Requires="p14">
-            <p:contentPart p14:bwMode="auto" r:id="rId64">
+            <p:contentPart p14:bwMode="auto" r:id="rId60">
               <p14:nvContentPartPr>
                 <p14:cNvPr id="51" name="Ink 50">
                   <a:extLst>
@@ -14322,7 +14301,7 @@
                 <p:nvPr/>
               </p:nvPicPr>
               <p:blipFill>
-                <a:blip r:embed="rId65"/>
+                <a:blip r:embed="rId61"/>
                 <a:stretch>
                   <a:fillRect/>
                 </a:stretch>
@@ -14341,7 +14320,7 @@
         </mc:AlternateContent>
         <mc:AlternateContent xmlns:mc="http://schemas.openxmlformats.org/markup-compatibility/2006">
           <mc:Choice xmlns:p14="http://schemas.microsoft.com/office/powerpoint/2010/main" Requires="p14">
-            <p:contentPart p14:bwMode="auto" r:id="rId66">
+            <p:contentPart p14:bwMode="auto" r:id="rId62">
               <p14:nvContentPartPr>
                 <p14:cNvPr id="53" name="Ink 52">
                   <a:extLst>
@@ -14373,7 +14352,7 @@
                 <p:nvPr/>
               </p:nvPicPr>
               <p:blipFill>
-                <a:blip r:embed="rId67"/>
+                <a:blip r:embed="rId63"/>
                 <a:stretch>
                   <a:fillRect/>
                 </a:stretch>
@@ -14392,7 +14371,7 @@
         </mc:AlternateContent>
         <mc:AlternateContent xmlns:mc="http://schemas.openxmlformats.org/markup-compatibility/2006">
           <mc:Choice xmlns:p14="http://schemas.microsoft.com/office/powerpoint/2010/main" Requires="p14">
-            <p:contentPart p14:bwMode="auto" r:id="rId68">
+            <p:contentPart p14:bwMode="auto" r:id="rId64">
               <p14:nvContentPartPr>
                 <p14:cNvPr id="55" name="Ink 54">
                   <a:extLst>
@@ -14424,7 +14403,7 @@
                 <p:nvPr/>
               </p:nvPicPr>
               <p:blipFill>
-                <a:blip r:embed="rId69"/>
+                <a:blip r:embed="rId65"/>
                 <a:stretch>
                   <a:fillRect/>
                 </a:stretch>
@@ -14444,7 +14423,7 @@
       </p:grpSp>
       <mc:AlternateContent xmlns:mc="http://schemas.openxmlformats.org/markup-compatibility/2006">
         <mc:Choice xmlns:p14="http://schemas.microsoft.com/office/powerpoint/2010/main" Requires="p14">
-          <p:contentPart p14:bwMode="auto" r:id="rId70">
+          <p:contentPart p14:bwMode="auto" r:id="rId66">
             <p14:nvContentPartPr>
               <p14:cNvPr id="57" name="Ink 56">
                 <a:extLst>
@@ -14476,7 +14455,7 @@
               <p:nvPr/>
             </p:nvPicPr>
             <p:blipFill>
-              <a:blip r:embed="rId71"/>
+              <a:blip r:embed="rId67"/>
               <a:stretch>
                 <a:fillRect/>
               </a:stretch>
@@ -14495,7 +14474,7 @@
       </mc:AlternateContent>
       <mc:AlternateContent xmlns:mc="http://schemas.openxmlformats.org/markup-compatibility/2006">
         <mc:Choice xmlns:p14="http://schemas.microsoft.com/office/powerpoint/2010/main" Requires="p14">
-          <p:contentPart p14:bwMode="auto" r:id="rId72">
+          <p:contentPart p14:bwMode="auto" r:id="rId68">
             <p14:nvContentPartPr>
               <p14:cNvPr id="59" name="Ink 58">
                 <a:extLst>
@@ -14527,7 +14506,7 @@
               <p:nvPr/>
             </p:nvPicPr>
             <p:blipFill>
-              <a:blip r:embed="rId73"/>
+              <a:blip r:embed="rId69"/>
               <a:stretch>
                 <a:fillRect/>
               </a:stretch>
@@ -14546,7 +14525,7 @@
       </mc:AlternateContent>
       <mc:AlternateContent xmlns:mc="http://schemas.openxmlformats.org/markup-compatibility/2006">
         <mc:Choice xmlns:p14="http://schemas.microsoft.com/office/powerpoint/2010/main" Requires="p14">
-          <p:contentPart p14:bwMode="auto" r:id="rId74">
+          <p:contentPart p14:bwMode="auto" r:id="rId70">
             <p14:nvContentPartPr>
               <p14:cNvPr id="60" name="Ink 59">
                 <a:extLst>
@@ -14578,7 +14557,7 @@
               <p:nvPr/>
             </p:nvPicPr>
             <p:blipFill>
-              <a:blip r:embed="rId75"/>
+              <a:blip r:embed="rId71"/>
               <a:stretch>
                 <a:fillRect/>
               </a:stretch>
@@ -14597,7 +14576,7 @@
       </mc:AlternateContent>
       <mc:AlternateContent xmlns:mc="http://schemas.openxmlformats.org/markup-compatibility/2006">
         <mc:Choice xmlns:p14="http://schemas.microsoft.com/office/powerpoint/2010/main" Requires="p14">
-          <p:contentPart p14:bwMode="auto" r:id="rId76">
+          <p:contentPart p14:bwMode="auto" r:id="rId72">
             <p14:nvContentPartPr>
               <p14:cNvPr id="61" name="Ink 60">
                 <a:extLst>
@@ -14629,7 +14608,7 @@
               <p:nvPr/>
             </p:nvPicPr>
             <p:blipFill>
-              <a:blip r:embed="rId77"/>
+              <a:blip r:embed="rId73"/>
               <a:stretch>
                 <a:fillRect/>
               </a:stretch>
@@ -14648,7 +14627,7 @@
       </mc:AlternateContent>
       <mc:AlternateContent xmlns:mc="http://schemas.openxmlformats.org/markup-compatibility/2006">
         <mc:Choice xmlns:p14="http://schemas.microsoft.com/office/powerpoint/2010/main" Requires="p14">
-          <p:contentPart p14:bwMode="auto" r:id="rId78">
+          <p:contentPart p14:bwMode="auto" r:id="rId74">
             <p14:nvContentPartPr>
               <p14:cNvPr id="62" name="Ink 61">
                 <a:extLst>
@@ -14680,7 +14659,7 @@
               <p:nvPr/>
             </p:nvPicPr>
             <p:blipFill>
-              <a:blip r:embed="rId79"/>
+              <a:blip r:embed="rId75"/>
               <a:stretch>
                 <a:fillRect/>
               </a:stretch>
@@ -14699,7 +14678,7 @@
       </mc:AlternateContent>
       <mc:AlternateContent xmlns:mc="http://schemas.openxmlformats.org/markup-compatibility/2006">
         <mc:Choice xmlns:p14="http://schemas.microsoft.com/office/powerpoint/2010/main" Requires="p14">
-          <p:contentPart p14:bwMode="auto" r:id="rId80">
+          <p:contentPart p14:bwMode="auto" r:id="rId76">
             <p14:nvContentPartPr>
               <p14:cNvPr id="63" name="Ink 62">
                 <a:extLst>
@@ -14731,7 +14710,7 @@
               <p:nvPr/>
             </p:nvPicPr>
             <p:blipFill>
-              <a:blip r:embed="rId81"/>
+              <a:blip r:embed="rId77"/>
               <a:stretch>
                 <a:fillRect/>
               </a:stretch>
@@ -14750,7 +14729,7 @@
       </mc:AlternateContent>
       <mc:AlternateContent xmlns:mc="http://schemas.openxmlformats.org/markup-compatibility/2006">
         <mc:Choice xmlns:p14="http://schemas.microsoft.com/office/powerpoint/2010/main" Requires="p14">
-          <p:contentPart p14:bwMode="auto" r:id="rId82">
+          <p:contentPart p14:bwMode="auto" r:id="rId78">
             <p14:nvContentPartPr>
               <p14:cNvPr id="64" name="Ink 63">
                 <a:extLst>
@@ -14782,7 +14761,7 @@
               <p:nvPr/>
             </p:nvPicPr>
             <p:blipFill>
-              <a:blip r:embed="rId83"/>
+              <a:blip r:embed="rId79"/>
               <a:stretch>
                 <a:fillRect/>
               </a:stretch>
@@ -14801,7 +14780,7 @@
       </mc:AlternateContent>
       <mc:AlternateContent xmlns:mc="http://schemas.openxmlformats.org/markup-compatibility/2006">
         <mc:Choice xmlns:p14="http://schemas.microsoft.com/office/powerpoint/2010/main" Requires="p14">
-          <p:contentPart p14:bwMode="auto" r:id="rId84">
+          <p:contentPart p14:bwMode="auto" r:id="rId80">
             <p14:nvContentPartPr>
               <p14:cNvPr id="65" name="Ink 64">
                 <a:extLst>
@@ -14833,7 +14812,7 @@
               <p:nvPr/>
             </p:nvPicPr>
             <p:blipFill>
-              <a:blip r:embed="rId85"/>
+              <a:blip r:embed="rId81"/>
               <a:stretch>
                 <a:fillRect/>
               </a:stretch>
@@ -14852,7 +14831,7 @@
       </mc:AlternateContent>
       <mc:AlternateContent xmlns:mc="http://schemas.openxmlformats.org/markup-compatibility/2006">
         <mc:Choice xmlns:p14="http://schemas.microsoft.com/office/powerpoint/2010/main" Requires="p14">
-          <p:contentPart p14:bwMode="auto" r:id="rId86">
+          <p:contentPart p14:bwMode="auto" r:id="rId82">
             <p14:nvContentPartPr>
               <p14:cNvPr id="66" name="Ink 65">
                 <a:extLst>
@@ -14884,7 +14863,7 @@
               <p:nvPr/>
             </p:nvPicPr>
             <p:blipFill>
-              <a:blip r:embed="rId87"/>
+              <a:blip r:embed="rId83"/>
               <a:stretch>
                 <a:fillRect/>
               </a:stretch>
@@ -14903,7 +14882,7 @@
       </mc:AlternateContent>
       <mc:AlternateContent xmlns:mc="http://schemas.openxmlformats.org/markup-compatibility/2006">
         <mc:Choice xmlns:p14="http://schemas.microsoft.com/office/powerpoint/2010/main" Requires="p14">
-          <p:contentPart p14:bwMode="auto" r:id="rId88">
+          <p:contentPart p14:bwMode="auto" r:id="rId84">
             <p14:nvContentPartPr>
               <p14:cNvPr id="69" name="Ink 68">
                 <a:extLst>
@@ -14935,7 +14914,7 @@
               <p:nvPr/>
             </p:nvPicPr>
             <p:blipFill>
-              <a:blip r:embed="rId89"/>
+              <a:blip r:embed="rId85"/>
               <a:stretch>
                 <a:fillRect/>
               </a:stretch>
@@ -14954,7 +14933,7 @@
       </mc:AlternateContent>
       <mc:AlternateContent xmlns:mc="http://schemas.openxmlformats.org/markup-compatibility/2006">
         <mc:Choice xmlns:p14="http://schemas.microsoft.com/office/powerpoint/2010/main" Requires="p14">
-          <p:contentPart p14:bwMode="auto" r:id="rId90">
+          <p:contentPart p14:bwMode="auto" r:id="rId86">
             <p14:nvContentPartPr>
               <p14:cNvPr id="70" name="Ink 69">
                 <a:extLst>
@@ -14986,7 +14965,7 @@
               <p:nvPr/>
             </p:nvPicPr>
             <p:blipFill>
-              <a:blip r:embed="rId91"/>
+              <a:blip r:embed="rId87"/>
               <a:stretch>
                 <a:fillRect/>
               </a:stretch>
@@ -15005,7 +14984,7 @@
       </mc:AlternateContent>
       <mc:AlternateContent xmlns:mc="http://schemas.openxmlformats.org/markup-compatibility/2006">
         <mc:Choice xmlns:p14="http://schemas.microsoft.com/office/powerpoint/2010/main" Requires="p14">
-          <p:contentPart p14:bwMode="auto" r:id="rId92">
+          <p:contentPart p14:bwMode="auto" r:id="rId88">
             <p14:nvContentPartPr>
               <p14:cNvPr id="71" name="Ink 70">
                 <a:extLst>
@@ -15037,7 +15016,7 @@
               <p:nvPr/>
             </p:nvPicPr>
             <p:blipFill>
-              <a:blip r:embed="rId93"/>
+              <a:blip r:embed="rId89"/>
               <a:stretch>
                 <a:fillRect/>
               </a:stretch>
@@ -15056,7 +15035,7 @@
       </mc:AlternateContent>
       <mc:AlternateContent xmlns:mc="http://schemas.openxmlformats.org/markup-compatibility/2006">
         <mc:Choice xmlns:p14="http://schemas.microsoft.com/office/powerpoint/2010/main" Requires="p14">
-          <p:contentPart p14:bwMode="auto" r:id="rId94">
+          <p:contentPart p14:bwMode="auto" r:id="rId90">
             <p14:nvContentPartPr>
               <p14:cNvPr id="72" name="Ink 71">
                 <a:extLst>
@@ -15088,7 +15067,7 @@
               <p:nvPr/>
             </p:nvPicPr>
             <p:blipFill>
-              <a:blip r:embed="rId95"/>
+              <a:blip r:embed="rId91"/>
               <a:stretch>
                 <a:fillRect/>
               </a:stretch>
@@ -15107,7 +15086,7 @@
       </mc:AlternateContent>
       <mc:AlternateContent xmlns:mc="http://schemas.openxmlformats.org/markup-compatibility/2006">
         <mc:Choice xmlns:p14="http://schemas.microsoft.com/office/powerpoint/2010/main" Requires="p14">
-          <p:contentPart p14:bwMode="auto" r:id="rId96">
+          <p:contentPart p14:bwMode="auto" r:id="rId92">
             <p14:nvContentPartPr>
               <p14:cNvPr id="73" name="Ink 72">
                 <a:extLst>
@@ -15139,7 +15118,7 @@
               <p:nvPr/>
             </p:nvPicPr>
             <p:blipFill>
-              <a:blip r:embed="rId97"/>
+              <a:blip r:embed="rId93"/>
               <a:stretch>
                 <a:fillRect/>
               </a:stretch>
@@ -15158,7 +15137,7 @@
       </mc:AlternateContent>
       <mc:AlternateContent xmlns:mc="http://schemas.openxmlformats.org/markup-compatibility/2006">
         <mc:Choice xmlns:p14="http://schemas.microsoft.com/office/powerpoint/2010/main" Requires="p14">
-          <p:contentPart p14:bwMode="auto" r:id="rId98">
+          <p:contentPart p14:bwMode="auto" r:id="rId94">
             <p14:nvContentPartPr>
               <p14:cNvPr id="74" name="Ink 73">
                 <a:extLst>
@@ -15190,7 +15169,7 @@
               <p:nvPr/>
             </p:nvPicPr>
             <p:blipFill>
-              <a:blip r:embed="rId99"/>
+              <a:blip r:embed="rId95"/>
               <a:stretch>
                 <a:fillRect/>
               </a:stretch>
@@ -15209,7 +15188,7 @@
       </mc:AlternateContent>
       <mc:AlternateContent xmlns:mc="http://schemas.openxmlformats.org/markup-compatibility/2006">
         <mc:Choice xmlns:p14="http://schemas.microsoft.com/office/powerpoint/2010/main" Requires="p14">
-          <p:contentPart p14:bwMode="auto" r:id="rId100">
+          <p:contentPart p14:bwMode="auto" r:id="rId96">
             <p14:nvContentPartPr>
               <p14:cNvPr id="75" name="Ink 74">
                 <a:extLst>
@@ -15241,7 +15220,7 @@
               <p:nvPr/>
             </p:nvPicPr>
             <p:blipFill>
-              <a:blip r:embed="rId101"/>
+              <a:blip r:embed="rId97"/>
               <a:stretch>
                 <a:fillRect/>
               </a:stretch>
@@ -15260,7 +15239,7 @@
       </mc:AlternateContent>
       <mc:AlternateContent xmlns:mc="http://schemas.openxmlformats.org/markup-compatibility/2006">
         <mc:Choice xmlns:p14="http://schemas.microsoft.com/office/powerpoint/2010/main" Requires="p14">
-          <p:contentPart p14:bwMode="auto" r:id="rId102">
+          <p:contentPart p14:bwMode="auto" r:id="rId98">
             <p14:nvContentPartPr>
               <p14:cNvPr id="79" name="Ink 78">
                 <a:extLst>
@@ -15292,7 +15271,7 @@
               <p:nvPr/>
             </p:nvPicPr>
             <p:blipFill>
-              <a:blip r:embed="rId103"/>
+              <a:blip r:embed="rId99"/>
               <a:stretch>
                 <a:fillRect/>
               </a:stretch>
@@ -15311,7 +15290,7 @@
       </mc:AlternateContent>
       <mc:AlternateContent xmlns:mc="http://schemas.openxmlformats.org/markup-compatibility/2006">
         <mc:Choice xmlns:p14="http://schemas.microsoft.com/office/powerpoint/2010/main" Requires="p14">
-          <p:contentPart p14:bwMode="auto" r:id="rId104">
+          <p:contentPart p14:bwMode="auto" r:id="rId100">
             <p14:nvContentPartPr>
               <p14:cNvPr id="81" name="Ink 80">
                 <a:extLst>
@@ -15343,7 +15322,7 @@
               <p:nvPr/>
             </p:nvPicPr>
             <p:blipFill>
-              <a:blip r:embed="rId105"/>
+              <a:blip r:embed="rId101"/>
               <a:stretch>
                 <a:fillRect/>
               </a:stretch>
@@ -15362,7 +15341,7 @@
       </mc:AlternateContent>
       <mc:AlternateContent xmlns:mc="http://schemas.openxmlformats.org/markup-compatibility/2006">
         <mc:Choice xmlns:p14="http://schemas.microsoft.com/office/powerpoint/2010/main" Requires="p14">
-          <p:contentPart p14:bwMode="auto" r:id="rId106">
+          <p:contentPart p14:bwMode="auto" r:id="rId102">
             <p14:nvContentPartPr>
               <p14:cNvPr id="82" name="Ink 81">
                 <a:extLst>
@@ -15394,7 +15373,7 @@
               <p:nvPr/>
             </p:nvPicPr>
             <p:blipFill>
-              <a:blip r:embed="rId107"/>
+              <a:blip r:embed="rId103"/>
               <a:stretch>
                 <a:fillRect/>
               </a:stretch>
@@ -15413,7 +15392,7 @@
       </mc:AlternateContent>
       <mc:AlternateContent xmlns:mc="http://schemas.openxmlformats.org/markup-compatibility/2006">
         <mc:Choice xmlns:p14="http://schemas.microsoft.com/office/powerpoint/2010/main" Requires="p14">
-          <p:contentPart p14:bwMode="auto" r:id="rId108">
+          <p:contentPart p14:bwMode="auto" r:id="rId104">
             <p14:nvContentPartPr>
               <p14:cNvPr id="83" name="Ink 82">
                 <a:extLst>
@@ -15445,7 +15424,7 @@
               <p:nvPr/>
             </p:nvPicPr>
             <p:blipFill>
-              <a:blip r:embed="rId109"/>
+              <a:blip r:embed="rId105"/>
               <a:stretch>
                 <a:fillRect/>
               </a:stretch>
@@ -15464,7 +15443,7 @@
       </mc:AlternateContent>
       <mc:AlternateContent xmlns:mc="http://schemas.openxmlformats.org/markup-compatibility/2006">
         <mc:Choice xmlns:p14="http://schemas.microsoft.com/office/powerpoint/2010/main" Requires="p14">
-          <p:contentPart p14:bwMode="auto" r:id="rId110">
+          <p:contentPart p14:bwMode="auto" r:id="rId106">
             <p14:nvContentPartPr>
               <p14:cNvPr id="84" name="Ink 83">
                 <a:extLst>
@@ -15496,7 +15475,7 @@
               <p:nvPr/>
             </p:nvPicPr>
             <p:blipFill>
-              <a:blip r:embed="rId111"/>
+              <a:blip r:embed="rId107"/>
               <a:stretch>
                 <a:fillRect/>
               </a:stretch>
@@ -15515,7 +15494,7 @@
       </mc:AlternateContent>
       <mc:AlternateContent xmlns:mc="http://schemas.openxmlformats.org/markup-compatibility/2006">
         <mc:Choice xmlns:p14="http://schemas.microsoft.com/office/powerpoint/2010/main" Requires="p14">
-          <p:contentPart p14:bwMode="auto" r:id="rId112">
+          <p:contentPart p14:bwMode="auto" r:id="rId108">
             <p14:nvContentPartPr>
               <p14:cNvPr id="85" name="Ink 84">
                 <a:extLst>
@@ -15547,7 +15526,7 @@
               <p:nvPr/>
             </p:nvPicPr>
             <p:blipFill>
-              <a:blip r:embed="rId113"/>
+              <a:blip r:embed="rId109"/>
               <a:stretch>
                 <a:fillRect/>
               </a:stretch>
@@ -15566,7 +15545,7 @@
       </mc:AlternateContent>
       <mc:AlternateContent xmlns:mc="http://schemas.openxmlformats.org/markup-compatibility/2006">
         <mc:Choice xmlns:p14="http://schemas.microsoft.com/office/powerpoint/2010/main" Requires="p14">
-          <p:contentPart p14:bwMode="auto" r:id="rId114">
+          <p:contentPart p14:bwMode="auto" r:id="rId110">
             <p14:nvContentPartPr>
               <p14:cNvPr id="86" name="Ink 85">
                 <a:extLst>
@@ -15598,7 +15577,7 @@
               <p:nvPr/>
             </p:nvPicPr>
             <p:blipFill>
-              <a:blip r:embed="rId115"/>
+              <a:blip r:embed="rId111"/>
               <a:stretch>
                 <a:fillRect/>
               </a:stretch>
@@ -15617,7 +15596,7 @@
       </mc:AlternateContent>
       <mc:AlternateContent xmlns:mc="http://schemas.openxmlformats.org/markup-compatibility/2006">
         <mc:Choice xmlns:p14="http://schemas.microsoft.com/office/powerpoint/2010/main" Requires="p14">
-          <p:contentPart p14:bwMode="auto" r:id="rId116">
+          <p:contentPart p14:bwMode="auto" r:id="rId112">
             <p14:nvContentPartPr>
               <p14:cNvPr id="87" name="Ink 86">
                 <a:extLst>
@@ -15649,7 +15628,7 @@
               <p:nvPr/>
             </p:nvPicPr>
             <p:blipFill>
-              <a:blip r:embed="rId117"/>
+              <a:blip r:embed="rId113"/>
               <a:stretch>
                 <a:fillRect/>
               </a:stretch>
@@ -15668,7 +15647,7 @@
       </mc:AlternateContent>
       <mc:AlternateContent xmlns:mc="http://schemas.openxmlformats.org/markup-compatibility/2006">
         <mc:Choice xmlns:p14="http://schemas.microsoft.com/office/powerpoint/2010/main" Requires="p14">
-          <p:contentPart p14:bwMode="auto" r:id="rId118">
+          <p:contentPart p14:bwMode="auto" r:id="rId114">
             <p14:nvContentPartPr>
               <p14:cNvPr id="88" name="Ink 87">
                 <a:extLst>
@@ -15700,7 +15679,7 @@
               <p:nvPr/>
             </p:nvPicPr>
             <p:blipFill>
-              <a:blip r:embed="rId119"/>
+              <a:blip r:embed="rId115"/>
               <a:stretch>
                 <a:fillRect/>
               </a:stretch>
@@ -15719,7 +15698,7 @@
       </mc:AlternateContent>
       <mc:AlternateContent xmlns:mc="http://schemas.openxmlformats.org/markup-compatibility/2006">
         <mc:Choice xmlns:p14="http://schemas.microsoft.com/office/powerpoint/2010/main" Requires="p14">
-          <p:contentPart p14:bwMode="auto" r:id="rId120">
+          <p:contentPart p14:bwMode="auto" r:id="rId116">
             <p14:nvContentPartPr>
               <p14:cNvPr id="89" name="Ink 88">
                 <a:extLst>
@@ -15751,7 +15730,7 @@
               <p:nvPr/>
             </p:nvPicPr>
             <p:blipFill>
-              <a:blip r:embed="rId121"/>
+              <a:blip r:embed="rId117"/>
               <a:stretch>
                 <a:fillRect/>
               </a:stretch>
@@ -15770,7 +15749,7 @@
       </mc:AlternateContent>
       <mc:AlternateContent xmlns:mc="http://schemas.openxmlformats.org/markup-compatibility/2006">
         <mc:Choice xmlns:p14="http://schemas.microsoft.com/office/powerpoint/2010/main" Requires="p14">
-          <p:contentPart p14:bwMode="auto" r:id="rId122">
+          <p:contentPart p14:bwMode="auto" r:id="rId118">
             <p14:nvContentPartPr>
               <p14:cNvPr id="91" name="Ink 90">
                 <a:extLst>
@@ -15802,7 +15781,7 @@
               <p:nvPr/>
             </p:nvPicPr>
             <p:blipFill>
-              <a:blip r:embed="rId123"/>
+              <a:blip r:embed="rId119"/>
               <a:stretch>
                 <a:fillRect/>
               </a:stretch>
@@ -15821,7 +15800,7 @@
       </mc:AlternateContent>
       <mc:AlternateContent xmlns:mc="http://schemas.openxmlformats.org/markup-compatibility/2006">
         <mc:Choice xmlns:p14="http://schemas.microsoft.com/office/powerpoint/2010/main" Requires="p14">
-          <p:contentPart p14:bwMode="auto" r:id="rId124">
+          <p:contentPart p14:bwMode="auto" r:id="rId120">
             <p14:nvContentPartPr>
               <p14:cNvPr id="92" name="Ink 91">
                 <a:extLst>
@@ -15853,7 +15832,7 @@
               <p:nvPr/>
             </p:nvPicPr>
             <p:blipFill>
-              <a:blip r:embed="rId125"/>
+              <a:blip r:embed="rId121"/>
               <a:stretch>
                 <a:fillRect/>
               </a:stretch>
@@ -15872,7 +15851,7 @@
       </mc:AlternateContent>
       <mc:AlternateContent xmlns:mc="http://schemas.openxmlformats.org/markup-compatibility/2006">
         <mc:Choice xmlns:p14="http://schemas.microsoft.com/office/powerpoint/2010/main" Requires="p14">
-          <p:contentPart p14:bwMode="auto" r:id="rId126">
+          <p:contentPart p14:bwMode="auto" r:id="rId122">
             <p14:nvContentPartPr>
               <p14:cNvPr id="94" name="Ink 93">
                 <a:extLst>
@@ -15904,7 +15883,7 @@
               <p:nvPr/>
             </p:nvPicPr>
             <p:blipFill>
-              <a:blip r:embed="rId127"/>
+              <a:blip r:embed="rId123"/>
               <a:stretch>
                 <a:fillRect/>
               </a:stretch>
@@ -15923,7 +15902,7 @@
       </mc:AlternateContent>
       <mc:AlternateContent xmlns:mc="http://schemas.openxmlformats.org/markup-compatibility/2006">
         <mc:Choice xmlns:p14="http://schemas.microsoft.com/office/powerpoint/2010/main" Requires="p14">
-          <p:contentPart p14:bwMode="auto" r:id="rId128">
+          <p:contentPart p14:bwMode="auto" r:id="rId124">
             <p14:nvContentPartPr>
               <p14:cNvPr id="97" name="Ink 96">
                 <a:extLst>
@@ -15955,7 +15934,7 @@
               <p:nvPr/>
             </p:nvPicPr>
             <p:blipFill>
-              <a:blip r:embed="rId129"/>
+              <a:blip r:embed="rId125"/>
               <a:stretch>
                 <a:fillRect/>
               </a:stretch>
@@ -15974,7 +15953,7 @@
       </mc:AlternateContent>
       <mc:AlternateContent xmlns:mc="http://schemas.openxmlformats.org/markup-compatibility/2006">
         <mc:Choice xmlns:p14="http://schemas.microsoft.com/office/powerpoint/2010/main" Requires="p14">
-          <p:contentPart p14:bwMode="auto" r:id="rId130">
+          <p:contentPart p14:bwMode="auto" r:id="rId126">
             <p14:nvContentPartPr>
               <p14:cNvPr id="99" name="Ink 98">
                 <a:extLst>
@@ -16006,7 +15985,7 @@
               <p:nvPr/>
             </p:nvPicPr>
             <p:blipFill>
-              <a:blip r:embed="rId131"/>
+              <a:blip r:embed="rId127"/>
               <a:stretch>
                 <a:fillRect/>
               </a:stretch>
@@ -16025,7 +16004,7 @@
       </mc:AlternateContent>
       <mc:AlternateContent xmlns:mc="http://schemas.openxmlformats.org/markup-compatibility/2006">
         <mc:Choice xmlns:p14="http://schemas.microsoft.com/office/powerpoint/2010/main" Requires="p14">
-          <p:contentPart p14:bwMode="auto" r:id="rId132">
+          <p:contentPart p14:bwMode="auto" r:id="rId128">
             <p14:nvContentPartPr>
               <p14:cNvPr id="100" name="Ink 99">
                 <a:extLst>
@@ -16057,7 +16036,7 @@
               <p:nvPr/>
             </p:nvPicPr>
             <p:blipFill>
-              <a:blip r:embed="rId133"/>
+              <a:blip r:embed="rId129"/>
               <a:stretch>
                 <a:fillRect/>
               </a:stretch>
@@ -16076,7 +16055,7 @@
       </mc:AlternateContent>
       <mc:AlternateContent xmlns:mc="http://schemas.openxmlformats.org/markup-compatibility/2006">
         <mc:Choice xmlns:p14="http://schemas.microsoft.com/office/powerpoint/2010/main" Requires="p14">
-          <p:contentPart p14:bwMode="auto" r:id="rId134">
+          <p:contentPart p14:bwMode="auto" r:id="rId130">
             <p14:nvContentPartPr>
               <p14:cNvPr id="101" name="Ink 100">
                 <a:extLst>
@@ -16108,7 +16087,7 @@
               <p:nvPr/>
             </p:nvPicPr>
             <p:blipFill>
-              <a:blip r:embed="rId135"/>
+              <a:blip r:embed="rId131"/>
               <a:stretch>
                 <a:fillRect/>
               </a:stretch>
@@ -16127,7 +16106,7 @@
       </mc:AlternateContent>
       <mc:AlternateContent xmlns:mc="http://schemas.openxmlformats.org/markup-compatibility/2006">
         <mc:Choice xmlns:p14="http://schemas.microsoft.com/office/powerpoint/2010/main" Requires="p14">
-          <p:contentPart p14:bwMode="auto" r:id="rId136">
+          <p:contentPart p14:bwMode="auto" r:id="rId132">
             <p14:nvContentPartPr>
               <p14:cNvPr id="102" name="Ink 101">
                 <a:extLst>
@@ -16159,7 +16138,7 @@
               <p:nvPr/>
             </p:nvPicPr>
             <p:blipFill>
-              <a:blip r:embed="rId137"/>
+              <a:blip r:embed="rId133"/>
               <a:stretch>
                 <a:fillRect/>
               </a:stretch>
@@ -16178,7 +16157,7 @@
       </mc:AlternateContent>
       <mc:AlternateContent xmlns:mc="http://schemas.openxmlformats.org/markup-compatibility/2006">
         <mc:Choice xmlns:p14="http://schemas.microsoft.com/office/powerpoint/2010/main" Requires="p14">
-          <p:contentPart p14:bwMode="auto" r:id="rId138">
+          <p:contentPart p14:bwMode="auto" r:id="rId134">
             <p14:nvContentPartPr>
               <p14:cNvPr id="103" name="Ink 102">
                 <a:extLst>
@@ -16210,7 +16189,7 @@
               <p:nvPr/>
             </p:nvPicPr>
             <p:blipFill>
-              <a:blip r:embed="rId139"/>
+              <a:blip r:embed="rId135"/>
               <a:stretch>
                 <a:fillRect/>
               </a:stretch>
@@ -16229,7 +16208,7 @@
       </mc:AlternateContent>
       <mc:AlternateContent xmlns:mc="http://schemas.openxmlformats.org/markup-compatibility/2006">
         <mc:Choice xmlns:p14="http://schemas.microsoft.com/office/powerpoint/2010/main" Requires="p14">
-          <p:contentPart p14:bwMode="auto" r:id="rId140">
+          <p:contentPart p14:bwMode="auto" r:id="rId136">
             <p14:nvContentPartPr>
               <p14:cNvPr id="105" name="Ink 104">
                 <a:extLst>
@@ -16261,7 +16240,7 @@
               <p:nvPr/>
             </p:nvPicPr>
             <p:blipFill>
-              <a:blip r:embed="rId141"/>
+              <a:blip r:embed="rId137"/>
               <a:stretch>
                 <a:fillRect/>
               </a:stretch>
@@ -16313,6 +16292,282 @@
           </a:p>
         </p:txBody>
       </p:sp>
+      <mc:AlternateContent xmlns:mc="http://schemas.openxmlformats.org/markup-compatibility/2006">
+        <mc:Choice xmlns:p14="http://schemas.microsoft.com/office/powerpoint/2010/main" Requires="p14">
+          <p:contentPart p14:bwMode="auto" r:id="rId138">
+            <p14:nvContentPartPr>
+              <p14:cNvPr id="109" name="Ink 108">
+                <a:extLst>
+                  <a:ext uri="{FF2B5EF4-FFF2-40B4-BE49-F238E27FC236}">
+                    <a16:creationId xmlns:a16="http://schemas.microsoft.com/office/drawing/2014/main" id="{3AAD77DC-900A-A3EB-ACDE-9F9868D49A14}"/>
+                  </a:ext>
+                </a:extLst>
+              </p14:cNvPr>
+              <p14:cNvContentPartPr/>
+              <p14:nvPr/>
+            </p14:nvContentPartPr>
+            <p14:xfrm>
+              <a:off x="5942233" y="703865"/>
+              <a:ext cx="518040" cy="1051560"/>
+            </p14:xfrm>
+          </p:contentPart>
+        </mc:Choice>
+        <mc:Fallback>
+          <p:pic>
+            <p:nvPicPr>
+              <p:cNvPr id="109" name="Ink 108">
+                <a:extLst>
+                  <a:ext uri="{FF2B5EF4-FFF2-40B4-BE49-F238E27FC236}">
+                    <a16:creationId xmlns:a16="http://schemas.microsoft.com/office/drawing/2014/main" id="{3AAD77DC-900A-A3EB-ACDE-9F9868D49A14}"/>
+                  </a:ext>
+                </a:extLst>
+              </p:cNvPr>
+              <p:cNvPicPr/>
+              <p:nvPr/>
+            </p:nvPicPr>
+            <p:blipFill>
+              <a:blip r:embed="rId139"/>
+              <a:stretch>
+                <a:fillRect/>
+              </a:stretch>
+            </p:blipFill>
+            <p:spPr>
+              <a:xfrm>
+                <a:off x="5924593" y="686225"/>
+                <a:ext cx="553680" cy="1087200"/>
+              </a:xfrm>
+              <a:prstGeom prst="rect">
+                <a:avLst/>
+              </a:prstGeom>
+            </p:spPr>
+          </p:pic>
+        </mc:Fallback>
+      </mc:AlternateContent>
+      <mc:AlternateContent xmlns:mc="http://schemas.openxmlformats.org/markup-compatibility/2006">
+        <mc:Choice xmlns:p14="http://schemas.microsoft.com/office/powerpoint/2010/main" Requires="p14">
+          <p:contentPart p14:bwMode="auto" r:id="rId140">
+            <p14:nvContentPartPr>
+              <p14:cNvPr id="111" name="Ink 110">
+                <a:extLst>
+                  <a:ext uri="{FF2B5EF4-FFF2-40B4-BE49-F238E27FC236}">
+                    <a16:creationId xmlns:a16="http://schemas.microsoft.com/office/drawing/2014/main" id="{C1A58BBF-3F7A-890C-3CF7-6B908E89D72B}"/>
+                  </a:ext>
+                </a:extLst>
+              </p14:cNvPr>
+              <p14:cNvContentPartPr/>
+              <p14:nvPr/>
+            </p14:nvContentPartPr>
+            <p14:xfrm>
+              <a:off x="6034393" y="934625"/>
+              <a:ext cx="332280" cy="725040"/>
+            </p14:xfrm>
+          </p:contentPart>
+        </mc:Choice>
+        <mc:Fallback>
+          <p:pic>
+            <p:nvPicPr>
+              <p:cNvPr id="111" name="Ink 110">
+                <a:extLst>
+                  <a:ext uri="{FF2B5EF4-FFF2-40B4-BE49-F238E27FC236}">
+                    <a16:creationId xmlns:a16="http://schemas.microsoft.com/office/drawing/2014/main" id="{C1A58BBF-3F7A-890C-3CF7-6B908E89D72B}"/>
+                  </a:ext>
+                </a:extLst>
+              </p:cNvPr>
+              <p:cNvPicPr/>
+              <p:nvPr/>
+            </p:nvPicPr>
+            <p:blipFill>
+              <a:blip r:embed="rId141"/>
+              <a:stretch>
+                <a:fillRect/>
+              </a:stretch>
+            </p:blipFill>
+            <p:spPr>
+              <a:xfrm>
+                <a:off x="5971393" y="871985"/>
+                <a:ext cx="457920" cy="850680"/>
+              </a:xfrm>
+              <a:prstGeom prst="rect">
+                <a:avLst/>
+              </a:prstGeom>
+            </p:spPr>
+          </p:pic>
+        </mc:Fallback>
+      </mc:AlternateContent>
+      <p:grpSp>
+        <p:nvGrpSpPr>
+          <p:cNvPr id="114" name="Group 113">
+            <a:extLst>
+              <a:ext uri="{FF2B5EF4-FFF2-40B4-BE49-F238E27FC236}">
+                <a16:creationId xmlns:a16="http://schemas.microsoft.com/office/drawing/2014/main" id="{9E6D1C50-0163-3A83-A033-955202164863}"/>
+              </a:ext>
+            </a:extLst>
+          </p:cNvPr>
+          <p:cNvGrpSpPr/>
+          <p:nvPr/>
+        </p:nvGrpSpPr>
+        <p:grpSpPr>
+          <a:xfrm>
+            <a:off x="5959513" y="406505"/>
+            <a:ext cx="503640" cy="578520"/>
+            <a:chOff x="5959513" y="406505"/>
+            <a:chExt cx="503640" cy="578520"/>
+          </a:xfrm>
+        </p:grpSpPr>
+        <mc:AlternateContent xmlns:mc="http://schemas.openxmlformats.org/markup-compatibility/2006">
+          <mc:Choice xmlns:p14="http://schemas.microsoft.com/office/powerpoint/2010/main" Requires="p14">
+            <p:contentPart p14:bwMode="auto" r:id="rId142">
+              <p14:nvContentPartPr>
+                <p14:cNvPr id="6" name="Ink 5">
+                  <a:extLst>
+                    <a:ext uri="{FF2B5EF4-FFF2-40B4-BE49-F238E27FC236}">
+                      <a16:creationId xmlns:a16="http://schemas.microsoft.com/office/drawing/2014/main" id="{1493401B-1673-08D2-5BE9-F35DE8CCE57C}"/>
+                    </a:ext>
+                  </a:extLst>
+                </p14:cNvPr>
+                <p14:cNvContentPartPr/>
+                <p14:nvPr/>
+              </p14:nvContentPartPr>
+              <p14:xfrm>
+                <a:off x="5959513" y="459065"/>
+                <a:ext cx="6480" cy="484200"/>
+              </p14:xfrm>
+            </p:contentPart>
+          </mc:Choice>
+          <mc:Fallback>
+            <p:pic>
+              <p:nvPicPr>
+                <p:cNvPr id="6" name="Ink 5">
+                  <a:extLst>
+                    <a:ext uri="{FF2B5EF4-FFF2-40B4-BE49-F238E27FC236}">
+                      <a16:creationId xmlns:a16="http://schemas.microsoft.com/office/drawing/2014/main" id="{1493401B-1673-08D2-5BE9-F35DE8CCE57C}"/>
+                    </a:ext>
+                  </a:extLst>
+                </p:cNvPr>
+                <p:cNvPicPr/>
+                <p:nvPr/>
+              </p:nvPicPr>
+              <p:blipFill>
+                <a:blip r:embed="rId143"/>
+                <a:stretch>
+                  <a:fillRect/>
+                </a:stretch>
+              </p:blipFill>
+              <p:spPr>
+                <a:xfrm>
+                  <a:off x="5941513" y="441065"/>
+                  <a:ext cx="42120" cy="519840"/>
+                </a:xfrm>
+                <a:prstGeom prst="rect">
+                  <a:avLst/>
+                </a:prstGeom>
+              </p:spPr>
+            </p:pic>
+          </mc:Fallback>
+        </mc:AlternateContent>
+        <mc:AlternateContent xmlns:mc="http://schemas.openxmlformats.org/markup-compatibility/2006">
+          <mc:Choice xmlns:p14="http://schemas.microsoft.com/office/powerpoint/2010/main" Requires="p14">
+            <p:contentPart p14:bwMode="auto" r:id="rId144">
+              <p14:nvContentPartPr>
+                <p14:cNvPr id="7" name="Ink 6">
+                  <a:extLst>
+                    <a:ext uri="{FF2B5EF4-FFF2-40B4-BE49-F238E27FC236}">
+                      <a16:creationId xmlns:a16="http://schemas.microsoft.com/office/drawing/2014/main" id="{DC62378B-DD10-7F17-0247-19557DB0A788}"/>
+                    </a:ext>
+                  </a:extLst>
+                </p14:cNvPr>
+                <p14:cNvContentPartPr/>
+                <p14:nvPr/>
+              </p14:nvContentPartPr>
+              <p14:xfrm>
+                <a:off x="6455233" y="406505"/>
+                <a:ext cx="7920" cy="552240"/>
+              </p14:xfrm>
+            </p:contentPart>
+          </mc:Choice>
+          <mc:Fallback>
+            <p:pic>
+              <p:nvPicPr>
+                <p:cNvPr id="7" name="Ink 6">
+                  <a:extLst>
+                    <a:ext uri="{FF2B5EF4-FFF2-40B4-BE49-F238E27FC236}">
+                      <a16:creationId xmlns:a16="http://schemas.microsoft.com/office/drawing/2014/main" id="{DC62378B-DD10-7F17-0247-19557DB0A788}"/>
+                    </a:ext>
+                  </a:extLst>
+                </p:cNvPr>
+                <p:cNvPicPr/>
+                <p:nvPr/>
+              </p:nvPicPr>
+              <p:blipFill>
+                <a:blip r:embed="rId145"/>
+                <a:stretch>
+                  <a:fillRect/>
+                </a:stretch>
+              </p:blipFill>
+              <p:spPr>
+                <a:xfrm>
+                  <a:off x="6437593" y="388505"/>
+                  <a:ext cx="43560" cy="587880"/>
+                </a:xfrm>
+                <a:prstGeom prst="rect">
+                  <a:avLst/>
+                </a:prstGeom>
+              </p:spPr>
+            </p:pic>
+          </mc:Fallback>
+        </mc:AlternateContent>
+        <mc:AlternateContent xmlns:mc="http://schemas.openxmlformats.org/markup-compatibility/2006">
+          <mc:Choice xmlns:p14="http://schemas.microsoft.com/office/powerpoint/2010/main" Requires="p14">
+            <p:contentPart p14:bwMode="auto" r:id="rId146">
+              <p14:nvContentPartPr>
+                <p14:cNvPr id="113" name="Ink 112">
+                  <a:extLst>
+                    <a:ext uri="{FF2B5EF4-FFF2-40B4-BE49-F238E27FC236}">
+                      <a16:creationId xmlns:a16="http://schemas.microsoft.com/office/drawing/2014/main" id="{12146042-08A8-E7E8-3A9E-D11360D87AF4}"/>
+                    </a:ext>
+                  </a:extLst>
+                </p14:cNvPr>
+                <p14:cNvContentPartPr/>
+                <p14:nvPr/>
+              </p14:nvContentPartPr>
+              <p14:xfrm>
+                <a:off x="6197833" y="778385"/>
+                <a:ext cx="122040" cy="206640"/>
+              </p14:xfrm>
+            </p:contentPart>
+          </mc:Choice>
+          <mc:Fallback>
+            <p:pic>
+              <p:nvPicPr>
+                <p:cNvPr id="113" name="Ink 112">
+                  <a:extLst>
+                    <a:ext uri="{FF2B5EF4-FFF2-40B4-BE49-F238E27FC236}">
+                      <a16:creationId xmlns:a16="http://schemas.microsoft.com/office/drawing/2014/main" id="{12146042-08A8-E7E8-3A9E-D11360D87AF4}"/>
+                    </a:ext>
+                  </a:extLst>
+                </p:cNvPr>
+                <p:cNvPicPr/>
+                <p:nvPr/>
+              </p:nvPicPr>
+              <p:blipFill>
+                <a:blip r:embed="rId147"/>
+                <a:stretch>
+                  <a:fillRect/>
+                </a:stretch>
+              </p:blipFill>
+              <p:spPr>
+                <a:xfrm>
+                  <a:off x="6180193" y="760745"/>
+                  <a:ext cx="157680" cy="242280"/>
+                </a:xfrm>
+                <a:prstGeom prst="rect">
+                  <a:avLst/>
+                </a:prstGeom>
+              </p:spPr>
+            </p:pic>
+          </mc:Fallback>
+        </mc:AlternateContent>
+      </p:grpSp>
     </p:spTree>
     <p:extLst>
       <p:ext uri="{BB962C8B-B14F-4D97-AF65-F5344CB8AC3E}">

</xml_diff>